<commit_message>
me-you-us assembly plan resource modified pptx
</commit_message>
<xml_diff>
--- a/app/static/resources/me-you-us-assembly-plan.pptx
+++ b/app/static/resources/me-you-us-assembly-plan.pptx
@@ -27228,15 +27228,7 @@
                   <a:srgbClr val="FFFFFF"/>
                 </a:solidFill>
               </a:rPr>
-              <a:t>ANTI-BULLYING WEEK </a:t>
-            </a:r>
-            <a:r>
-              <a:rPr lang="en-GB" sz="4400" b="1" dirty="0" smtClean="0">
-                <a:solidFill>
-                  <a:srgbClr val="FFFFFF"/>
-                </a:solidFill>
-              </a:rPr>
-              <a:t>2013</a:t>
+              <a:t>ANTI-BULLYING WEEK 2013</a:t>
             </a:r>
             <a:endParaRPr lang="en-GB" sz="4400" dirty="0" smtClean="0">
               <a:solidFill>
@@ -28058,7 +28050,15 @@
                   <a:schemeClr val="bg1"/>
                 </a:solidFill>
               </a:rPr>
-              <a:t> :</a:t>
+              <a:t> </a:t>
+            </a:r>
+            <a:r>
+              <a:rPr lang="en-GB" sz="2000" dirty="0" smtClean="0">
+                <a:solidFill>
+                  <a:schemeClr val="bg1"/>
+                </a:solidFill>
+              </a:rPr>
+              <a:t>:</a:t>
             </a:r>
           </a:p>
           <a:p>
@@ -28069,7 +28069,7 @@
               <a:defRPr/>
             </a:pPr>
             <a:r>
-              <a:rPr lang="en-GB" sz="2000" dirty="0" smtClean="0">
+              <a:rPr lang="en-GB" sz="2000" dirty="0">
                 <a:solidFill>
                   <a:schemeClr val="bg1"/>
                 </a:solidFill>
@@ -28078,7 +28078,7 @@
               <a:t>http://</a:t>
             </a:r>
             <a:r>
-              <a:rPr lang="en-GB" sz="2000" dirty="0" err="1" smtClean="0">
+              <a:rPr lang="en-GB" sz="2000" dirty="0" err="1">
                 <a:solidFill>
                   <a:schemeClr val="bg1"/>
                 </a:solidFill>
@@ -28087,7 +28087,7 @@
               <a:t>www.youtube.com</a:t>
             </a:r>
             <a:r>
-              <a:rPr lang="en-GB" sz="2000" dirty="0" smtClean="0">
+              <a:rPr lang="en-GB" sz="2000" dirty="0">
                 <a:solidFill>
                   <a:schemeClr val="bg1"/>
                 </a:solidFill>
@@ -28096,7 +28096,7 @@
               <a:t>/</a:t>
             </a:r>
             <a:r>
-              <a:rPr lang="en-GB" sz="2000" dirty="0" err="1" smtClean="0">
+              <a:rPr lang="en-GB" sz="2000" dirty="0" err="1">
                 <a:solidFill>
                   <a:schemeClr val="bg1"/>
                 </a:solidFill>
@@ -28105,13 +28105,13 @@
               <a:t>watch?v</a:t>
             </a:r>
             <a:r>
-              <a:rPr lang="en-GB" sz="2000" dirty="0" smtClean="0">
+              <a:rPr lang="en-GB" sz="2000" dirty="0">
                 <a:solidFill>
                   <a:schemeClr val="bg1"/>
                 </a:solidFill>
                 <a:hlinkClick r:id="rId2"/>
               </a:rPr>
-              <a:t>=SFGvmrJ5rjMt</a:t>
+              <a:t>=gaVtC5A5frA</a:t>
             </a:r>
             <a:endParaRPr lang="en-GB" sz="2000" dirty="0" smtClean="0">
               <a:solidFill>

</xml_diff>

<commit_message>
removing reference to video with expletive
</commit_message>
<xml_diff>
--- a/app/static/resources/me-you-us-assembly-plan.pptx
+++ b/app/static/resources/me-you-us-assembly-plan.pptx
@@ -13,7 +13,7 @@
     <p:sldMasterId id="2147483657" r:id="rId9"/>
   </p:sldMasterIdLst>
   <p:notesMasterIdLst>
-    <p:notesMasterId r:id="rId20"/>
+    <p:notesMasterId r:id="rId19"/>
   </p:notesMasterIdLst>
   <p:sldIdLst>
     <p:sldId id="257" r:id="rId10"/>
@@ -25,7 +25,6 @@
     <p:sldId id="264" r:id="rId16"/>
     <p:sldId id="267" r:id="rId17"/>
     <p:sldId id="266" r:id="rId18"/>
-    <p:sldId id="268" r:id="rId19"/>
   </p:sldIdLst>
   <p:sldSz cx="9144000" cy="6858000" type="screen4x3"/>
   <p:notesSz cx="6858000" cy="9144000"/>
@@ -232,14 +231,14 @@
           <a:effectLst/>
           <a:extLst>
             <a:ext uri="{909E8E84-426E-40dd-AFC4-6F175D3DCCD1}">
-              <a14:hiddenFill xmlns:a14="http://schemas.microsoft.com/office/drawing/2010/main">
+              <a14:hiddenFill xmlns:a14="http://schemas.microsoft.com/office/drawing/2010/main" xmlns="">
                 <a:solidFill>
                   <a:srgbClr val="FFFFFF"/>
                 </a:solidFill>
               </a14:hiddenFill>
             </a:ext>
             <a:ext uri="{91240B29-F687-4f45-9708-019B960494DF}">
-              <a14:hiddenLine xmlns:a14="http://schemas.microsoft.com/office/drawing/2010/main" w="9525" cap="flat">
+              <a14:hiddenLine xmlns:a14="http://schemas.microsoft.com/office/drawing/2010/main" xmlns="" w="9525" cap="flat">
                 <a:solidFill>
                   <a:srgbClr val="808080"/>
                 </a:solidFill>
@@ -249,7 +248,7 @@
               </a14:hiddenLine>
             </a:ext>
             <a:ext uri="{AF507438-7753-43e0-B8FC-AC1667EBCBE1}">
-              <a14:hiddenEffects xmlns:a14="http://schemas.microsoft.com/office/drawing/2010/main">
+              <a14:hiddenEffects xmlns:a14="http://schemas.microsoft.com/office/drawing/2010/main" xmlns="">
                 <a:effectLst>
                   <a:outerShdw blurRad="63500" dist="38099" dir="2700000" algn="ctr" rotWithShape="0">
                     <a:schemeClr val="bg2">
@@ -260,7 +259,7 @@
               </a14:hiddenEffects>
             </a:ext>
             <a:ext uri="{FAA26D3D-D897-4be2-8F04-BA451C77F1D7}">
-              <ma14:placeholderFlag xmlns:ma14="http://schemas.microsoft.com/office/mac/drawingml/2011/main" val="1"/>
+              <ma14:placeholderFlag xmlns:ma14="http://schemas.microsoft.com/office/mac/drawingml/2011/main" xmlns="" val="1"/>
             </a:ext>
           </a:extLst>
         </p:spPr>
@@ -290,14 +289,14 @@
           <a:effectLst/>
           <a:extLst>
             <a:ext uri="{909E8E84-426E-40dd-AFC4-6F175D3DCCD1}">
-              <a14:hiddenFill xmlns:a14="http://schemas.microsoft.com/office/drawing/2010/main">
+              <a14:hiddenFill xmlns:a14="http://schemas.microsoft.com/office/drawing/2010/main" xmlns="">
                 <a:solidFill>
                   <a:srgbClr val="FFFFFF"/>
                 </a:solidFill>
               </a14:hiddenFill>
             </a:ext>
             <a:ext uri="{91240B29-F687-4f45-9708-019B960494DF}">
-              <a14:hiddenLine xmlns:a14="http://schemas.microsoft.com/office/drawing/2010/main" w="9525" cap="flat">
+              <a14:hiddenLine xmlns:a14="http://schemas.microsoft.com/office/drawing/2010/main" xmlns="" w="9525" cap="flat">
                 <a:solidFill>
                   <a:srgbClr val="808080"/>
                 </a:solidFill>
@@ -307,7 +306,7 @@
               </a14:hiddenLine>
             </a:ext>
             <a:ext uri="{AF507438-7753-43e0-B8FC-AC1667EBCBE1}">
-              <a14:hiddenEffects xmlns:a14="http://schemas.microsoft.com/office/drawing/2010/main">
+              <a14:hiddenEffects xmlns:a14="http://schemas.microsoft.com/office/drawing/2010/main" xmlns="">
                 <a:effectLst>
                   <a:outerShdw blurRad="63500" dist="38099" dir="2700000" algn="ctr" rotWithShape="0">
                     <a:schemeClr val="bg2">
@@ -318,7 +317,7 @@
               </a14:hiddenEffects>
             </a:ext>
             <a:ext uri="{FAA26D3D-D897-4be2-8F04-BA451C77F1D7}">
-              <ma14:placeholderFlag xmlns:ma14="http://schemas.microsoft.com/office/mac/drawingml/2011/main" val="1"/>
+              <ma14:placeholderFlag xmlns:ma14="http://schemas.microsoft.com/office/mac/drawingml/2011/main" xmlns="" val="1"/>
             </a:ext>
           </a:extLst>
         </p:spPr>
@@ -338,7 +337,7 @@
     </p:spTree>
     <p:extLst>
       <p:ext uri="{BB962C8B-B14F-4D97-AF65-F5344CB8AC3E}">
-        <p14:creationId xmlns:p14="http://schemas.microsoft.com/office/powerpoint/2010/main" val="572861201"/>
+        <p14:creationId xmlns:p14="http://schemas.microsoft.com/office/powerpoint/2010/main" xmlns="" val="572861201"/>
       </p:ext>
     </p:extLst>
   </p:cSld>
@@ -546,7 +545,7 @@
           </a:ln>
           <a:extLst>
             <a:ext uri="{AF507438-7753-43e0-B8FC-AC1667EBCBE1}">
-              <a14:hiddenEffects xmlns:a14="http://schemas.microsoft.com/office/drawing/2010/main">
+              <a14:hiddenEffects xmlns:a14="http://schemas.microsoft.com/office/drawing/2010/main" xmlns="">
                 <a:effectLst>
                   <a:outerShdw blurRad="63500" dist="38099" dir="2700000" algn="ctr" rotWithShape="0">
                     <a:srgbClr val="000000">
@@ -577,7 +576,7 @@
           <a:ln/>
           <a:extLst>
             <a:ext uri="{AF507438-7753-43e0-B8FC-AC1667EBCBE1}">
-              <a14:hiddenEffects xmlns:a14="http://schemas.microsoft.com/office/drawing/2010/main">
+              <a14:hiddenEffects xmlns:a14="http://schemas.microsoft.com/office/drawing/2010/main" xmlns="">
                 <a:effectLst>
                   <a:outerShdw blurRad="63500" dist="38099" dir="2700000" algn="ctr" rotWithShape="0">
                     <a:srgbClr val="000000">
@@ -663,7 +662,7 @@
           </a:ln>
           <a:extLst>
             <a:ext uri="{AF507438-7753-43e0-B8FC-AC1667EBCBE1}">
-              <a14:hiddenEffects xmlns:a14="http://schemas.microsoft.com/office/drawing/2010/main">
+              <a14:hiddenEffects xmlns:a14="http://schemas.microsoft.com/office/drawing/2010/main" xmlns="">
                 <a:effectLst>
                   <a:outerShdw blurRad="63500" dist="38099" dir="2700000" algn="ctr" rotWithShape="0">
                     <a:srgbClr val="000000">
@@ -694,7 +693,7 @@
           <a:ln/>
           <a:extLst>
             <a:ext uri="{AF507438-7753-43e0-B8FC-AC1667EBCBE1}">
-              <a14:hiddenEffects xmlns:a14="http://schemas.microsoft.com/office/drawing/2010/main">
+              <a14:hiddenEffects xmlns:a14="http://schemas.microsoft.com/office/drawing/2010/main" xmlns="">
                 <a:effectLst>
                   <a:outerShdw blurRad="63500" dist="38099" dir="2700000" algn="ctr" rotWithShape="0">
                     <a:srgbClr val="000000">
@@ -875,7 +874,7 @@
     </p:spTree>
     <p:extLst>
       <p:ext uri="{BB962C8B-B14F-4D97-AF65-F5344CB8AC3E}">
-        <p14:creationId xmlns:p14="http://schemas.microsoft.com/office/powerpoint/2010/main" val="2315351278"/>
+        <p14:creationId xmlns:p14="http://schemas.microsoft.com/office/powerpoint/2010/main" xmlns="" val="2315351278"/>
       </p:ext>
     </p:extLst>
   </p:cSld>
@@ -1015,7 +1014,7 @@
     </p:spTree>
     <p:extLst>
       <p:ext uri="{BB962C8B-B14F-4D97-AF65-F5344CB8AC3E}">
-        <p14:creationId xmlns:p14="http://schemas.microsoft.com/office/powerpoint/2010/main" val="2362958055"/>
+        <p14:creationId xmlns:p14="http://schemas.microsoft.com/office/powerpoint/2010/main" xmlns="" val="2362958055"/>
       </p:ext>
     </p:extLst>
   </p:cSld>
@@ -1165,7 +1164,7 @@
     </p:spTree>
     <p:extLst>
       <p:ext uri="{BB962C8B-B14F-4D97-AF65-F5344CB8AC3E}">
-        <p14:creationId xmlns:p14="http://schemas.microsoft.com/office/powerpoint/2010/main" val="3981421195"/>
+        <p14:creationId xmlns:p14="http://schemas.microsoft.com/office/powerpoint/2010/main" xmlns="" val="3981421195"/>
       </p:ext>
     </p:extLst>
   </p:cSld>
@@ -1323,7 +1322,7 @@
     </p:spTree>
     <p:extLst>
       <p:ext uri="{BB962C8B-B14F-4D97-AF65-F5344CB8AC3E}">
-        <p14:creationId xmlns:p14="http://schemas.microsoft.com/office/powerpoint/2010/main" val="2199236853"/>
+        <p14:creationId xmlns:p14="http://schemas.microsoft.com/office/powerpoint/2010/main" xmlns="" val="2199236853"/>
       </p:ext>
     </p:extLst>
   </p:cSld>
@@ -1463,7 +1462,7 @@
     </p:spTree>
     <p:extLst>
       <p:ext uri="{BB962C8B-B14F-4D97-AF65-F5344CB8AC3E}">
-        <p14:creationId xmlns:p14="http://schemas.microsoft.com/office/powerpoint/2010/main" val="2539896893"/>
+        <p14:creationId xmlns:p14="http://schemas.microsoft.com/office/powerpoint/2010/main" xmlns="" val="2539896893"/>
       </p:ext>
     </p:extLst>
   </p:cSld>
@@ -1625,7 +1624,7 @@
     </p:spTree>
     <p:extLst>
       <p:ext uri="{BB962C8B-B14F-4D97-AF65-F5344CB8AC3E}">
-        <p14:creationId xmlns:p14="http://schemas.microsoft.com/office/powerpoint/2010/main" val="2224714739"/>
+        <p14:creationId xmlns:p14="http://schemas.microsoft.com/office/powerpoint/2010/main" xmlns="" val="2224714739"/>
       </p:ext>
     </p:extLst>
   </p:cSld>
@@ -1883,7 +1882,7 @@
     </p:spTree>
     <p:extLst>
       <p:ext uri="{BB962C8B-B14F-4D97-AF65-F5344CB8AC3E}">
-        <p14:creationId xmlns:p14="http://schemas.microsoft.com/office/powerpoint/2010/main" val="1322781076"/>
+        <p14:creationId xmlns:p14="http://schemas.microsoft.com/office/powerpoint/2010/main" xmlns="" val="1322781076"/>
       </p:ext>
     </p:extLst>
   </p:cSld>
@@ -2280,7 +2279,7 @@
     </p:spTree>
     <p:extLst>
       <p:ext uri="{BB962C8B-B14F-4D97-AF65-F5344CB8AC3E}">
-        <p14:creationId xmlns:p14="http://schemas.microsoft.com/office/powerpoint/2010/main" val="7653190"/>
+        <p14:creationId xmlns:p14="http://schemas.microsoft.com/office/powerpoint/2010/main" xmlns="" val="7653190"/>
       </p:ext>
     </p:extLst>
   </p:cSld>
@@ -2368,7 +2367,7 @@
     </p:spTree>
     <p:extLst>
       <p:ext uri="{BB962C8B-B14F-4D97-AF65-F5344CB8AC3E}">
-        <p14:creationId xmlns:p14="http://schemas.microsoft.com/office/powerpoint/2010/main" val="3920434905"/>
+        <p14:creationId xmlns:p14="http://schemas.microsoft.com/office/powerpoint/2010/main" xmlns="" val="3920434905"/>
       </p:ext>
     </p:extLst>
   </p:cSld>
@@ -2433,7 +2432,7 @@
     </p:spTree>
     <p:extLst>
       <p:ext uri="{BB962C8B-B14F-4D97-AF65-F5344CB8AC3E}">
-        <p14:creationId xmlns:p14="http://schemas.microsoft.com/office/powerpoint/2010/main" val="2698946125"/>
+        <p14:creationId xmlns:p14="http://schemas.microsoft.com/office/powerpoint/2010/main" xmlns="" val="2698946125"/>
       </p:ext>
     </p:extLst>
   </p:cSld>
@@ -2680,7 +2679,7 @@
     </p:spTree>
     <p:extLst>
       <p:ext uri="{BB962C8B-B14F-4D97-AF65-F5344CB8AC3E}">
-        <p14:creationId xmlns:p14="http://schemas.microsoft.com/office/powerpoint/2010/main" val="1901866972"/>
+        <p14:creationId xmlns:p14="http://schemas.microsoft.com/office/powerpoint/2010/main" xmlns="" val="1901866972"/>
       </p:ext>
     </p:extLst>
   </p:cSld>
@@ -2820,7 +2819,7 @@
     </p:spTree>
     <p:extLst>
       <p:ext uri="{BB962C8B-B14F-4D97-AF65-F5344CB8AC3E}">
-        <p14:creationId xmlns:p14="http://schemas.microsoft.com/office/powerpoint/2010/main" val="3712029337"/>
+        <p14:creationId xmlns:p14="http://schemas.microsoft.com/office/powerpoint/2010/main" xmlns="" val="3712029337"/>
       </p:ext>
     </p:extLst>
   </p:cSld>
@@ -3047,7 +3046,7 @@
     </p:spTree>
     <p:extLst>
       <p:ext uri="{BB962C8B-B14F-4D97-AF65-F5344CB8AC3E}">
-        <p14:creationId xmlns:p14="http://schemas.microsoft.com/office/powerpoint/2010/main" val="2084286120"/>
+        <p14:creationId xmlns:p14="http://schemas.microsoft.com/office/powerpoint/2010/main" xmlns="" val="2084286120"/>
       </p:ext>
     </p:extLst>
   </p:cSld>
@@ -3187,7 +3186,7 @@
     </p:spTree>
     <p:extLst>
       <p:ext uri="{BB962C8B-B14F-4D97-AF65-F5344CB8AC3E}">
-        <p14:creationId xmlns:p14="http://schemas.microsoft.com/office/powerpoint/2010/main" val="2932442613"/>
+        <p14:creationId xmlns:p14="http://schemas.microsoft.com/office/powerpoint/2010/main" xmlns="" val="2932442613"/>
       </p:ext>
     </p:extLst>
   </p:cSld>
@@ -3337,7 +3336,7 @@
     </p:spTree>
     <p:extLst>
       <p:ext uri="{BB962C8B-B14F-4D97-AF65-F5344CB8AC3E}">
-        <p14:creationId xmlns:p14="http://schemas.microsoft.com/office/powerpoint/2010/main" val="3527379089"/>
+        <p14:creationId xmlns:p14="http://schemas.microsoft.com/office/powerpoint/2010/main" xmlns="" val="3527379089"/>
       </p:ext>
     </p:extLst>
   </p:cSld>
@@ -3495,7 +3494,7 @@
     </p:spTree>
     <p:extLst>
       <p:ext uri="{BB962C8B-B14F-4D97-AF65-F5344CB8AC3E}">
-        <p14:creationId xmlns:p14="http://schemas.microsoft.com/office/powerpoint/2010/main" val="4155549213"/>
+        <p14:creationId xmlns:p14="http://schemas.microsoft.com/office/powerpoint/2010/main" xmlns="" val="4155549213"/>
       </p:ext>
     </p:extLst>
   </p:cSld>
@@ -3635,7 +3634,7 @@
     </p:spTree>
     <p:extLst>
       <p:ext uri="{BB962C8B-B14F-4D97-AF65-F5344CB8AC3E}">
-        <p14:creationId xmlns:p14="http://schemas.microsoft.com/office/powerpoint/2010/main" val="3479982816"/>
+        <p14:creationId xmlns:p14="http://schemas.microsoft.com/office/powerpoint/2010/main" xmlns="" val="3479982816"/>
       </p:ext>
     </p:extLst>
   </p:cSld>
@@ -3797,7 +3796,7 @@
     </p:spTree>
     <p:extLst>
       <p:ext uri="{BB962C8B-B14F-4D97-AF65-F5344CB8AC3E}">
-        <p14:creationId xmlns:p14="http://schemas.microsoft.com/office/powerpoint/2010/main" val="3096331684"/>
+        <p14:creationId xmlns:p14="http://schemas.microsoft.com/office/powerpoint/2010/main" xmlns="" val="3096331684"/>
       </p:ext>
     </p:extLst>
   </p:cSld>
@@ -4055,7 +4054,7 @@
     </p:spTree>
     <p:extLst>
       <p:ext uri="{BB962C8B-B14F-4D97-AF65-F5344CB8AC3E}">
-        <p14:creationId xmlns:p14="http://schemas.microsoft.com/office/powerpoint/2010/main" val="770046886"/>
+        <p14:creationId xmlns:p14="http://schemas.microsoft.com/office/powerpoint/2010/main" xmlns="" val="770046886"/>
       </p:ext>
     </p:extLst>
   </p:cSld>
@@ -4452,7 +4451,7 @@
     </p:spTree>
     <p:extLst>
       <p:ext uri="{BB962C8B-B14F-4D97-AF65-F5344CB8AC3E}">
-        <p14:creationId xmlns:p14="http://schemas.microsoft.com/office/powerpoint/2010/main" val="358202073"/>
+        <p14:creationId xmlns:p14="http://schemas.microsoft.com/office/powerpoint/2010/main" xmlns="" val="358202073"/>
       </p:ext>
     </p:extLst>
   </p:cSld>
@@ -4540,7 +4539,7 @@
     </p:spTree>
     <p:extLst>
       <p:ext uri="{BB962C8B-B14F-4D97-AF65-F5344CB8AC3E}">
-        <p14:creationId xmlns:p14="http://schemas.microsoft.com/office/powerpoint/2010/main" val="1189509950"/>
+        <p14:creationId xmlns:p14="http://schemas.microsoft.com/office/powerpoint/2010/main" xmlns="" val="1189509950"/>
       </p:ext>
     </p:extLst>
   </p:cSld>
@@ -4605,7 +4604,7 @@
     </p:spTree>
     <p:extLst>
       <p:ext uri="{BB962C8B-B14F-4D97-AF65-F5344CB8AC3E}">
-        <p14:creationId xmlns:p14="http://schemas.microsoft.com/office/powerpoint/2010/main" val="3159498146"/>
+        <p14:creationId xmlns:p14="http://schemas.microsoft.com/office/powerpoint/2010/main" xmlns="" val="3159498146"/>
       </p:ext>
     </p:extLst>
   </p:cSld>
@@ -4767,7 +4766,7 @@
     </p:spTree>
     <p:extLst>
       <p:ext uri="{BB962C8B-B14F-4D97-AF65-F5344CB8AC3E}">
-        <p14:creationId xmlns:p14="http://schemas.microsoft.com/office/powerpoint/2010/main" val="1374845425"/>
+        <p14:creationId xmlns:p14="http://schemas.microsoft.com/office/powerpoint/2010/main" xmlns="" val="1374845425"/>
       </p:ext>
     </p:extLst>
   </p:cSld>
@@ -5014,7 +5013,7 @@
     </p:spTree>
     <p:extLst>
       <p:ext uri="{BB962C8B-B14F-4D97-AF65-F5344CB8AC3E}">
-        <p14:creationId xmlns:p14="http://schemas.microsoft.com/office/powerpoint/2010/main" val="3223475907"/>
+        <p14:creationId xmlns:p14="http://schemas.microsoft.com/office/powerpoint/2010/main" xmlns="" val="3223475907"/>
       </p:ext>
     </p:extLst>
   </p:cSld>
@@ -5238,7 +5237,7 @@
     </p:spTree>
     <p:extLst>
       <p:ext uri="{BB962C8B-B14F-4D97-AF65-F5344CB8AC3E}">
-        <p14:creationId xmlns:p14="http://schemas.microsoft.com/office/powerpoint/2010/main" val="1780005205"/>
+        <p14:creationId xmlns:p14="http://schemas.microsoft.com/office/powerpoint/2010/main" xmlns="" val="1780005205"/>
       </p:ext>
     </p:extLst>
   </p:cSld>
@@ -5378,7 +5377,7 @@
     </p:spTree>
     <p:extLst>
       <p:ext uri="{BB962C8B-B14F-4D97-AF65-F5344CB8AC3E}">
-        <p14:creationId xmlns:p14="http://schemas.microsoft.com/office/powerpoint/2010/main" val="844799472"/>
+        <p14:creationId xmlns:p14="http://schemas.microsoft.com/office/powerpoint/2010/main" xmlns="" val="844799472"/>
       </p:ext>
     </p:extLst>
   </p:cSld>
@@ -5528,7 +5527,7 @@
     </p:spTree>
     <p:extLst>
       <p:ext uri="{BB962C8B-B14F-4D97-AF65-F5344CB8AC3E}">
-        <p14:creationId xmlns:p14="http://schemas.microsoft.com/office/powerpoint/2010/main" val="2284947398"/>
+        <p14:creationId xmlns:p14="http://schemas.microsoft.com/office/powerpoint/2010/main" xmlns="" val="2284947398"/>
       </p:ext>
     </p:extLst>
   </p:cSld>
@@ -5686,7 +5685,7 @@
     </p:spTree>
     <p:extLst>
       <p:ext uri="{BB962C8B-B14F-4D97-AF65-F5344CB8AC3E}">
-        <p14:creationId xmlns:p14="http://schemas.microsoft.com/office/powerpoint/2010/main" val="3474139423"/>
+        <p14:creationId xmlns:p14="http://schemas.microsoft.com/office/powerpoint/2010/main" xmlns="" val="3474139423"/>
       </p:ext>
     </p:extLst>
   </p:cSld>
@@ -5826,7 +5825,7 @@
     </p:spTree>
     <p:extLst>
       <p:ext uri="{BB962C8B-B14F-4D97-AF65-F5344CB8AC3E}">
-        <p14:creationId xmlns:p14="http://schemas.microsoft.com/office/powerpoint/2010/main" val="1985715176"/>
+        <p14:creationId xmlns:p14="http://schemas.microsoft.com/office/powerpoint/2010/main" xmlns="" val="1985715176"/>
       </p:ext>
     </p:extLst>
   </p:cSld>
@@ -5988,7 +5987,7 @@
     </p:spTree>
     <p:extLst>
       <p:ext uri="{BB962C8B-B14F-4D97-AF65-F5344CB8AC3E}">
-        <p14:creationId xmlns:p14="http://schemas.microsoft.com/office/powerpoint/2010/main" val="2343757844"/>
+        <p14:creationId xmlns:p14="http://schemas.microsoft.com/office/powerpoint/2010/main" xmlns="" val="2343757844"/>
       </p:ext>
     </p:extLst>
   </p:cSld>
@@ -6246,7 +6245,7 @@
     </p:spTree>
     <p:extLst>
       <p:ext uri="{BB962C8B-B14F-4D97-AF65-F5344CB8AC3E}">
-        <p14:creationId xmlns:p14="http://schemas.microsoft.com/office/powerpoint/2010/main" val="2785035838"/>
+        <p14:creationId xmlns:p14="http://schemas.microsoft.com/office/powerpoint/2010/main" xmlns="" val="2785035838"/>
       </p:ext>
     </p:extLst>
   </p:cSld>
@@ -6643,7 +6642,7 @@
     </p:spTree>
     <p:extLst>
       <p:ext uri="{BB962C8B-B14F-4D97-AF65-F5344CB8AC3E}">
-        <p14:creationId xmlns:p14="http://schemas.microsoft.com/office/powerpoint/2010/main" val="1647407627"/>
+        <p14:creationId xmlns:p14="http://schemas.microsoft.com/office/powerpoint/2010/main" xmlns="" val="1647407627"/>
       </p:ext>
     </p:extLst>
   </p:cSld>
@@ -6731,7 +6730,7 @@
     </p:spTree>
     <p:extLst>
       <p:ext uri="{BB962C8B-B14F-4D97-AF65-F5344CB8AC3E}">
-        <p14:creationId xmlns:p14="http://schemas.microsoft.com/office/powerpoint/2010/main" val="1916816999"/>
+        <p14:creationId xmlns:p14="http://schemas.microsoft.com/office/powerpoint/2010/main" xmlns="" val="1916816999"/>
       </p:ext>
     </p:extLst>
   </p:cSld>
@@ -6989,7 +6988,7 @@
     </p:spTree>
     <p:extLst>
       <p:ext uri="{BB962C8B-B14F-4D97-AF65-F5344CB8AC3E}">
-        <p14:creationId xmlns:p14="http://schemas.microsoft.com/office/powerpoint/2010/main" val="3372753493"/>
+        <p14:creationId xmlns:p14="http://schemas.microsoft.com/office/powerpoint/2010/main" xmlns="" val="3372753493"/>
       </p:ext>
     </p:extLst>
   </p:cSld>
@@ -7054,7 +7053,7 @@
     </p:spTree>
     <p:extLst>
       <p:ext uri="{BB962C8B-B14F-4D97-AF65-F5344CB8AC3E}">
-        <p14:creationId xmlns:p14="http://schemas.microsoft.com/office/powerpoint/2010/main" val="1100089630"/>
+        <p14:creationId xmlns:p14="http://schemas.microsoft.com/office/powerpoint/2010/main" xmlns="" val="1100089630"/>
       </p:ext>
     </p:extLst>
   </p:cSld>
@@ -7301,7 +7300,7 @@
     </p:spTree>
     <p:extLst>
       <p:ext uri="{BB962C8B-B14F-4D97-AF65-F5344CB8AC3E}">
-        <p14:creationId xmlns:p14="http://schemas.microsoft.com/office/powerpoint/2010/main" val="3498322809"/>
+        <p14:creationId xmlns:p14="http://schemas.microsoft.com/office/powerpoint/2010/main" xmlns="" val="3498322809"/>
       </p:ext>
     </p:extLst>
   </p:cSld>
@@ -7525,7 +7524,7 @@
     </p:spTree>
     <p:extLst>
       <p:ext uri="{BB962C8B-B14F-4D97-AF65-F5344CB8AC3E}">
-        <p14:creationId xmlns:p14="http://schemas.microsoft.com/office/powerpoint/2010/main" val="84197036"/>
+        <p14:creationId xmlns:p14="http://schemas.microsoft.com/office/powerpoint/2010/main" xmlns="" val="84197036"/>
       </p:ext>
     </p:extLst>
   </p:cSld>
@@ -7665,7 +7664,7 @@
     </p:spTree>
     <p:extLst>
       <p:ext uri="{BB962C8B-B14F-4D97-AF65-F5344CB8AC3E}">
-        <p14:creationId xmlns:p14="http://schemas.microsoft.com/office/powerpoint/2010/main" val="4036854211"/>
+        <p14:creationId xmlns:p14="http://schemas.microsoft.com/office/powerpoint/2010/main" xmlns="" val="4036854211"/>
       </p:ext>
     </p:extLst>
   </p:cSld>
@@ -7815,7 +7814,7 @@
     </p:spTree>
     <p:extLst>
       <p:ext uri="{BB962C8B-B14F-4D97-AF65-F5344CB8AC3E}">
-        <p14:creationId xmlns:p14="http://schemas.microsoft.com/office/powerpoint/2010/main" val="2497154794"/>
+        <p14:creationId xmlns:p14="http://schemas.microsoft.com/office/powerpoint/2010/main" xmlns="" val="2497154794"/>
       </p:ext>
     </p:extLst>
   </p:cSld>
@@ -7973,7 +7972,7 @@
     </p:spTree>
     <p:extLst>
       <p:ext uri="{BB962C8B-B14F-4D97-AF65-F5344CB8AC3E}">
-        <p14:creationId xmlns:p14="http://schemas.microsoft.com/office/powerpoint/2010/main" val="3062256720"/>
+        <p14:creationId xmlns:p14="http://schemas.microsoft.com/office/powerpoint/2010/main" xmlns="" val="3062256720"/>
       </p:ext>
     </p:extLst>
   </p:cSld>
@@ -8113,7 +8112,7 @@
     </p:spTree>
     <p:extLst>
       <p:ext uri="{BB962C8B-B14F-4D97-AF65-F5344CB8AC3E}">
-        <p14:creationId xmlns:p14="http://schemas.microsoft.com/office/powerpoint/2010/main" val="589213610"/>
+        <p14:creationId xmlns:p14="http://schemas.microsoft.com/office/powerpoint/2010/main" xmlns="" val="589213610"/>
       </p:ext>
     </p:extLst>
   </p:cSld>
@@ -8275,7 +8274,7 @@
     </p:spTree>
     <p:extLst>
       <p:ext uri="{BB962C8B-B14F-4D97-AF65-F5344CB8AC3E}">
-        <p14:creationId xmlns:p14="http://schemas.microsoft.com/office/powerpoint/2010/main" val="2288186310"/>
+        <p14:creationId xmlns:p14="http://schemas.microsoft.com/office/powerpoint/2010/main" xmlns="" val="2288186310"/>
       </p:ext>
     </p:extLst>
   </p:cSld>
@@ -8533,7 +8532,7 @@
     </p:spTree>
     <p:extLst>
       <p:ext uri="{BB962C8B-B14F-4D97-AF65-F5344CB8AC3E}">
-        <p14:creationId xmlns:p14="http://schemas.microsoft.com/office/powerpoint/2010/main" val="868547579"/>
+        <p14:creationId xmlns:p14="http://schemas.microsoft.com/office/powerpoint/2010/main" xmlns="" val="868547579"/>
       </p:ext>
     </p:extLst>
   </p:cSld>
@@ -8930,7 +8929,7 @@
     </p:spTree>
     <p:extLst>
       <p:ext uri="{BB962C8B-B14F-4D97-AF65-F5344CB8AC3E}">
-        <p14:creationId xmlns:p14="http://schemas.microsoft.com/office/powerpoint/2010/main" val="2649430638"/>
+        <p14:creationId xmlns:p14="http://schemas.microsoft.com/office/powerpoint/2010/main" xmlns="" val="2649430638"/>
       </p:ext>
     </p:extLst>
   </p:cSld>
@@ -9327,7 +9326,7 @@
     </p:spTree>
     <p:extLst>
       <p:ext uri="{BB962C8B-B14F-4D97-AF65-F5344CB8AC3E}">
-        <p14:creationId xmlns:p14="http://schemas.microsoft.com/office/powerpoint/2010/main" val="1241541156"/>
+        <p14:creationId xmlns:p14="http://schemas.microsoft.com/office/powerpoint/2010/main" xmlns="" val="1241541156"/>
       </p:ext>
     </p:extLst>
   </p:cSld>
@@ -9415,7 +9414,7 @@
     </p:spTree>
     <p:extLst>
       <p:ext uri="{BB962C8B-B14F-4D97-AF65-F5344CB8AC3E}">
-        <p14:creationId xmlns:p14="http://schemas.microsoft.com/office/powerpoint/2010/main" val="807602032"/>
+        <p14:creationId xmlns:p14="http://schemas.microsoft.com/office/powerpoint/2010/main" xmlns="" val="807602032"/>
       </p:ext>
     </p:extLst>
   </p:cSld>
@@ -9480,7 +9479,7 @@
     </p:spTree>
     <p:extLst>
       <p:ext uri="{BB962C8B-B14F-4D97-AF65-F5344CB8AC3E}">
-        <p14:creationId xmlns:p14="http://schemas.microsoft.com/office/powerpoint/2010/main" val="1471658664"/>
+        <p14:creationId xmlns:p14="http://schemas.microsoft.com/office/powerpoint/2010/main" xmlns="" val="1471658664"/>
       </p:ext>
     </p:extLst>
   </p:cSld>
@@ -9727,7 +9726,7 @@
     </p:spTree>
     <p:extLst>
       <p:ext uri="{BB962C8B-B14F-4D97-AF65-F5344CB8AC3E}">
-        <p14:creationId xmlns:p14="http://schemas.microsoft.com/office/powerpoint/2010/main" val="480373634"/>
+        <p14:creationId xmlns:p14="http://schemas.microsoft.com/office/powerpoint/2010/main" xmlns="" val="480373634"/>
       </p:ext>
     </p:extLst>
   </p:cSld>
@@ -9951,7 +9950,7 @@
     </p:spTree>
     <p:extLst>
       <p:ext uri="{BB962C8B-B14F-4D97-AF65-F5344CB8AC3E}">
-        <p14:creationId xmlns:p14="http://schemas.microsoft.com/office/powerpoint/2010/main" val="4095459214"/>
+        <p14:creationId xmlns:p14="http://schemas.microsoft.com/office/powerpoint/2010/main" xmlns="" val="4095459214"/>
       </p:ext>
     </p:extLst>
   </p:cSld>
@@ -10091,7 +10090,7 @@
     </p:spTree>
     <p:extLst>
       <p:ext uri="{BB962C8B-B14F-4D97-AF65-F5344CB8AC3E}">
-        <p14:creationId xmlns:p14="http://schemas.microsoft.com/office/powerpoint/2010/main" val="3290931815"/>
+        <p14:creationId xmlns:p14="http://schemas.microsoft.com/office/powerpoint/2010/main" xmlns="" val="3290931815"/>
       </p:ext>
     </p:extLst>
   </p:cSld>
@@ -10241,7 +10240,7 @@
     </p:spTree>
     <p:extLst>
       <p:ext uri="{BB962C8B-B14F-4D97-AF65-F5344CB8AC3E}">
-        <p14:creationId xmlns:p14="http://schemas.microsoft.com/office/powerpoint/2010/main" val="3918302184"/>
+        <p14:creationId xmlns:p14="http://schemas.microsoft.com/office/powerpoint/2010/main" xmlns="" val="3918302184"/>
       </p:ext>
     </p:extLst>
   </p:cSld>
@@ -10399,7 +10398,7 @@
     </p:spTree>
     <p:extLst>
       <p:ext uri="{BB962C8B-B14F-4D97-AF65-F5344CB8AC3E}">
-        <p14:creationId xmlns:p14="http://schemas.microsoft.com/office/powerpoint/2010/main" val="1571923985"/>
+        <p14:creationId xmlns:p14="http://schemas.microsoft.com/office/powerpoint/2010/main" xmlns="" val="1571923985"/>
       </p:ext>
     </p:extLst>
   </p:cSld>
@@ -10539,7 +10538,7 @@
     </p:spTree>
     <p:extLst>
       <p:ext uri="{BB962C8B-B14F-4D97-AF65-F5344CB8AC3E}">
-        <p14:creationId xmlns:p14="http://schemas.microsoft.com/office/powerpoint/2010/main" val="577596313"/>
+        <p14:creationId xmlns:p14="http://schemas.microsoft.com/office/powerpoint/2010/main" xmlns="" val="577596313"/>
       </p:ext>
     </p:extLst>
   </p:cSld>
@@ -10701,7 +10700,7 @@
     </p:spTree>
     <p:extLst>
       <p:ext uri="{BB962C8B-B14F-4D97-AF65-F5344CB8AC3E}">
-        <p14:creationId xmlns:p14="http://schemas.microsoft.com/office/powerpoint/2010/main" val="2873043406"/>
+        <p14:creationId xmlns:p14="http://schemas.microsoft.com/office/powerpoint/2010/main" xmlns="" val="2873043406"/>
       </p:ext>
     </p:extLst>
   </p:cSld>
@@ -10959,7 +10958,7 @@
     </p:spTree>
     <p:extLst>
       <p:ext uri="{BB962C8B-B14F-4D97-AF65-F5344CB8AC3E}">
-        <p14:creationId xmlns:p14="http://schemas.microsoft.com/office/powerpoint/2010/main" val="2863641247"/>
+        <p14:creationId xmlns:p14="http://schemas.microsoft.com/office/powerpoint/2010/main" xmlns="" val="2863641247"/>
       </p:ext>
     </p:extLst>
   </p:cSld>
@@ -11047,7 +11046,7 @@
     </p:spTree>
     <p:extLst>
       <p:ext uri="{BB962C8B-B14F-4D97-AF65-F5344CB8AC3E}">
-        <p14:creationId xmlns:p14="http://schemas.microsoft.com/office/powerpoint/2010/main" val="1507582813"/>
+        <p14:creationId xmlns:p14="http://schemas.microsoft.com/office/powerpoint/2010/main" xmlns="" val="1507582813"/>
       </p:ext>
     </p:extLst>
   </p:cSld>
@@ -11444,7 +11443,7 @@
     </p:spTree>
     <p:extLst>
       <p:ext uri="{BB962C8B-B14F-4D97-AF65-F5344CB8AC3E}">
-        <p14:creationId xmlns:p14="http://schemas.microsoft.com/office/powerpoint/2010/main" val="1241447551"/>
+        <p14:creationId xmlns:p14="http://schemas.microsoft.com/office/powerpoint/2010/main" xmlns="" val="1241447551"/>
       </p:ext>
     </p:extLst>
   </p:cSld>
@@ -11532,7 +11531,7 @@
     </p:spTree>
     <p:extLst>
       <p:ext uri="{BB962C8B-B14F-4D97-AF65-F5344CB8AC3E}">
-        <p14:creationId xmlns:p14="http://schemas.microsoft.com/office/powerpoint/2010/main" val="2195247793"/>
+        <p14:creationId xmlns:p14="http://schemas.microsoft.com/office/powerpoint/2010/main" xmlns="" val="2195247793"/>
       </p:ext>
     </p:extLst>
   </p:cSld>
@@ -11597,7 +11596,7 @@
     </p:spTree>
     <p:extLst>
       <p:ext uri="{BB962C8B-B14F-4D97-AF65-F5344CB8AC3E}">
-        <p14:creationId xmlns:p14="http://schemas.microsoft.com/office/powerpoint/2010/main" val="708748187"/>
+        <p14:creationId xmlns:p14="http://schemas.microsoft.com/office/powerpoint/2010/main" xmlns="" val="708748187"/>
       </p:ext>
     </p:extLst>
   </p:cSld>
@@ -11844,7 +11843,7 @@
     </p:spTree>
     <p:extLst>
       <p:ext uri="{BB962C8B-B14F-4D97-AF65-F5344CB8AC3E}">
-        <p14:creationId xmlns:p14="http://schemas.microsoft.com/office/powerpoint/2010/main" val="355606220"/>
+        <p14:creationId xmlns:p14="http://schemas.microsoft.com/office/powerpoint/2010/main" xmlns="" val="355606220"/>
       </p:ext>
     </p:extLst>
   </p:cSld>
@@ -12068,7 +12067,7 @@
     </p:spTree>
     <p:extLst>
       <p:ext uri="{BB962C8B-B14F-4D97-AF65-F5344CB8AC3E}">
-        <p14:creationId xmlns:p14="http://schemas.microsoft.com/office/powerpoint/2010/main" val="3287968588"/>
+        <p14:creationId xmlns:p14="http://schemas.microsoft.com/office/powerpoint/2010/main" xmlns="" val="3287968588"/>
       </p:ext>
     </p:extLst>
   </p:cSld>
@@ -12208,7 +12207,7 @@
     </p:spTree>
     <p:extLst>
       <p:ext uri="{BB962C8B-B14F-4D97-AF65-F5344CB8AC3E}">
-        <p14:creationId xmlns:p14="http://schemas.microsoft.com/office/powerpoint/2010/main" val="2397622062"/>
+        <p14:creationId xmlns:p14="http://schemas.microsoft.com/office/powerpoint/2010/main" xmlns="" val="2397622062"/>
       </p:ext>
     </p:extLst>
   </p:cSld>
@@ -12358,7 +12357,7 @@
     </p:spTree>
     <p:extLst>
       <p:ext uri="{BB962C8B-B14F-4D97-AF65-F5344CB8AC3E}">
-        <p14:creationId xmlns:p14="http://schemas.microsoft.com/office/powerpoint/2010/main" val="500325477"/>
+        <p14:creationId xmlns:p14="http://schemas.microsoft.com/office/powerpoint/2010/main" xmlns="" val="500325477"/>
       </p:ext>
     </p:extLst>
   </p:cSld>
@@ -12516,7 +12515,7 @@
     </p:spTree>
     <p:extLst>
       <p:ext uri="{BB962C8B-B14F-4D97-AF65-F5344CB8AC3E}">
-        <p14:creationId xmlns:p14="http://schemas.microsoft.com/office/powerpoint/2010/main" val="1707509036"/>
+        <p14:creationId xmlns:p14="http://schemas.microsoft.com/office/powerpoint/2010/main" xmlns="" val="1707509036"/>
       </p:ext>
     </p:extLst>
   </p:cSld>
@@ -12656,7 +12655,7 @@
     </p:spTree>
     <p:extLst>
       <p:ext uri="{BB962C8B-B14F-4D97-AF65-F5344CB8AC3E}">
-        <p14:creationId xmlns:p14="http://schemas.microsoft.com/office/powerpoint/2010/main" val="14978219"/>
+        <p14:creationId xmlns:p14="http://schemas.microsoft.com/office/powerpoint/2010/main" xmlns="" val="14978219"/>
       </p:ext>
     </p:extLst>
   </p:cSld>
@@ -12818,7 +12817,7 @@
     </p:spTree>
     <p:extLst>
       <p:ext uri="{BB962C8B-B14F-4D97-AF65-F5344CB8AC3E}">
-        <p14:creationId xmlns:p14="http://schemas.microsoft.com/office/powerpoint/2010/main" val="3086016828"/>
+        <p14:creationId xmlns:p14="http://schemas.microsoft.com/office/powerpoint/2010/main" xmlns="" val="3086016828"/>
       </p:ext>
     </p:extLst>
   </p:cSld>
@@ -12883,7 +12882,7 @@
     </p:spTree>
     <p:extLst>
       <p:ext uri="{BB962C8B-B14F-4D97-AF65-F5344CB8AC3E}">
-        <p14:creationId xmlns:p14="http://schemas.microsoft.com/office/powerpoint/2010/main" val="794586704"/>
+        <p14:creationId xmlns:p14="http://schemas.microsoft.com/office/powerpoint/2010/main" xmlns="" val="794586704"/>
       </p:ext>
     </p:extLst>
   </p:cSld>
@@ -13141,7 +13140,7 @@
     </p:spTree>
     <p:extLst>
       <p:ext uri="{BB962C8B-B14F-4D97-AF65-F5344CB8AC3E}">
-        <p14:creationId xmlns:p14="http://schemas.microsoft.com/office/powerpoint/2010/main" val="1464673773"/>
+        <p14:creationId xmlns:p14="http://schemas.microsoft.com/office/powerpoint/2010/main" xmlns="" val="1464673773"/>
       </p:ext>
     </p:extLst>
   </p:cSld>
@@ -13538,7 +13537,7 @@
     </p:spTree>
     <p:extLst>
       <p:ext uri="{BB962C8B-B14F-4D97-AF65-F5344CB8AC3E}">
-        <p14:creationId xmlns:p14="http://schemas.microsoft.com/office/powerpoint/2010/main" val="4007927986"/>
+        <p14:creationId xmlns:p14="http://schemas.microsoft.com/office/powerpoint/2010/main" xmlns="" val="4007927986"/>
       </p:ext>
     </p:extLst>
   </p:cSld>
@@ -13626,7 +13625,7 @@
     </p:spTree>
     <p:extLst>
       <p:ext uri="{BB962C8B-B14F-4D97-AF65-F5344CB8AC3E}">
-        <p14:creationId xmlns:p14="http://schemas.microsoft.com/office/powerpoint/2010/main" val="2369498512"/>
+        <p14:creationId xmlns:p14="http://schemas.microsoft.com/office/powerpoint/2010/main" xmlns="" val="2369498512"/>
       </p:ext>
     </p:extLst>
   </p:cSld>
@@ -13691,7 +13690,7 @@
     </p:spTree>
     <p:extLst>
       <p:ext uri="{BB962C8B-B14F-4D97-AF65-F5344CB8AC3E}">
-        <p14:creationId xmlns:p14="http://schemas.microsoft.com/office/powerpoint/2010/main" val="627966882"/>
+        <p14:creationId xmlns:p14="http://schemas.microsoft.com/office/powerpoint/2010/main" xmlns="" val="627966882"/>
       </p:ext>
     </p:extLst>
   </p:cSld>
@@ -13938,7 +13937,7 @@
     </p:spTree>
     <p:extLst>
       <p:ext uri="{BB962C8B-B14F-4D97-AF65-F5344CB8AC3E}">
-        <p14:creationId xmlns:p14="http://schemas.microsoft.com/office/powerpoint/2010/main" val="2884071770"/>
+        <p14:creationId xmlns:p14="http://schemas.microsoft.com/office/powerpoint/2010/main" xmlns="" val="2884071770"/>
       </p:ext>
     </p:extLst>
   </p:cSld>
@@ -14162,7 +14161,7 @@
     </p:spTree>
     <p:extLst>
       <p:ext uri="{BB962C8B-B14F-4D97-AF65-F5344CB8AC3E}">
-        <p14:creationId xmlns:p14="http://schemas.microsoft.com/office/powerpoint/2010/main" val="2382201053"/>
+        <p14:creationId xmlns:p14="http://schemas.microsoft.com/office/powerpoint/2010/main" xmlns="" val="2382201053"/>
       </p:ext>
     </p:extLst>
   </p:cSld>
@@ -14302,7 +14301,7 @@
     </p:spTree>
     <p:extLst>
       <p:ext uri="{BB962C8B-B14F-4D97-AF65-F5344CB8AC3E}">
-        <p14:creationId xmlns:p14="http://schemas.microsoft.com/office/powerpoint/2010/main" val="1558728425"/>
+        <p14:creationId xmlns:p14="http://schemas.microsoft.com/office/powerpoint/2010/main" xmlns="" val="1558728425"/>
       </p:ext>
     </p:extLst>
   </p:cSld>
@@ -14452,7 +14451,7 @@
     </p:spTree>
     <p:extLst>
       <p:ext uri="{BB962C8B-B14F-4D97-AF65-F5344CB8AC3E}">
-        <p14:creationId xmlns:p14="http://schemas.microsoft.com/office/powerpoint/2010/main" val="1487214872"/>
+        <p14:creationId xmlns:p14="http://schemas.microsoft.com/office/powerpoint/2010/main" xmlns="" val="1487214872"/>
       </p:ext>
     </p:extLst>
   </p:cSld>
@@ -14610,7 +14609,7 @@
     </p:spTree>
     <p:extLst>
       <p:ext uri="{BB962C8B-B14F-4D97-AF65-F5344CB8AC3E}">
-        <p14:creationId xmlns:p14="http://schemas.microsoft.com/office/powerpoint/2010/main" val="1845573823"/>
+        <p14:creationId xmlns:p14="http://schemas.microsoft.com/office/powerpoint/2010/main" xmlns="" val="1845573823"/>
       </p:ext>
     </p:extLst>
   </p:cSld>
@@ -14750,7 +14749,7 @@
     </p:spTree>
     <p:extLst>
       <p:ext uri="{BB962C8B-B14F-4D97-AF65-F5344CB8AC3E}">
-        <p14:creationId xmlns:p14="http://schemas.microsoft.com/office/powerpoint/2010/main" val="3355737198"/>
+        <p14:creationId xmlns:p14="http://schemas.microsoft.com/office/powerpoint/2010/main" xmlns="" val="3355737198"/>
       </p:ext>
     </p:extLst>
   </p:cSld>
@@ -14997,7 +14996,7 @@
     </p:spTree>
     <p:extLst>
       <p:ext uri="{BB962C8B-B14F-4D97-AF65-F5344CB8AC3E}">
-        <p14:creationId xmlns:p14="http://schemas.microsoft.com/office/powerpoint/2010/main" val="875243959"/>
+        <p14:creationId xmlns:p14="http://schemas.microsoft.com/office/powerpoint/2010/main" xmlns="" val="875243959"/>
       </p:ext>
     </p:extLst>
   </p:cSld>
@@ -15159,7 +15158,7 @@
     </p:spTree>
     <p:extLst>
       <p:ext uri="{BB962C8B-B14F-4D97-AF65-F5344CB8AC3E}">
-        <p14:creationId xmlns:p14="http://schemas.microsoft.com/office/powerpoint/2010/main" val="3680137596"/>
+        <p14:creationId xmlns:p14="http://schemas.microsoft.com/office/powerpoint/2010/main" xmlns="" val="3680137596"/>
       </p:ext>
     </p:extLst>
   </p:cSld>
@@ -15417,7 +15416,7 @@
     </p:spTree>
     <p:extLst>
       <p:ext uri="{BB962C8B-B14F-4D97-AF65-F5344CB8AC3E}">
-        <p14:creationId xmlns:p14="http://schemas.microsoft.com/office/powerpoint/2010/main" val="1108519671"/>
+        <p14:creationId xmlns:p14="http://schemas.microsoft.com/office/powerpoint/2010/main" xmlns="" val="1108519671"/>
       </p:ext>
     </p:extLst>
   </p:cSld>
@@ -15814,7 +15813,7 @@
     </p:spTree>
     <p:extLst>
       <p:ext uri="{BB962C8B-B14F-4D97-AF65-F5344CB8AC3E}">
-        <p14:creationId xmlns:p14="http://schemas.microsoft.com/office/powerpoint/2010/main" val="231715003"/>
+        <p14:creationId xmlns:p14="http://schemas.microsoft.com/office/powerpoint/2010/main" xmlns="" val="231715003"/>
       </p:ext>
     </p:extLst>
   </p:cSld>
@@ -15902,7 +15901,7 @@
     </p:spTree>
     <p:extLst>
       <p:ext uri="{BB962C8B-B14F-4D97-AF65-F5344CB8AC3E}">
-        <p14:creationId xmlns:p14="http://schemas.microsoft.com/office/powerpoint/2010/main" val="3132377031"/>
+        <p14:creationId xmlns:p14="http://schemas.microsoft.com/office/powerpoint/2010/main" xmlns="" val="3132377031"/>
       </p:ext>
     </p:extLst>
   </p:cSld>
@@ -15967,7 +15966,7 @@
     </p:spTree>
     <p:extLst>
       <p:ext uri="{BB962C8B-B14F-4D97-AF65-F5344CB8AC3E}">
-        <p14:creationId xmlns:p14="http://schemas.microsoft.com/office/powerpoint/2010/main" val="1561870410"/>
+        <p14:creationId xmlns:p14="http://schemas.microsoft.com/office/powerpoint/2010/main" xmlns="" val="1561870410"/>
       </p:ext>
     </p:extLst>
   </p:cSld>
@@ -16214,7 +16213,7 @@
     </p:spTree>
     <p:extLst>
       <p:ext uri="{BB962C8B-B14F-4D97-AF65-F5344CB8AC3E}">
-        <p14:creationId xmlns:p14="http://schemas.microsoft.com/office/powerpoint/2010/main" val="4123810915"/>
+        <p14:creationId xmlns:p14="http://schemas.microsoft.com/office/powerpoint/2010/main" xmlns="" val="4123810915"/>
       </p:ext>
     </p:extLst>
   </p:cSld>
@@ -16438,7 +16437,7 @@
     </p:spTree>
     <p:extLst>
       <p:ext uri="{BB962C8B-B14F-4D97-AF65-F5344CB8AC3E}">
-        <p14:creationId xmlns:p14="http://schemas.microsoft.com/office/powerpoint/2010/main" val="2314786304"/>
+        <p14:creationId xmlns:p14="http://schemas.microsoft.com/office/powerpoint/2010/main" xmlns="" val="2314786304"/>
       </p:ext>
     </p:extLst>
   </p:cSld>
@@ -16578,7 +16577,7 @@
     </p:spTree>
     <p:extLst>
       <p:ext uri="{BB962C8B-B14F-4D97-AF65-F5344CB8AC3E}">
-        <p14:creationId xmlns:p14="http://schemas.microsoft.com/office/powerpoint/2010/main" val="647668894"/>
+        <p14:creationId xmlns:p14="http://schemas.microsoft.com/office/powerpoint/2010/main" xmlns="" val="647668894"/>
       </p:ext>
     </p:extLst>
   </p:cSld>
@@ -16728,7 +16727,7 @@
     </p:spTree>
     <p:extLst>
       <p:ext uri="{BB962C8B-B14F-4D97-AF65-F5344CB8AC3E}">
-        <p14:creationId xmlns:p14="http://schemas.microsoft.com/office/powerpoint/2010/main" val="3344032714"/>
+        <p14:creationId xmlns:p14="http://schemas.microsoft.com/office/powerpoint/2010/main" xmlns="" val="3344032714"/>
       </p:ext>
     </p:extLst>
   </p:cSld>
@@ -16914,7 +16913,7 @@
     </p:spTree>
     <p:extLst>
       <p:ext uri="{BB962C8B-B14F-4D97-AF65-F5344CB8AC3E}">
-        <p14:creationId xmlns:p14="http://schemas.microsoft.com/office/powerpoint/2010/main" val="4267955890"/>
+        <p14:creationId xmlns:p14="http://schemas.microsoft.com/office/powerpoint/2010/main" xmlns="" val="4267955890"/>
       </p:ext>
     </p:extLst>
   </p:cSld>
@@ -17141,7 +17140,7 @@
     </p:spTree>
     <p:extLst>
       <p:ext uri="{BB962C8B-B14F-4D97-AF65-F5344CB8AC3E}">
-        <p14:creationId xmlns:p14="http://schemas.microsoft.com/office/powerpoint/2010/main" val="26561718"/>
+        <p14:creationId xmlns:p14="http://schemas.microsoft.com/office/powerpoint/2010/main" xmlns="" val="26561718"/>
       </p:ext>
     </p:extLst>
   </p:cSld>
@@ -17309,7 +17308,7 @@
     </p:spTree>
     <p:extLst>
       <p:ext uri="{BB962C8B-B14F-4D97-AF65-F5344CB8AC3E}">
-        <p14:creationId xmlns:p14="http://schemas.microsoft.com/office/powerpoint/2010/main" val="1446824680"/>
+        <p14:creationId xmlns:p14="http://schemas.microsoft.com/office/powerpoint/2010/main" xmlns="" val="1446824680"/>
       </p:ext>
     </p:extLst>
   </p:cSld>
@@ -17499,7 +17498,7 @@
     </p:spTree>
     <p:extLst>
       <p:ext uri="{BB962C8B-B14F-4D97-AF65-F5344CB8AC3E}">
-        <p14:creationId xmlns:p14="http://schemas.microsoft.com/office/powerpoint/2010/main" val="1003846791"/>
+        <p14:creationId xmlns:p14="http://schemas.microsoft.com/office/powerpoint/2010/main" xmlns="" val="1003846791"/>
       </p:ext>
     </p:extLst>
   </p:cSld>
@@ -17785,7 +17784,7 @@
     </p:spTree>
     <p:extLst>
       <p:ext uri="{BB962C8B-B14F-4D97-AF65-F5344CB8AC3E}">
-        <p14:creationId xmlns:p14="http://schemas.microsoft.com/office/powerpoint/2010/main" val="3887997087"/>
+        <p14:creationId xmlns:p14="http://schemas.microsoft.com/office/powerpoint/2010/main" xmlns="" val="3887997087"/>
       </p:ext>
     </p:extLst>
   </p:cSld>
@@ -18210,7 +18209,7 @@
     </p:spTree>
     <p:extLst>
       <p:ext uri="{BB962C8B-B14F-4D97-AF65-F5344CB8AC3E}">
-        <p14:creationId xmlns:p14="http://schemas.microsoft.com/office/powerpoint/2010/main" val="3220501225"/>
+        <p14:creationId xmlns:p14="http://schemas.microsoft.com/office/powerpoint/2010/main" xmlns="" val="3220501225"/>
       </p:ext>
     </p:extLst>
   </p:cSld>
@@ -18326,7 +18325,7 @@
     </p:spTree>
     <p:extLst>
       <p:ext uri="{BB962C8B-B14F-4D97-AF65-F5344CB8AC3E}">
-        <p14:creationId xmlns:p14="http://schemas.microsoft.com/office/powerpoint/2010/main" val="4118900717"/>
+        <p14:creationId xmlns:p14="http://schemas.microsoft.com/office/powerpoint/2010/main" xmlns="" val="4118900717"/>
       </p:ext>
     </p:extLst>
   </p:cSld>
@@ -18419,7 +18418,7 @@
     </p:spTree>
     <p:extLst>
       <p:ext uri="{BB962C8B-B14F-4D97-AF65-F5344CB8AC3E}">
-        <p14:creationId xmlns:p14="http://schemas.microsoft.com/office/powerpoint/2010/main" val="3060649283"/>
+        <p14:creationId xmlns:p14="http://schemas.microsoft.com/office/powerpoint/2010/main" xmlns="" val="3060649283"/>
       </p:ext>
     </p:extLst>
   </p:cSld>
@@ -18694,7 +18693,7 @@
     </p:spTree>
     <p:extLst>
       <p:ext uri="{BB962C8B-B14F-4D97-AF65-F5344CB8AC3E}">
-        <p14:creationId xmlns:p14="http://schemas.microsoft.com/office/powerpoint/2010/main" val="2696882754"/>
+        <p14:creationId xmlns:p14="http://schemas.microsoft.com/office/powerpoint/2010/main" xmlns="" val="2696882754"/>
       </p:ext>
     </p:extLst>
   </p:cSld>
@@ -18946,7 +18945,7 @@
     </p:spTree>
     <p:extLst>
       <p:ext uri="{BB962C8B-B14F-4D97-AF65-F5344CB8AC3E}">
-        <p14:creationId xmlns:p14="http://schemas.microsoft.com/office/powerpoint/2010/main" val="2511955680"/>
+        <p14:creationId xmlns:p14="http://schemas.microsoft.com/office/powerpoint/2010/main" xmlns="" val="2511955680"/>
       </p:ext>
     </p:extLst>
   </p:cSld>
@@ -19114,7 +19113,7 @@
     </p:spTree>
     <p:extLst>
       <p:ext uri="{BB962C8B-B14F-4D97-AF65-F5344CB8AC3E}">
-        <p14:creationId xmlns:p14="http://schemas.microsoft.com/office/powerpoint/2010/main" val="2732658991"/>
+        <p14:creationId xmlns:p14="http://schemas.microsoft.com/office/powerpoint/2010/main" xmlns="" val="2732658991"/>
       </p:ext>
     </p:extLst>
   </p:cSld>
@@ -19292,7 +19291,7 @@
     </p:spTree>
     <p:extLst>
       <p:ext uri="{BB962C8B-B14F-4D97-AF65-F5344CB8AC3E}">
-        <p14:creationId xmlns:p14="http://schemas.microsoft.com/office/powerpoint/2010/main" val="3152435923"/>
+        <p14:creationId xmlns:p14="http://schemas.microsoft.com/office/powerpoint/2010/main" xmlns="" val="3152435923"/>
       </p:ext>
     </p:extLst>
   </p:cSld>
@@ -19358,14 +19357,14 @@
           <a:effectLst/>
           <a:extLst>
             <a:ext uri="{909E8E84-426E-40dd-AFC4-6F175D3DCCD1}">
-              <a14:hiddenFill xmlns:a14="http://schemas.microsoft.com/office/drawing/2010/main">
+              <a14:hiddenFill xmlns:a14="http://schemas.microsoft.com/office/drawing/2010/main" xmlns="">
                 <a:solidFill>
                   <a:srgbClr val="FFFFFF"/>
                 </a:solidFill>
               </a14:hiddenFill>
             </a:ext>
             <a:ext uri="{91240B29-F687-4f45-9708-019B960494DF}">
-              <a14:hiddenLine xmlns:a14="http://schemas.microsoft.com/office/drawing/2010/main" w="9525" cap="flat">
+              <a14:hiddenLine xmlns:a14="http://schemas.microsoft.com/office/drawing/2010/main" xmlns="" w="9525" cap="flat">
                 <a:solidFill>
                   <a:srgbClr val="808080"/>
                 </a:solidFill>
@@ -19375,7 +19374,7 @@
               </a14:hiddenLine>
             </a:ext>
             <a:ext uri="{AF507438-7753-43e0-B8FC-AC1667EBCBE1}">
-              <a14:hiddenEffects xmlns:a14="http://schemas.microsoft.com/office/drawing/2010/main">
+              <a14:hiddenEffects xmlns:a14="http://schemas.microsoft.com/office/drawing/2010/main" xmlns="">
                 <a:effectLst>
                   <a:outerShdw blurRad="63500" dist="38099" dir="2700000" algn="ctr" rotWithShape="0">
                     <a:schemeClr val="bg2">
@@ -19386,7 +19385,7 @@
               </a14:hiddenEffects>
             </a:ext>
             <a:ext uri="{FAA26D3D-D897-4be2-8F04-BA451C77F1D7}">
-              <ma14:placeholderFlag xmlns:ma14="http://schemas.microsoft.com/office/mac/drawingml/2011/main" val="1"/>
+              <ma14:placeholderFlag xmlns:ma14="http://schemas.microsoft.com/office/mac/drawingml/2011/main" xmlns="" val="1"/>
             </a:ext>
           </a:extLst>
         </p:spPr>
@@ -19431,14 +19430,14 @@
           <a:effectLst/>
           <a:extLst>
             <a:ext uri="{909E8E84-426E-40dd-AFC4-6F175D3DCCD1}">
-              <a14:hiddenFill xmlns:a14="http://schemas.microsoft.com/office/drawing/2010/main">
+              <a14:hiddenFill xmlns:a14="http://schemas.microsoft.com/office/drawing/2010/main" xmlns="">
                 <a:solidFill>
                   <a:srgbClr val="FFFFFF"/>
                 </a:solidFill>
               </a14:hiddenFill>
             </a:ext>
             <a:ext uri="{91240B29-F687-4f45-9708-019B960494DF}">
-              <a14:hiddenLine xmlns:a14="http://schemas.microsoft.com/office/drawing/2010/main" w="9525" cap="flat">
+              <a14:hiddenLine xmlns:a14="http://schemas.microsoft.com/office/drawing/2010/main" xmlns="" w="9525" cap="flat">
                 <a:solidFill>
                   <a:srgbClr val="808080"/>
                 </a:solidFill>
@@ -19448,7 +19447,7 @@
               </a14:hiddenLine>
             </a:ext>
             <a:ext uri="{AF507438-7753-43e0-B8FC-AC1667EBCBE1}">
-              <a14:hiddenEffects xmlns:a14="http://schemas.microsoft.com/office/drawing/2010/main">
+              <a14:hiddenEffects xmlns:a14="http://schemas.microsoft.com/office/drawing/2010/main" xmlns="">
                 <a:effectLst>
                   <a:outerShdw blurRad="63500" dist="38099" dir="2700000" algn="ctr" rotWithShape="0">
                     <a:schemeClr val="bg2">
@@ -19459,7 +19458,7 @@
               </a14:hiddenEffects>
             </a:ext>
             <a:ext uri="{FAA26D3D-D897-4be2-8F04-BA451C77F1D7}">
-              <ma14:placeholderFlag xmlns:ma14="http://schemas.microsoft.com/office/mac/drawingml/2011/main" val="1"/>
+              <ma14:placeholderFlag xmlns:ma14="http://schemas.microsoft.com/office/mac/drawingml/2011/main" xmlns="" val="1"/>
             </a:ext>
           </a:extLst>
         </p:spPr>
@@ -19560,14 +19559,14 @@
           <a:effectLst/>
           <a:extLst>
             <a:ext uri="{909E8E84-426E-40dd-AFC4-6F175D3DCCD1}">
-              <a14:hiddenFill xmlns:a14="http://schemas.microsoft.com/office/drawing/2010/main">
+              <a14:hiddenFill xmlns:a14="http://schemas.microsoft.com/office/drawing/2010/main" xmlns="">
                 <a:solidFill>
                   <a:srgbClr val="FFFFFF"/>
                 </a:solidFill>
               </a14:hiddenFill>
             </a:ext>
             <a:ext uri="{91240B29-F687-4f45-9708-019B960494DF}">
-              <a14:hiddenLine xmlns:a14="http://schemas.microsoft.com/office/drawing/2010/main" w="9525" cap="flat">
+              <a14:hiddenLine xmlns:a14="http://schemas.microsoft.com/office/drawing/2010/main" xmlns="" w="9525" cap="flat">
                 <a:solidFill>
                   <a:srgbClr val="808080"/>
                 </a:solidFill>
@@ -19577,7 +19576,7 @@
               </a14:hiddenLine>
             </a:ext>
             <a:ext uri="{AF507438-7753-43e0-B8FC-AC1667EBCBE1}">
-              <a14:hiddenEffects xmlns:a14="http://schemas.microsoft.com/office/drawing/2010/main">
+              <a14:hiddenEffects xmlns:a14="http://schemas.microsoft.com/office/drawing/2010/main" xmlns="">
                 <a:effectLst>
                   <a:outerShdw blurRad="63500" dist="38099" dir="2700000" algn="ctr" rotWithShape="0">
                     <a:schemeClr val="bg2">
@@ -19588,7 +19587,7 @@
               </a14:hiddenEffects>
             </a:ext>
             <a:ext uri="{FAA26D3D-D897-4be2-8F04-BA451C77F1D7}">
-              <ma14:placeholderFlag xmlns:ma14="http://schemas.microsoft.com/office/mac/drawingml/2011/main" val="1"/>
+              <ma14:placeholderFlag xmlns:ma14="http://schemas.microsoft.com/office/mac/drawingml/2011/main" xmlns="" val="1"/>
             </a:ext>
           </a:extLst>
         </p:spPr>
@@ -20183,14 +20182,14 @@
           <a:effectLst/>
           <a:extLst>
             <a:ext uri="{909E8E84-426E-40dd-AFC4-6F175D3DCCD1}">
-              <a14:hiddenFill xmlns:a14="http://schemas.microsoft.com/office/drawing/2010/main">
+              <a14:hiddenFill xmlns:a14="http://schemas.microsoft.com/office/drawing/2010/main" xmlns="">
                 <a:solidFill>
                   <a:srgbClr val="FFFFFF"/>
                 </a:solidFill>
               </a14:hiddenFill>
             </a:ext>
             <a:ext uri="{91240B29-F687-4f45-9708-019B960494DF}">
-              <a14:hiddenLine xmlns:a14="http://schemas.microsoft.com/office/drawing/2010/main" w="9525" cap="flat">
+              <a14:hiddenLine xmlns:a14="http://schemas.microsoft.com/office/drawing/2010/main" xmlns="" w="9525" cap="flat">
                 <a:solidFill>
                   <a:srgbClr val="808080"/>
                 </a:solidFill>
@@ -20200,7 +20199,7 @@
               </a14:hiddenLine>
             </a:ext>
             <a:ext uri="{AF507438-7753-43e0-B8FC-AC1667EBCBE1}">
-              <a14:hiddenEffects xmlns:a14="http://schemas.microsoft.com/office/drawing/2010/main">
+              <a14:hiddenEffects xmlns:a14="http://schemas.microsoft.com/office/drawing/2010/main" xmlns="">
                 <a:effectLst>
                   <a:outerShdw blurRad="63500" dist="38099" dir="2700000" algn="ctr" rotWithShape="0">
                     <a:schemeClr val="bg2">
@@ -20211,7 +20210,7 @@
               </a14:hiddenEffects>
             </a:ext>
             <a:ext uri="{FAA26D3D-D897-4be2-8F04-BA451C77F1D7}">
-              <ma14:placeholderFlag xmlns:ma14="http://schemas.microsoft.com/office/mac/drawingml/2011/main" val="1"/>
+              <ma14:placeholderFlag xmlns:ma14="http://schemas.microsoft.com/office/mac/drawingml/2011/main" xmlns="" val="1"/>
             </a:ext>
           </a:extLst>
         </p:spPr>
@@ -20256,14 +20255,14 @@
           <a:effectLst/>
           <a:extLst>
             <a:ext uri="{909E8E84-426E-40dd-AFC4-6F175D3DCCD1}">
-              <a14:hiddenFill xmlns:a14="http://schemas.microsoft.com/office/drawing/2010/main">
+              <a14:hiddenFill xmlns:a14="http://schemas.microsoft.com/office/drawing/2010/main" xmlns="">
                 <a:solidFill>
                   <a:srgbClr val="FFFFFF"/>
                 </a:solidFill>
               </a14:hiddenFill>
             </a:ext>
             <a:ext uri="{91240B29-F687-4f45-9708-019B960494DF}">
-              <a14:hiddenLine xmlns:a14="http://schemas.microsoft.com/office/drawing/2010/main" w="9525" cap="flat">
+              <a14:hiddenLine xmlns:a14="http://schemas.microsoft.com/office/drawing/2010/main" xmlns="" w="9525" cap="flat">
                 <a:solidFill>
                   <a:srgbClr val="808080"/>
                 </a:solidFill>
@@ -20273,7 +20272,7 @@
               </a14:hiddenLine>
             </a:ext>
             <a:ext uri="{AF507438-7753-43e0-B8FC-AC1667EBCBE1}">
-              <a14:hiddenEffects xmlns:a14="http://schemas.microsoft.com/office/drawing/2010/main">
+              <a14:hiddenEffects xmlns:a14="http://schemas.microsoft.com/office/drawing/2010/main" xmlns="">
                 <a:effectLst>
                   <a:outerShdw blurRad="63500" dist="38099" dir="2700000" algn="ctr" rotWithShape="0">
                     <a:schemeClr val="bg2">
@@ -20284,7 +20283,7 @@
               </a14:hiddenEffects>
             </a:ext>
             <a:ext uri="{FAA26D3D-D897-4be2-8F04-BA451C77F1D7}">
-              <ma14:placeholderFlag xmlns:ma14="http://schemas.microsoft.com/office/mac/drawingml/2011/main" val="1"/>
+              <ma14:placeholderFlag xmlns:ma14="http://schemas.microsoft.com/office/mac/drawingml/2011/main" xmlns="" val="1"/>
             </a:ext>
           </a:extLst>
         </p:spPr>
@@ -20385,14 +20384,14 @@
           <a:effectLst/>
           <a:extLst>
             <a:ext uri="{909E8E84-426E-40dd-AFC4-6F175D3DCCD1}">
-              <a14:hiddenFill xmlns:a14="http://schemas.microsoft.com/office/drawing/2010/main">
+              <a14:hiddenFill xmlns:a14="http://schemas.microsoft.com/office/drawing/2010/main" xmlns="">
                 <a:solidFill>
                   <a:srgbClr val="FFFFFF"/>
                 </a:solidFill>
               </a14:hiddenFill>
             </a:ext>
             <a:ext uri="{91240B29-F687-4f45-9708-019B960494DF}">
-              <a14:hiddenLine xmlns:a14="http://schemas.microsoft.com/office/drawing/2010/main" w="9525" cap="flat">
+              <a14:hiddenLine xmlns:a14="http://schemas.microsoft.com/office/drawing/2010/main" xmlns="" w="9525" cap="flat">
                 <a:solidFill>
                   <a:srgbClr val="808080"/>
                 </a:solidFill>
@@ -20402,7 +20401,7 @@
               </a14:hiddenLine>
             </a:ext>
             <a:ext uri="{AF507438-7753-43e0-B8FC-AC1667EBCBE1}">
-              <a14:hiddenEffects xmlns:a14="http://schemas.microsoft.com/office/drawing/2010/main">
+              <a14:hiddenEffects xmlns:a14="http://schemas.microsoft.com/office/drawing/2010/main" xmlns="">
                 <a:effectLst>
                   <a:outerShdw blurRad="63500" dist="38099" dir="2700000" algn="ctr" rotWithShape="0">
                     <a:schemeClr val="bg2">
@@ -20413,7 +20412,7 @@
               </a14:hiddenEffects>
             </a:ext>
             <a:ext uri="{FAA26D3D-D897-4be2-8F04-BA451C77F1D7}">
-              <ma14:placeholderFlag xmlns:ma14="http://schemas.microsoft.com/office/mac/drawingml/2011/main" val="1"/>
+              <ma14:placeholderFlag xmlns:ma14="http://schemas.microsoft.com/office/mac/drawingml/2011/main" xmlns="" val="1"/>
             </a:ext>
           </a:extLst>
         </p:spPr>
@@ -20459,7 +20458,7 @@
     </p:spTree>
     <p:extLst>
       <p:ext uri="{BB962C8B-B14F-4D97-AF65-F5344CB8AC3E}">
-        <p14:creationId xmlns:p14="http://schemas.microsoft.com/office/powerpoint/2010/main" val="4128080326"/>
+        <p14:creationId xmlns:p14="http://schemas.microsoft.com/office/powerpoint/2010/main" xmlns="" val="4128080326"/>
       </p:ext>
     </p:extLst>
   </p:cSld>
@@ -21013,14 +21012,14 @@
           <a:effectLst/>
           <a:extLst>
             <a:ext uri="{909E8E84-426E-40dd-AFC4-6F175D3DCCD1}">
-              <a14:hiddenFill xmlns:a14="http://schemas.microsoft.com/office/drawing/2010/main">
+              <a14:hiddenFill xmlns:a14="http://schemas.microsoft.com/office/drawing/2010/main" xmlns="">
                 <a:solidFill>
                   <a:srgbClr val="FFFFFF"/>
                 </a:solidFill>
               </a14:hiddenFill>
             </a:ext>
             <a:ext uri="{91240B29-F687-4f45-9708-019B960494DF}">
-              <a14:hiddenLine xmlns:a14="http://schemas.microsoft.com/office/drawing/2010/main" w="9525" cap="flat">
+              <a14:hiddenLine xmlns:a14="http://schemas.microsoft.com/office/drawing/2010/main" xmlns="" w="9525" cap="flat">
                 <a:solidFill>
                   <a:srgbClr val="808080"/>
                 </a:solidFill>
@@ -21030,7 +21029,7 @@
               </a14:hiddenLine>
             </a:ext>
             <a:ext uri="{AF507438-7753-43e0-B8FC-AC1667EBCBE1}">
-              <a14:hiddenEffects xmlns:a14="http://schemas.microsoft.com/office/drawing/2010/main">
+              <a14:hiddenEffects xmlns:a14="http://schemas.microsoft.com/office/drawing/2010/main" xmlns="">
                 <a:effectLst>
                   <a:outerShdw blurRad="63500" dist="38099" dir="2700000" algn="ctr" rotWithShape="0">
                     <a:schemeClr val="bg2">
@@ -21041,7 +21040,7 @@
               </a14:hiddenEffects>
             </a:ext>
             <a:ext uri="{FAA26D3D-D897-4be2-8F04-BA451C77F1D7}">
-              <ma14:placeholderFlag xmlns:ma14="http://schemas.microsoft.com/office/mac/drawingml/2011/main" val="1"/>
+              <ma14:placeholderFlag xmlns:ma14="http://schemas.microsoft.com/office/mac/drawingml/2011/main" xmlns="" val="1"/>
             </a:ext>
           </a:extLst>
         </p:spPr>
@@ -21086,14 +21085,14 @@
           <a:effectLst/>
           <a:extLst>
             <a:ext uri="{909E8E84-426E-40dd-AFC4-6F175D3DCCD1}">
-              <a14:hiddenFill xmlns:a14="http://schemas.microsoft.com/office/drawing/2010/main">
+              <a14:hiddenFill xmlns:a14="http://schemas.microsoft.com/office/drawing/2010/main" xmlns="">
                 <a:solidFill>
                   <a:srgbClr val="FFFFFF"/>
                 </a:solidFill>
               </a14:hiddenFill>
             </a:ext>
             <a:ext uri="{91240B29-F687-4f45-9708-019B960494DF}">
-              <a14:hiddenLine xmlns:a14="http://schemas.microsoft.com/office/drawing/2010/main" w="9525" cap="flat">
+              <a14:hiddenLine xmlns:a14="http://schemas.microsoft.com/office/drawing/2010/main" xmlns="" w="9525" cap="flat">
                 <a:solidFill>
                   <a:srgbClr val="808080"/>
                 </a:solidFill>
@@ -21103,7 +21102,7 @@
               </a14:hiddenLine>
             </a:ext>
             <a:ext uri="{AF507438-7753-43e0-B8FC-AC1667EBCBE1}">
-              <a14:hiddenEffects xmlns:a14="http://schemas.microsoft.com/office/drawing/2010/main">
+              <a14:hiddenEffects xmlns:a14="http://schemas.microsoft.com/office/drawing/2010/main" xmlns="">
                 <a:effectLst>
                   <a:outerShdw blurRad="63500" dist="38099" dir="2700000" algn="ctr" rotWithShape="0">
                     <a:schemeClr val="bg2">
@@ -21114,7 +21113,7 @@
               </a14:hiddenEffects>
             </a:ext>
             <a:ext uri="{FAA26D3D-D897-4be2-8F04-BA451C77F1D7}">
-              <ma14:placeholderFlag xmlns:ma14="http://schemas.microsoft.com/office/mac/drawingml/2011/main" val="1"/>
+              <ma14:placeholderFlag xmlns:ma14="http://schemas.microsoft.com/office/mac/drawingml/2011/main" xmlns="" val="1"/>
             </a:ext>
           </a:extLst>
         </p:spPr>
@@ -21215,14 +21214,14 @@
           <a:effectLst/>
           <a:extLst>
             <a:ext uri="{909E8E84-426E-40dd-AFC4-6F175D3DCCD1}">
-              <a14:hiddenFill xmlns:a14="http://schemas.microsoft.com/office/drawing/2010/main">
+              <a14:hiddenFill xmlns:a14="http://schemas.microsoft.com/office/drawing/2010/main" xmlns="">
                 <a:solidFill>
                   <a:srgbClr val="FFFFFF"/>
                 </a:solidFill>
               </a14:hiddenFill>
             </a:ext>
             <a:ext uri="{91240B29-F687-4f45-9708-019B960494DF}">
-              <a14:hiddenLine xmlns:a14="http://schemas.microsoft.com/office/drawing/2010/main" w="9525" cap="flat">
+              <a14:hiddenLine xmlns:a14="http://schemas.microsoft.com/office/drawing/2010/main" xmlns="" w="9525" cap="flat">
                 <a:solidFill>
                   <a:srgbClr val="808080"/>
                 </a:solidFill>
@@ -21232,7 +21231,7 @@
               </a14:hiddenLine>
             </a:ext>
             <a:ext uri="{AF507438-7753-43e0-B8FC-AC1667EBCBE1}">
-              <a14:hiddenEffects xmlns:a14="http://schemas.microsoft.com/office/drawing/2010/main">
+              <a14:hiddenEffects xmlns:a14="http://schemas.microsoft.com/office/drawing/2010/main" xmlns="">
                 <a:effectLst>
                   <a:outerShdw blurRad="63500" dist="38099" dir="2700000" algn="ctr" rotWithShape="0">
                     <a:schemeClr val="bg2">
@@ -21243,7 +21242,7 @@
               </a14:hiddenEffects>
             </a:ext>
             <a:ext uri="{FAA26D3D-D897-4be2-8F04-BA451C77F1D7}">
-              <ma14:placeholderFlag xmlns:ma14="http://schemas.microsoft.com/office/mac/drawingml/2011/main" val="1"/>
+              <ma14:placeholderFlag xmlns:ma14="http://schemas.microsoft.com/office/mac/drawingml/2011/main" xmlns="" val="1"/>
             </a:ext>
           </a:extLst>
         </p:spPr>
@@ -21838,14 +21837,14 @@
           <a:effectLst/>
           <a:extLst>
             <a:ext uri="{909E8E84-426E-40dd-AFC4-6F175D3DCCD1}">
-              <a14:hiddenFill xmlns:a14="http://schemas.microsoft.com/office/drawing/2010/main">
+              <a14:hiddenFill xmlns:a14="http://schemas.microsoft.com/office/drawing/2010/main" xmlns="">
                 <a:solidFill>
                   <a:srgbClr val="FFFFFF"/>
                 </a:solidFill>
               </a14:hiddenFill>
             </a:ext>
             <a:ext uri="{91240B29-F687-4f45-9708-019B960494DF}">
-              <a14:hiddenLine xmlns:a14="http://schemas.microsoft.com/office/drawing/2010/main" w="9525" cap="flat">
+              <a14:hiddenLine xmlns:a14="http://schemas.microsoft.com/office/drawing/2010/main" xmlns="" w="9525" cap="flat">
                 <a:solidFill>
                   <a:srgbClr val="808080"/>
                 </a:solidFill>
@@ -21855,7 +21854,7 @@
               </a14:hiddenLine>
             </a:ext>
             <a:ext uri="{AF507438-7753-43e0-B8FC-AC1667EBCBE1}">
-              <a14:hiddenEffects xmlns:a14="http://schemas.microsoft.com/office/drawing/2010/main">
+              <a14:hiddenEffects xmlns:a14="http://schemas.microsoft.com/office/drawing/2010/main" xmlns="">
                 <a:effectLst>
                   <a:outerShdw blurRad="63500" dist="38099" dir="2700000" algn="ctr" rotWithShape="0">
                     <a:schemeClr val="bg2">
@@ -21866,7 +21865,7 @@
               </a14:hiddenEffects>
             </a:ext>
             <a:ext uri="{FAA26D3D-D897-4be2-8F04-BA451C77F1D7}">
-              <ma14:placeholderFlag xmlns:ma14="http://schemas.microsoft.com/office/mac/drawingml/2011/main" val="1"/>
+              <ma14:placeholderFlag xmlns:ma14="http://schemas.microsoft.com/office/mac/drawingml/2011/main" xmlns="" val="1"/>
             </a:ext>
           </a:extLst>
         </p:spPr>
@@ -21911,14 +21910,14 @@
           <a:effectLst/>
           <a:extLst>
             <a:ext uri="{909E8E84-426E-40dd-AFC4-6F175D3DCCD1}">
-              <a14:hiddenFill xmlns:a14="http://schemas.microsoft.com/office/drawing/2010/main">
+              <a14:hiddenFill xmlns:a14="http://schemas.microsoft.com/office/drawing/2010/main" xmlns="">
                 <a:solidFill>
                   <a:srgbClr val="FFFFFF"/>
                 </a:solidFill>
               </a14:hiddenFill>
             </a:ext>
             <a:ext uri="{91240B29-F687-4f45-9708-019B960494DF}">
-              <a14:hiddenLine xmlns:a14="http://schemas.microsoft.com/office/drawing/2010/main" w="9525" cap="flat">
+              <a14:hiddenLine xmlns:a14="http://schemas.microsoft.com/office/drawing/2010/main" xmlns="" w="9525" cap="flat">
                 <a:solidFill>
                   <a:srgbClr val="808080"/>
                 </a:solidFill>
@@ -21928,7 +21927,7 @@
               </a14:hiddenLine>
             </a:ext>
             <a:ext uri="{AF507438-7753-43e0-B8FC-AC1667EBCBE1}">
-              <a14:hiddenEffects xmlns:a14="http://schemas.microsoft.com/office/drawing/2010/main">
+              <a14:hiddenEffects xmlns:a14="http://schemas.microsoft.com/office/drawing/2010/main" xmlns="">
                 <a:effectLst>
                   <a:outerShdw blurRad="63500" dist="38099" dir="2700000" algn="ctr" rotWithShape="0">
                     <a:schemeClr val="bg2">
@@ -21939,7 +21938,7 @@
               </a14:hiddenEffects>
             </a:ext>
             <a:ext uri="{FAA26D3D-D897-4be2-8F04-BA451C77F1D7}">
-              <ma14:placeholderFlag xmlns:ma14="http://schemas.microsoft.com/office/mac/drawingml/2011/main" val="1"/>
+              <ma14:placeholderFlag xmlns:ma14="http://schemas.microsoft.com/office/mac/drawingml/2011/main" xmlns="" val="1"/>
             </a:ext>
           </a:extLst>
         </p:spPr>
@@ -22040,14 +22039,14 @@
           <a:effectLst/>
           <a:extLst>
             <a:ext uri="{909E8E84-426E-40dd-AFC4-6F175D3DCCD1}">
-              <a14:hiddenFill xmlns:a14="http://schemas.microsoft.com/office/drawing/2010/main">
+              <a14:hiddenFill xmlns:a14="http://schemas.microsoft.com/office/drawing/2010/main" xmlns="">
                 <a:solidFill>
                   <a:srgbClr val="FFFFFF"/>
                 </a:solidFill>
               </a14:hiddenFill>
             </a:ext>
             <a:ext uri="{91240B29-F687-4f45-9708-019B960494DF}">
-              <a14:hiddenLine xmlns:a14="http://schemas.microsoft.com/office/drawing/2010/main" w="9525" cap="flat">
+              <a14:hiddenLine xmlns:a14="http://schemas.microsoft.com/office/drawing/2010/main" xmlns="" w="9525" cap="flat">
                 <a:solidFill>
                   <a:srgbClr val="808080"/>
                 </a:solidFill>
@@ -22057,7 +22056,7 @@
               </a14:hiddenLine>
             </a:ext>
             <a:ext uri="{AF507438-7753-43e0-B8FC-AC1667EBCBE1}">
-              <a14:hiddenEffects xmlns:a14="http://schemas.microsoft.com/office/drawing/2010/main">
+              <a14:hiddenEffects xmlns:a14="http://schemas.microsoft.com/office/drawing/2010/main" xmlns="">
                 <a:effectLst>
                   <a:outerShdw blurRad="63500" dist="38099" dir="2700000" algn="ctr" rotWithShape="0">
                     <a:schemeClr val="bg2">
@@ -22068,7 +22067,7 @@
               </a14:hiddenEffects>
             </a:ext>
             <a:ext uri="{FAA26D3D-D897-4be2-8F04-BA451C77F1D7}">
-              <ma14:placeholderFlag xmlns:ma14="http://schemas.microsoft.com/office/mac/drawingml/2011/main" val="1"/>
+              <ma14:placeholderFlag xmlns:ma14="http://schemas.microsoft.com/office/mac/drawingml/2011/main" xmlns="" val="1"/>
             </a:ext>
           </a:extLst>
         </p:spPr>
@@ -22665,14 +22664,14 @@
           <a:effectLst/>
           <a:extLst>
             <a:ext uri="{909E8E84-426E-40dd-AFC4-6F175D3DCCD1}">
-              <a14:hiddenFill xmlns:a14="http://schemas.microsoft.com/office/drawing/2010/main">
+              <a14:hiddenFill xmlns:a14="http://schemas.microsoft.com/office/drawing/2010/main" xmlns="">
                 <a:solidFill>
                   <a:srgbClr val="FFFFFF"/>
                 </a:solidFill>
               </a14:hiddenFill>
             </a:ext>
             <a:ext uri="{91240B29-F687-4f45-9708-019B960494DF}">
-              <a14:hiddenLine xmlns:a14="http://schemas.microsoft.com/office/drawing/2010/main" w="9525" cap="flat">
+              <a14:hiddenLine xmlns:a14="http://schemas.microsoft.com/office/drawing/2010/main" xmlns="" w="9525" cap="flat">
                 <a:solidFill>
                   <a:srgbClr val="808080"/>
                 </a:solidFill>
@@ -22682,7 +22681,7 @@
               </a14:hiddenLine>
             </a:ext>
             <a:ext uri="{AF507438-7753-43e0-B8FC-AC1667EBCBE1}">
-              <a14:hiddenEffects xmlns:a14="http://schemas.microsoft.com/office/drawing/2010/main">
+              <a14:hiddenEffects xmlns:a14="http://schemas.microsoft.com/office/drawing/2010/main" xmlns="">
                 <a:effectLst>
                   <a:outerShdw blurRad="63500" dist="38099" dir="2700000" algn="ctr" rotWithShape="0">
                     <a:schemeClr val="bg2">
@@ -22693,7 +22692,7 @@
               </a14:hiddenEffects>
             </a:ext>
             <a:ext uri="{FAA26D3D-D897-4be2-8F04-BA451C77F1D7}">
-              <ma14:placeholderFlag xmlns:ma14="http://schemas.microsoft.com/office/mac/drawingml/2011/main" val="1"/>
+              <ma14:placeholderFlag xmlns:ma14="http://schemas.microsoft.com/office/mac/drawingml/2011/main" xmlns="" val="1"/>
             </a:ext>
           </a:extLst>
         </p:spPr>
@@ -22738,14 +22737,14 @@
           <a:effectLst/>
           <a:extLst>
             <a:ext uri="{909E8E84-426E-40dd-AFC4-6F175D3DCCD1}">
-              <a14:hiddenFill xmlns:a14="http://schemas.microsoft.com/office/drawing/2010/main">
+              <a14:hiddenFill xmlns:a14="http://schemas.microsoft.com/office/drawing/2010/main" xmlns="">
                 <a:solidFill>
                   <a:srgbClr val="FFFFFF"/>
                 </a:solidFill>
               </a14:hiddenFill>
             </a:ext>
             <a:ext uri="{91240B29-F687-4f45-9708-019B960494DF}">
-              <a14:hiddenLine xmlns:a14="http://schemas.microsoft.com/office/drawing/2010/main" w="9525" cap="flat">
+              <a14:hiddenLine xmlns:a14="http://schemas.microsoft.com/office/drawing/2010/main" xmlns="" w="9525" cap="flat">
                 <a:solidFill>
                   <a:srgbClr val="808080"/>
                 </a:solidFill>
@@ -22755,7 +22754,7 @@
               </a14:hiddenLine>
             </a:ext>
             <a:ext uri="{AF507438-7753-43e0-B8FC-AC1667EBCBE1}">
-              <a14:hiddenEffects xmlns:a14="http://schemas.microsoft.com/office/drawing/2010/main">
+              <a14:hiddenEffects xmlns:a14="http://schemas.microsoft.com/office/drawing/2010/main" xmlns="">
                 <a:effectLst>
                   <a:outerShdw blurRad="63500" dist="38099" dir="2700000" algn="ctr" rotWithShape="0">
                     <a:schemeClr val="bg2">
@@ -22766,7 +22765,7 @@
               </a14:hiddenEffects>
             </a:ext>
             <a:ext uri="{FAA26D3D-D897-4be2-8F04-BA451C77F1D7}">
-              <ma14:placeholderFlag xmlns:ma14="http://schemas.microsoft.com/office/mac/drawingml/2011/main" val="1"/>
+              <ma14:placeholderFlag xmlns:ma14="http://schemas.microsoft.com/office/mac/drawingml/2011/main" xmlns="" val="1"/>
             </a:ext>
           </a:extLst>
         </p:spPr>
@@ -22867,14 +22866,14 @@
           <a:effectLst/>
           <a:extLst>
             <a:ext uri="{909E8E84-426E-40dd-AFC4-6F175D3DCCD1}">
-              <a14:hiddenFill xmlns:a14="http://schemas.microsoft.com/office/drawing/2010/main">
+              <a14:hiddenFill xmlns:a14="http://schemas.microsoft.com/office/drawing/2010/main" xmlns="">
                 <a:solidFill>
                   <a:srgbClr val="FFFFFF"/>
                 </a:solidFill>
               </a14:hiddenFill>
             </a:ext>
             <a:ext uri="{91240B29-F687-4f45-9708-019B960494DF}">
-              <a14:hiddenLine xmlns:a14="http://schemas.microsoft.com/office/drawing/2010/main" w="9525" cap="flat">
+              <a14:hiddenLine xmlns:a14="http://schemas.microsoft.com/office/drawing/2010/main" xmlns="" w="9525" cap="flat">
                 <a:solidFill>
                   <a:srgbClr val="808080"/>
                 </a:solidFill>
@@ -22884,7 +22883,7 @@
               </a14:hiddenLine>
             </a:ext>
             <a:ext uri="{AF507438-7753-43e0-B8FC-AC1667EBCBE1}">
-              <a14:hiddenEffects xmlns:a14="http://schemas.microsoft.com/office/drawing/2010/main">
+              <a14:hiddenEffects xmlns:a14="http://schemas.microsoft.com/office/drawing/2010/main" xmlns="">
                 <a:effectLst>
                   <a:outerShdw blurRad="63500" dist="38099" dir="2700000" algn="ctr" rotWithShape="0">
                     <a:schemeClr val="bg2">
@@ -22895,7 +22894,7 @@
               </a14:hiddenEffects>
             </a:ext>
             <a:ext uri="{FAA26D3D-D897-4be2-8F04-BA451C77F1D7}">
-              <ma14:placeholderFlag xmlns:ma14="http://schemas.microsoft.com/office/mac/drawingml/2011/main" val="1"/>
+              <ma14:placeholderFlag xmlns:ma14="http://schemas.microsoft.com/office/mac/drawingml/2011/main" xmlns="" val="1"/>
             </a:ext>
           </a:extLst>
         </p:spPr>
@@ -23492,14 +23491,14 @@
           <a:effectLst/>
           <a:extLst>
             <a:ext uri="{909E8E84-426E-40dd-AFC4-6F175D3DCCD1}">
-              <a14:hiddenFill xmlns:a14="http://schemas.microsoft.com/office/drawing/2010/main">
+              <a14:hiddenFill xmlns:a14="http://schemas.microsoft.com/office/drawing/2010/main" xmlns="">
                 <a:solidFill>
                   <a:srgbClr val="FFFFFF"/>
                 </a:solidFill>
               </a14:hiddenFill>
             </a:ext>
             <a:ext uri="{91240B29-F687-4f45-9708-019B960494DF}">
-              <a14:hiddenLine xmlns:a14="http://schemas.microsoft.com/office/drawing/2010/main" w="9525" cap="flat">
+              <a14:hiddenLine xmlns:a14="http://schemas.microsoft.com/office/drawing/2010/main" xmlns="" w="9525" cap="flat">
                 <a:solidFill>
                   <a:srgbClr val="808080"/>
                 </a:solidFill>
@@ -23509,7 +23508,7 @@
               </a14:hiddenLine>
             </a:ext>
             <a:ext uri="{AF507438-7753-43e0-B8FC-AC1667EBCBE1}">
-              <a14:hiddenEffects xmlns:a14="http://schemas.microsoft.com/office/drawing/2010/main">
+              <a14:hiddenEffects xmlns:a14="http://schemas.microsoft.com/office/drawing/2010/main" xmlns="">
                 <a:effectLst>
                   <a:outerShdw blurRad="63500" dist="38099" dir="2700000" algn="ctr" rotWithShape="0">
                     <a:schemeClr val="bg2">
@@ -23520,7 +23519,7 @@
               </a14:hiddenEffects>
             </a:ext>
             <a:ext uri="{FAA26D3D-D897-4be2-8F04-BA451C77F1D7}">
-              <ma14:placeholderFlag xmlns:ma14="http://schemas.microsoft.com/office/mac/drawingml/2011/main" val="1"/>
+              <ma14:placeholderFlag xmlns:ma14="http://schemas.microsoft.com/office/mac/drawingml/2011/main" xmlns="" val="1"/>
             </a:ext>
           </a:extLst>
         </p:spPr>
@@ -23565,14 +23564,14 @@
           <a:effectLst/>
           <a:extLst>
             <a:ext uri="{909E8E84-426E-40dd-AFC4-6F175D3DCCD1}">
-              <a14:hiddenFill xmlns:a14="http://schemas.microsoft.com/office/drawing/2010/main">
+              <a14:hiddenFill xmlns:a14="http://schemas.microsoft.com/office/drawing/2010/main" xmlns="">
                 <a:solidFill>
                   <a:srgbClr val="FFFFFF"/>
                 </a:solidFill>
               </a14:hiddenFill>
             </a:ext>
             <a:ext uri="{91240B29-F687-4f45-9708-019B960494DF}">
-              <a14:hiddenLine xmlns:a14="http://schemas.microsoft.com/office/drawing/2010/main" w="9525" cap="flat">
+              <a14:hiddenLine xmlns:a14="http://schemas.microsoft.com/office/drawing/2010/main" xmlns="" w="9525" cap="flat">
                 <a:solidFill>
                   <a:srgbClr val="808080"/>
                 </a:solidFill>
@@ -23582,7 +23581,7 @@
               </a14:hiddenLine>
             </a:ext>
             <a:ext uri="{AF507438-7753-43e0-B8FC-AC1667EBCBE1}">
-              <a14:hiddenEffects xmlns:a14="http://schemas.microsoft.com/office/drawing/2010/main">
+              <a14:hiddenEffects xmlns:a14="http://schemas.microsoft.com/office/drawing/2010/main" xmlns="">
                 <a:effectLst>
                   <a:outerShdw blurRad="63500" dist="38099" dir="2700000" algn="ctr" rotWithShape="0">
                     <a:schemeClr val="bg2">
@@ -23593,7 +23592,7 @@
               </a14:hiddenEffects>
             </a:ext>
             <a:ext uri="{FAA26D3D-D897-4be2-8F04-BA451C77F1D7}">
-              <ma14:placeholderFlag xmlns:ma14="http://schemas.microsoft.com/office/mac/drawingml/2011/main" val="1"/>
+              <ma14:placeholderFlag xmlns:ma14="http://schemas.microsoft.com/office/mac/drawingml/2011/main" xmlns="" val="1"/>
             </a:ext>
           </a:extLst>
         </p:spPr>
@@ -23694,14 +23693,14 @@
           <a:effectLst/>
           <a:extLst>
             <a:ext uri="{909E8E84-426E-40dd-AFC4-6F175D3DCCD1}">
-              <a14:hiddenFill xmlns:a14="http://schemas.microsoft.com/office/drawing/2010/main">
+              <a14:hiddenFill xmlns:a14="http://schemas.microsoft.com/office/drawing/2010/main" xmlns="">
                 <a:solidFill>
                   <a:srgbClr val="FFFFFF"/>
                 </a:solidFill>
               </a14:hiddenFill>
             </a:ext>
             <a:ext uri="{91240B29-F687-4f45-9708-019B960494DF}">
-              <a14:hiddenLine xmlns:a14="http://schemas.microsoft.com/office/drawing/2010/main" w="9525" cap="flat">
+              <a14:hiddenLine xmlns:a14="http://schemas.microsoft.com/office/drawing/2010/main" xmlns="" w="9525" cap="flat">
                 <a:solidFill>
                   <a:srgbClr val="808080"/>
                 </a:solidFill>
@@ -23711,7 +23710,7 @@
               </a14:hiddenLine>
             </a:ext>
             <a:ext uri="{AF507438-7753-43e0-B8FC-AC1667EBCBE1}">
-              <a14:hiddenEffects xmlns:a14="http://schemas.microsoft.com/office/drawing/2010/main">
+              <a14:hiddenEffects xmlns:a14="http://schemas.microsoft.com/office/drawing/2010/main" xmlns="">
                 <a:effectLst>
                   <a:outerShdw blurRad="63500" dist="38099" dir="2700000" algn="ctr" rotWithShape="0">
                     <a:schemeClr val="bg2">
@@ -23722,7 +23721,7 @@
               </a14:hiddenEffects>
             </a:ext>
             <a:ext uri="{FAA26D3D-D897-4be2-8F04-BA451C77F1D7}">
-              <ma14:placeholderFlag xmlns:ma14="http://schemas.microsoft.com/office/mac/drawingml/2011/main" val="1"/>
+              <ma14:placeholderFlag xmlns:ma14="http://schemas.microsoft.com/office/mac/drawingml/2011/main" xmlns="" val="1"/>
             </a:ext>
           </a:extLst>
         </p:spPr>
@@ -24319,14 +24318,14 @@
           <a:effectLst/>
           <a:extLst>
             <a:ext uri="{909E8E84-426E-40dd-AFC4-6F175D3DCCD1}">
-              <a14:hiddenFill xmlns:a14="http://schemas.microsoft.com/office/drawing/2010/main">
+              <a14:hiddenFill xmlns:a14="http://schemas.microsoft.com/office/drawing/2010/main" xmlns="">
                 <a:solidFill>
                   <a:srgbClr val="FFFFFF"/>
                 </a:solidFill>
               </a14:hiddenFill>
             </a:ext>
             <a:ext uri="{91240B29-F687-4f45-9708-019B960494DF}">
-              <a14:hiddenLine xmlns:a14="http://schemas.microsoft.com/office/drawing/2010/main" w="9525" cap="flat">
+              <a14:hiddenLine xmlns:a14="http://schemas.microsoft.com/office/drawing/2010/main" xmlns="" w="9525" cap="flat">
                 <a:solidFill>
                   <a:srgbClr val="808080"/>
                 </a:solidFill>
@@ -24336,7 +24335,7 @@
               </a14:hiddenLine>
             </a:ext>
             <a:ext uri="{AF507438-7753-43e0-B8FC-AC1667EBCBE1}">
-              <a14:hiddenEffects xmlns:a14="http://schemas.microsoft.com/office/drawing/2010/main">
+              <a14:hiddenEffects xmlns:a14="http://schemas.microsoft.com/office/drawing/2010/main" xmlns="">
                 <a:effectLst>
                   <a:outerShdw blurRad="63500" dist="38099" dir="2700000" algn="ctr" rotWithShape="0">
                     <a:schemeClr val="bg2">
@@ -24347,7 +24346,7 @@
               </a14:hiddenEffects>
             </a:ext>
             <a:ext uri="{FAA26D3D-D897-4be2-8F04-BA451C77F1D7}">
-              <ma14:placeholderFlag xmlns:ma14="http://schemas.microsoft.com/office/mac/drawingml/2011/main" val="1"/>
+              <ma14:placeholderFlag xmlns:ma14="http://schemas.microsoft.com/office/mac/drawingml/2011/main" xmlns="" val="1"/>
             </a:ext>
           </a:extLst>
         </p:spPr>
@@ -24392,14 +24391,14 @@
           <a:effectLst/>
           <a:extLst>
             <a:ext uri="{909E8E84-426E-40dd-AFC4-6F175D3DCCD1}">
-              <a14:hiddenFill xmlns:a14="http://schemas.microsoft.com/office/drawing/2010/main">
+              <a14:hiddenFill xmlns:a14="http://schemas.microsoft.com/office/drawing/2010/main" xmlns="">
                 <a:solidFill>
                   <a:srgbClr val="FFFFFF"/>
                 </a:solidFill>
               </a14:hiddenFill>
             </a:ext>
             <a:ext uri="{91240B29-F687-4f45-9708-019B960494DF}">
-              <a14:hiddenLine xmlns:a14="http://schemas.microsoft.com/office/drawing/2010/main" w="9525" cap="flat">
+              <a14:hiddenLine xmlns:a14="http://schemas.microsoft.com/office/drawing/2010/main" xmlns="" w="9525" cap="flat">
                 <a:solidFill>
                   <a:srgbClr val="808080"/>
                 </a:solidFill>
@@ -24409,7 +24408,7 @@
               </a14:hiddenLine>
             </a:ext>
             <a:ext uri="{AF507438-7753-43e0-B8FC-AC1667EBCBE1}">
-              <a14:hiddenEffects xmlns:a14="http://schemas.microsoft.com/office/drawing/2010/main">
+              <a14:hiddenEffects xmlns:a14="http://schemas.microsoft.com/office/drawing/2010/main" xmlns="">
                 <a:effectLst>
                   <a:outerShdw blurRad="63500" dist="38099" dir="2700000" algn="ctr" rotWithShape="0">
                     <a:schemeClr val="bg2">
@@ -24420,7 +24419,7 @@
               </a14:hiddenEffects>
             </a:ext>
             <a:ext uri="{FAA26D3D-D897-4be2-8F04-BA451C77F1D7}">
-              <ma14:placeholderFlag xmlns:ma14="http://schemas.microsoft.com/office/mac/drawingml/2011/main" val="1"/>
+              <ma14:placeholderFlag xmlns:ma14="http://schemas.microsoft.com/office/mac/drawingml/2011/main" xmlns="" val="1"/>
             </a:ext>
           </a:extLst>
         </p:spPr>
@@ -24521,14 +24520,14 @@
           <a:effectLst/>
           <a:extLst>
             <a:ext uri="{909E8E84-426E-40dd-AFC4-6F175D3DCCD1}">
-              <a14:hiddenFill xmlns:a14="http://schemas.microsoft.com/office/drawing/2010/main">
+              <a14:hiddenFill xmlns:a14="http://schemas.microsoft.com/office/drawing/2010/main" xmlns="">
                 <a:solidFill>
                   <a:srgbClr val="FFFFFF"/>
                 </a:solidFill>
               </a14:hiddenFill>
             </a:ext>
             <a:ext uri="{91240B29-F687-4f45-9708-019B960494DF}">
-              <a14:hiddenLine xmlns:a14="http://schemas.microsoft.com/office/drawing/2010/main" w="9525" cap="flat">
+              <a14:hiddenLine xmlns:a14="http://schemas.microsoft.com/office/drawing/2010/main" xmlns="" w="9525" cap="flat">
                 <a:solidFill>
                   <a:srgbClr val="808080"/>
                 </a:solidFill>
@@ -24538,7 +24537,7 @@
               </a14:hiddenLine>
             </a:ext>
             <a:ext uri="{AF507438-7753-43e0-B8FC-AC1667EBCBE1}">
-              <a14:hiddenEffects xmlns:a14="http://schemas.microsoft.com/office/drawing/2010/main">
+              <a14:hiddenEffects xmlns:a14="http://schemas.microsoft.com/office/drawing/2010/main" xmlns="">
                 <a:effectLst>
                   <a:outerShdw blurRad="63500" dist="38099" dir="2700000" algn="ctr" rotWithShape="0">
                     <a:schemeClr val="bg2">
@@ -24549,7 +24548,7 @@
               </a14:hiddenEffects>
             </a:ext>
             <a:ext uri="{FAA26D3D-D897-4be2-8F04-BA451C77F1D7}">
-              <ma14:placeholderFlag xmlns:ma14="http://schemas.microsoft.com/office/mac/drawingml/2011/main" val="1"/>
+              <ma14:placeholderFlag xmlns:ma14="http://schemas.microsoft.com/office/mac/drawingml/2011/main" xmlns="" val="1"/>
             </a:ext>
           </a:extLst>
         </p:spPr>
@@ -25146,14 +25145,14 @@
           <a:effectLst/>
           <a:extLst>
             <a:ext uri="{909E8E84-426E-40dd-AFC4-6F175D3DCCD1}">
-              <a14:hiddenFill xmlns:a14="http://schemas.microsoft.com/office/drawing/2010/main">
+              <a14:hiddenFill xmlns:a14="http://schemas.microsoft.com/office/drawing/2010/main" xmlns="">
                 <a:solidFill>
                   <a:srgbClr val="FFFFFF"/>
                 </a:solidFill>
               </a14:hiddenFill>
             </a:ext>
             <a:ext uri="{91240B29-F687-4f45-9708-019B960494DF}">
-              <a14:hiddenLine xmlns:a14="http://schemas.microsoft.com/office/drawing/2010/main" w="9525" cap="flat">
+              <a14:hiddenLine xmlns:a14="http://schemas.microsoft.com/office/drawing/2010/main" xmlns="" w="9525" cap="flat">
                 <a:solidFill>
                   <a:srgbClr val="808080"/>
                 </a:solidFill>
@@ -25163,7 +25162,7 @@
               </a14:hiddenLine>
             </a:ext>
             <a:ext uri="{AF507438-7753-43e0-B8FC-AC1667EBCBE1}">
-              <a14:hiddenEffects xmlns:a14="http://schemas.microsoft.com/office/drawing/2010/main">
+              <a14:hiddenEffects xmlns:a14="http://schemas.microsoft.com/office/drawing/2010/main" xmlns="">
                 <a:effectLst>
                   <a:outerShdw blurRad="63500" dist="38099" dir="2700000" algn="ctr" rotWithShape="0">
                     <a:schemeClr val="bg2">
@@ -25174,7 +25173,7 @@
               </a14:hiddenEffects>
             </a:ext>
             <a:ext uri="{FAA26D3D-D897-4be2-8F04-BA451C77F1D7}">
-              <ma14:placeholderFlag xmlns:ma14="http://schemas.microsoft.com/office/mac/drawingml/2011/main" val="1"/>
+              <ma14:placeholderFlag xmlns:ma14="http://schemas.microsoft.com/office/mac/drawingml/2011/main" xmlns="" val="1"/>
             </a:ext>
           </a:extLst>
         </p:spPr>
@@ -25219,14 +25218,14 @@
           <a:effectLst/>
           <a:extLst>
             <a:ext uri="{909E8E84-426E-40dd-AFC4-6F175D3DCCD1}">
-              <a14:hiddenFill xmlns:a14="http://schemas.microsoft.com/office/drawing/2010/main">
+              <a14:hiddenFill xmlns:a14="http://schemas.microsoft.com/office/drawing/2010/main" xmlns="">
                 <a:solidFill>
                   <a:srgbClr val="FFFFFF"/>
                 </a:solidFill>
               </a14:hiddenFill>
             </a:ext>
             <a:ext uri="{91240B29-F687-4f45-9708-019B960494DF}">
-              <a14:hiddenLine xmlns:a14="http://schemas.microsoft.com/office/drawing/2010/main" w="9525" cap="flat">
+              <a14:hiddenLine xmlns:a14="http://schemas.microsoft.com/office/drawing/2010/main" xmlns="" w="9525" cap="flat">
                 <a:solidFill>
                   <a:srgbClr val="808080"/>
                 </a:solidFill>
@@ -25236,7 +25235,7 @@
               </a14:hiddenLine>
             </a:ext>
             <a:ext uri="{AF507438-7753-43e0-B8FC-AC1667EBCBE1}">
-              <a14:hiddenEffects xmlns:a14="http://schemas.microsoft.com/office/drawing/2010/main">
+              <a14:hiddenEffects xmlns:a14="http://schemas.microsoft.com/office/drawing/2010/main" xmlns="">
                 <a:effectLst>
                   <a:outerShdw blurRad="63500" dist="38099" dir="2700000" algn="ctr" rotWithShape="0">
                     <a:schemeClr val="bg2">
@@ -25247,7 +25246,7 @@
               </a14:hiddenEffects>
             </a:ext>
             <a:ext uri="{FAA26D3D-D897-4be2-8F04-BA451C77F1D7}">
-              <ma14:placeholderFlag xmlns:ma14="http://schemas.microsoft.com/office/mac/drawingml/2011/main" val="1"/>
+              <ma14:placeholderFlag xmlns:ma14="http://schemas.microsoft.com/office/mac/drawingml/2011/main" xmlns="" val="1"/>
             </a:ext>
           </a:extLst>
         </p:spPr>
@@ -25348,14 +25347,14 @@
           <a:effectLst/>
           <a:extLst>
             <a:ext uri="{909E8E84-426E-40dd-AFC4-6F175D3DCCD1}">
-              <a14:hiddenFill xmlns:a14="http://schemas.microsoft.com/office/drawing/2010/main">
+              <a14:hiddenFill xmlns:a14="http://schemas.microsoft.com/office/drawing/2010/main" xmlns="">
                 <a:solidFill>
                   <a:srgbClr val="FFFFFF"/>
                 </a:solidFill>
               </a14:hiddenFill>
             </a:ext>
             <a:ext uri="{91240B29-F687-4f45-9708-019B960494DF}">
-              <a14:hiddenLine xmlns:a14="http://schemas.microsoft.com/office/drawing/2010/main" w="9525" cap="flat">
+              <a14:hiddenLine xmlns:a14="http://schemas.microsoft.com/office/drawing/2010/main" xmlns="" w="9525" cap="flat">
                 <a:solidFill>
                   <a:srgbClr val="808080"/>
                 </a:solidFill>
@@ -25365,7 +25364,7 @@
               </a14:hiddenLine>
             </a:ext>
             <a:ext uri="{AF507438-7753-43e0-B8FC-AC1667EBCBE1}">
-              <a14:hiddenEffects xmlns:a14="http://schemas.microsoft.com/office/drawing/2010/main">
+              <a14:hiddenEffects xmlns:a14="http://schemas.microsoft.com/office/drawing/2010/main" xmlns="">
                 <a:effectLst>
                   <a:outerShdw blurRad="63500" dist="38099" dir="2700000" algn="ctr" rotWithShape="0">
                     <a:schemeClr val="bg2">
@@ -25376,7 +25375,7 @@
               </a14:hiddenEffects>
             </a:ext>
             <a:ext uri="{FAA26D3D-D897-4be2-8F04-BA451C77F1D7}">
-              <ma14:placeholderFlag xmlns:ma14="http://schemas.microsoft.com/office/mac/drawingml/2011/main" val="1"/>
+              <ma14:placeholderFlag xmlns:ma14="http://schemas.microsoft.com/office/mac/drawingml/2011/main" xmlns="" val="1"/>
             </a:ext>
           </a:extLst>
         </p:spPr>
@@ -25973,14 +25972,14 @@
           <a:effectLst/>
           <a:extLst>
             <a:ext uri="{909E8E84-426E-40dd-AFC4-6F175D3DCCD1}">
-              <a14:hiddenFill xmlns:a14="http://schemas.microsoft.com/office/drawing/2010/main">
+              <a14:hiddenFill xmlns:a14="http://schemas.microsoft.com/office/drawing/2010/main" xmlns="">
                 <a:solidFill>
                   <a:srgbClr val="FFFFFF"/>
                 </a:solidFill>
               </a14:hiddenFill>
             </a:ext>
             <a:ext uri="{91240B29-F687-4f45-9708-019B960494DF}">
-              <a14:hiddenLine xmlns:a14="http://schemas.microsoft.com/office/drawing/2010/main" w="9525" cap="flat">
+              <a14:hiddenLine xmlns:a14="http://schemas.microsoft.com/office/drawing/2010/main" xmlns="" w="9525" cap="flat">
                 <a:solidFill>
                   <a:srgbClr val="808080"/>
                 </a:solidFill>
@@ -25990,7 +25989,7 @@
               </a14:hiddenLine>
             </a:ext>
             <a:ext uri="{AF507438-7753-43e0-B8FC-AC1667EBCBE1}">
-              <a14:hiddenEffects xmlns:a14="http://schemas.microsoft.com/office/drawing/2010/main">
+              <a14:hiddenEffects xmlns:a14="http://schemas.microsoft.com/office/drawing/2010/main" xmlns="">
                 <a:effectLst>
                   <a:outerShdw blurRad="63500" dist="38099" dir="2700000" algn="ctr" rotWithShape="0">
                     <a:schemeClr val="bg2">
@@ -26001,7 +26000,7 @@
               </a14:hiddenEffects>
             </a:ext>
             <a:ext uri="{FAA26D3D-D897-4be2-8F04-BA451C77F1D7}">
-              <ma14:placeholderFlag xmlns:ma14="http://schemas.microsoft.com/office/mac/drawingml/2011/main" val="1"/>
+              <ma14:placeholderFlag xmlns:ma14="http://schemas.microsoft.com/office/mac/drawingml/2011/main" xmlns="" val="1"/>
             </a:ext>
           </a:extLst>
         </p:spPr>
@@ -26046,14 +26045,14 @@
           <a:effectLst/>
           <a:extLst>
             <a:ext uri="{909E8E84-426E-40dd-AFC4-6F175D3DCCD1}">
-              <a14:hiddenFill xmlns:a14="http://schemas.microsoft.com/office/drawing/2010/main">
+              <a14:hiddenFill xmlns:a14="http://schemas.microsoft.com/office/drawing/2010/main" xmlns="">
                 <a:solidFill>
                   <a:srgbClr val="FFFFFF"/>
                 </a:solidFill>
               </a14:hiddenFill>
             </a:ext>
             <a:ext uri="{91240B29-F687-4f45-9708-019B960494DF}">
-              <a14:hiddenLine xmlns:a14="http://schemas.microsoft.com/office/drawing/2010/main" w="9525" cap="flat">
+              <a14:hiddenLine xmlns:a14="http://schemas.microsoft.com/office/drawing/2010/main" xmlns="" w="9525" cap="flat">
                 <a:solidFill>
                   <a:srgbClr val="808080"/>
                 </a:solidFill>
@@ -26063,7 +26062,7 @@
               </a14:hiddenLine>
             </a:ext>
             <a:ext uri="{AF507438-7753-43e0-B8FC-AC1667EBCBE1}">
-              <a14:hiddenEffects xmlns:a14="http://schemas.microsoft.com/office/drawing/2010/main">
+              <a14:hiddenEffects xmlns:a14="http://schemas.microsoft.com/office/drawing/2010/main" xmlns="">
                 <a:effectLst>
                   <a:outerShdw blurRad="63500" dist="38099" dir="2700000" algn="ctr" rotWithShape="0">
                     <a:schemeClr val="bg2">
@@ -26074,7 +26073,7 @@
               </a14:hiddenEffects>
             </a:ext>
             <a:ext uri="{FAA26D3D-D897-4be2-8F04-BA451C77F1D7}">
-              <ma14:placeholderFlag xmlns:ma14="http://schemas.microsoft.com/office/mac/drawingml/2011/main" val="1"/>
+              <ma14:placeholderFlag xmlns:ma14="http://schemas.microsoft.com/office/mac/drawingml/2011/main" xmlns="" val="1"/>
             </a:ext>
           </a:extLst>
         </p:spPr>
@@ -26175,14 +26174,14 @@
           <a:effectLst/>
           <a:extLst>
             <a:ext uri="{909E8E84-426E-40dd-AFC4-6F175D3DCCD1}">
-              <a14:hiddenFill xmlns:a14="http://schemas.microsoft.com/office/drawing/2010/main">
+              <a14:hiddenFill xmlns:a14="http://schemas.microsoft.com/office/drawing/2010/main" xmlns="">
                 <a:solidFill>
                   <a:srgbClr val="FFFFFF"/>
                 </a:solidFill>
               </a14:hiddenFill>
             </a:ext>
             <a:ext uri="{91240B29-F687-4f45-9708-019B960494DF}">
-              <a14:hiddenLine xmlns:a14="http://schemas.microsoft.com/office/drawing/2010/main" w="9525" cap="flat">
+              <a14:hiddenLine xmlns:a14="http://schemas.microsoft.com/office/drawing/2010/main" xmlns="" w="9525" cap="flat">
                 <a:solidFill>
                   <a:srgbClr val="808080"/>
                 </a:solidFill>
@@ -26192,7 +26191,7 @@
               </a14:hiddenLine>
             </a:ext>
             <a:ext uri="{AF507438-7753-43e0-B8FC-AC1667EBCBE1}">
-              <a14:hiddenEffects xmlns:a14="http://schemas.microsoft.com/office/drawing/2010/main">
+              <a14:hiddenEffects xmlns:a14="http://schemas.microsoft.com/office/drawing/2010/main" xmlns="">
                 <a:effectLst>
                   <a:outerShdw blurRad="63500" dist="38099" dir="2700000" algn="ctr" rotWithShape="0">
                     <a:schemeClr val="bg2">
@@ -26203,7 +26202,7 @@
               </a14:hiddenEffects>
             </a:ext>
             <a:ext uri="{FAA26D3D-D897-4be2-8F04-BA451C77F1D7}">
-              <ma14:placeholderFlag xmlns:ma14="http://schemas.microsoft.com/office/mac/drawingml/2011/main" val="1"/>
+              <ma14:placeholderFlag xmlns:ma14="http://schemas.microsoft.com/office/mac/drawingml/2011/main" xmlns="" val="1"/>
             </a:ext>
           </a:extLst>
         </p:spPr>
@@ -26262,14 +26261,14 @@
           <a:effectLst/>
           <a:extLst>
             <a:ext uri="{909E8E84-426E-40dd-AFC4-6F175D3DCCD1}">
-              <a14:hiddenFill xmlns:a14="http://schemas.microsoft.com/office/drawing/2010/main">
+              <a14:hiddenFill xmlns:a14="http://schemas.microsoft.com/office/drawing/2010/main" xmlns="">
                 <a:solidFill>
                   <a:srgbClr val="FFFFFF"/>
                 </a:solidFill>
               </a14:hiddenFill>
             </a:ext>
             <a:ext uri="{91240B29-F687-4f45-9708-019B960494DF}">
-              <a14:hiddenLine xmlns:a14="http://schemas.microsoft.com/office/drawing/2010/main" w="9525" cap="flat">
+              <a14:hiddenLine xmlns:a14="http://schemas.microsoft.com/office/drawing/2010/main" xmlns="" w="9525" cap="flat">
                 <a:solidFill>
                   <a:srgbClr val="808080"/>
                 </a:solidFill>
@@ -26279,7 +26278,7 @@
               </a14:hiddenLine>
             </a:ext>
             <a:ext uri="{AF507438-7753-43e0-B8FC-AC1667EBCBE1}">
-              <a14:hiddenEffects xmlns:a14="http://schemas.microsoft.com/office/drawing/2010/main">
+              <a14:hiddenEffects xmlns:a14="http://schemas.microsoft.com/office/drawing/2010/main" xmlns="">
                 <a:effectLst>
                   <a:outerShdw blurRad="63500" dist="38099" dir="2700000" algn="ctr" rotWithShape="0">
                     <a:srgbClr val="000000">
@@ -26327,14 +26326,14 @@
           <a:effectLst/>
           <a:extLst>
             <a:ext uri="{909E8E84-426E-40dd-AFC4-6F175D3DCCD1}">
-              <a14:hiddenFill xmlns:a14="http://schemas.microsoft.com/office/drawing/2010/main">
+              <a14:hiddenFill xmlns:a14="http://schemas.microsoft.com/office/drawing/2010/main" xmlns="">
                 <a:solidFill>
                   <a:srgbClr val="FFFFFF"/>
                 </a:solidFill>
               </a14:hiddenFill>
             </a:ext>
             <a:ext uri="{91240B29-F687-4f45-9708-019B960494DF}">
-              <a14:hiddenLine xmlns:a14="http://schemas.microsoft.com/office/drawing/2010/main" w="9525" cap="flat">
+              <a14:hiddenLine xmlns:a14="http://schemas.microsoft.com/office/drawing/2010/main" xmlns="" w="9525" cap="flat">
                 <a:solidFill>
                   <a:srgbClr val="808080"/>
                 </a:solidFill>
@@ -26344,7 +26343,7 @@
               </a14:hiddenLine>
             </a:ext>
             <a:ext uri="{AF507438-7753-43e0-B8FC-AC1667EBCBE1}">
-              <a14:hiddenEffects xmlns:a14="http://schemas.microsoft.com/office/drawing/2010/main">
+              <a14:hiddenEffects xmlns:a14="http://schemas.microsoft.com/office/drawing/2010/main" xmlns="">
                 <a:effectLst>
                   <a:outerShdw blurRad="63500" dist="38099" dir="2700000" algn="ctr" rotWithShape="0">
                     <a:schemeClr val="bg2">
@@ -26355,7 +26354,7 @@
               </a14:hiddenEffects>
             </a:ext>
             <a:ext uri="{FAA26D3D-D897-4be2-8F04-BA451C77F1D7}">
-              <ma14:placeholderFlag xmlns:ma14="http://schemas.microsoft.com/office/mac/drawingml/2011/main" val="1"/>
+              <ma14:placeholderFlag xmlns:ma14="http://schemas.microsoft.com/office/mac/drawingml/2011/main" xmlns="" val="1"/>
             </a:ext>
           </a:extLst>
         </p:spPr>
@@ -26931,14 +26930,14 @@
           </a:prstGeom>
           <a:extLst>
             <a:ext uri="{909E8E84-426E-40dd-AFC4-6F175D3DCCD1}">
-              <a14:hiddenFill xmlns:a14="http://schemas.microsoft.com/office/drawing/2010/main">
+              <a14:hiddenFill xmlns:a14="http://schemas.microsoft.com/office/drawing/2010/main" xmlns="">
                 <a:solidFill>
                   <a:srgbClr val="FFFFFF"/>
                 </a:solidFill>
               </a14:hiddenFill>
             </a:ext>
             <a:ext uri="{91240B29-F687-4f45-9708-019B960494DF}">
-              <a14:hiddenLine xmlns:a14="http://schemas.microsoft.com/office/drawing/2010/main" w="9525" cap="flat">
+              <a14:hiddenLine xmlns:a14="http://schemas.microsoft.com/office/drawing/2010/main" xmlns="" w="9525" cap="flat">
                 <a:solidFill>
                   <a:srgbClr val="808080"/>
                 </a:solidFill>
@@ -27250,7 +27249,7 @@
           <a:blip r:embed="rId3">
             <a:extLst>
               <a:ext uri="{28A0092B-C50C-407E-A947-70E740481C1C}">
-                <a14:useLocalDpi xmlns:a14="http://schemas.microsoft.com/office/drawing/2010/main" val="0"/>
+                <a14:useLocalDpi xmlns:a14="http://schemas.microsoft.com/office/drawing/2010/main" xmlns="" val="0"/>
               </a:ext>
             </a:extLst>
           </a:blip>
@@ -27286,14 +27285,14 @@
           </a:prstGeom>
           <a:extLst>
             <a:ext uri="{909E8E84-426E-40dd-AFC4-6F175D3DCCD1}">
-              <a14:hiddenFill xmlns:a14="http://schemas.microsoft.com/office/drawing/2010/main">
+              <a14:hiddenFill xmlns:a14="http://schemas.microsoft.com/office/drawing/2010/main" xmlns="">
                 <a:solidFill>
                   <a:srgbClr val="FFFFFF"/>
                 </a:solidFill>
               </a14:hiddenFill>
             </a:ext>
             <a:ext uri="{91240B29-F687-4f45-9708-019B960494DF}">
-              <a14:hiddenLine xmlns:a14="http://schemas.microsoft.com/office/drawing/2010/main" w="9525" cap="flat">
+              <a14:hiddenLine xmlns:a14="http://schemas.microsoft.com/office/drawing/2010/main" xmlns="" w="9525" cap="flat">
                 <a:solidFill>
                   <a:srgbClr val="808080"/>
                 </a:solidFill>
@@ -27593,13 +27592,13 @@
   <p:clrMapOvr>
     <a:masterClrMapping/>
   </p:clrMapOvr>
-  <p:transition xmlns:p14="http://schemas.microsoft.com/office/powerpoint/2010/main">
+  <p:transition>
     <p:fade thruBlk="1"/>
   </p:transition>
   <p:timing>
     <p:tnLst>
       <p:par>
-        <p:cTn xmlns:p14="http://schemas.microsoft.com/office/powerpoint/2010/main" id="1" dur="indefinite" restart="never" nodeType="tmRoot">
+        <p:cTn id="1" dur="indefinite" restart="never" nodeType="tmRoot">
           <p:childTnLst>
             <p:seq concurrent="1" nextAc="seek">
               <p:cTn id="2" dur="0" nodeType="mainSeq"/>
@@ -27626,7 +27625,7 @@
 </p:sld>
 </file>
 
-<file path=ppt/slides/slide10.xml><?xml version="1.0" encoding="utf-8"?>
+<file path=ppt/slides/slide2.xml><?xml version="1.0" encoding="utf-8"?>
 <p:sld xmlns:a="http://schemas.openxmlformats.org/drawingml/2006/main" xmlns:r="http://schemas.openxmlformats.org/officeDocument/2006/relationships" xmlns:p="http://schemas.openxmlformats.org/presentationml/2006/main">
   <p:cSld>
     <p:spTree>
@@ -27643,37 +27642,33 @@
           <a:chExt cx="0" cy="0"/>
         </a:xfrm>
       </p:grpSpPr>
-      <p:sp>
-        <p:nvSpPr>
-          <p:cNvPr id="2" name="Title 1"/>
-          <p:cNvSpPr>
-            <a:spLocks noGrp="1"/>
-          </p:cNvSpPr>
-          <p:nvPr>
-            <p:ph type="title"/>
-          </p:nvPr>
-        </p:nvSpPr>
+      <p:pic>
+        <p:nvPicPr>
+          <p:cNvPr id="4" name="Picture 3"/>
+          <p:cNvPicPr>
+            <a:picLocks noChangeAspect="1"/>
+          </p:cNvPicPr>
+          <p:nvPr/>
+        </p:nvPicPr>
+        <p:blipFill>
+          <a:blip r:embed="rId3"/>
+          <a:stretch>
+            <a:fillRect/>
+          </a:stretch>
+        </p:blipFill>
         <p:spPr>
           <a:xfrm>
-            <a:off x="1187624" y="692696"/>
-            <a:ext cx="6696075" cy="1141413"/>
+            <a:off x="1475656" y="1658557"/>
+            <a:ext cx="6224403" cy="3498635"/>
           </a:xfrm>
+          <a:prstGeom prst="rect">
+            <a:avLst/>
+          </a:prstGeom>
         </p:spPr>
-        <p:txBody>
-          <a:bodyPr/>
-          <a:lstStyle/>
-          <a:p>
-            <a:r>
-              <a:rPr lang="en-GB" sz="3000" dirty="0" smtClean="0"/>
-              <a:t>One last point…FLY</a:t>
-            </a:r>
-            <a:endParaRPr lang="en-GB" sz="3000" dirty="0"/>
-          </a:p>
-        </p:txBody>
-      </p:sp>
-      <p:sp>
-        <p:nvSpPr>
-          <p:cNvPr id="7" name="Text Box 2"/>
+      </p:pic>
+      <p:sp>
+        <p:nvSpPr>
+          <p:cNvPr id="5" name="Text Box 2"/>
           <p:cNvSpPr txBox="1">
             <a:spLocks noChangeArrowheads="1"/>
           </p:cNvSpPr>
@@ -27694,14 +27689,14 @@
           <a:effectLst/>
           <a:extLst>
             <a:ext uri="{909E8E84-426E-40dd-AFC4-6F175D3DCCD1}">
-              <a14:hiddenFill xmlns:a14="http://schemas.microsoft.com/office/drawing/2010/main">
+              <a14:hiddenFill xmlns:a14="http://schemas.microsoft.com/office/drawing/2010/main" xmlns="">
                 <a:solidFill>
                   <a:srgbClr val="FFFFFF"/>
                 </a:solidFill>
               </a14:hiddenFill>
             </a:ext>
             <a:ext uri="{91240B29-F687-4f45-9708-019B960494DF}">
-              <a14:hiddenLine xmlns:a14="http://schemas.microsoft.com/office/drawing/2010/main" w="9525" cap="flat">
+              <a14:hiddenLine xmlns:a14="http://schemas.microsoft.com/office/drawing/2010/main" xmlns="" w="9525" cap="flat">
                 <a:solidFill>
                   <a:srgbClr val="808080"/>
                 </a:solidFill>
@@ -27711,7 +27706,7 @@
               </a14:hiddenLine>
             </a:ext>
             <a:ext uri="{AF507438-7753-43e0-B8FC-AC1667EBCBE1}">
-              <a14:hiddenEffects xmlns:a14="http://schemas.microsoft.com/office/drawing/2010/main">
+              <a14:hiddenEffects xmlns:a14="http://schemas.microsoft.com/office/drawing/2010/main" xmlns="">
                 <a:effectLst>
                   <a:outerShdw blurRad="63500" dist="38099" dir="2700000" algn="ctr" rotWithShape="0">
                     <a:srgbClr val="000000">
@@ -28002,7 +27997,7 @@
                   <a:schemeClr val="bg1"/>
                 </a:solidFill>
               </a:rPr>
-              <a:t>Fly by Nicki </a:t>
+              <a:t>Breathe by </a:t>
             </a:r>
             <a:r>
               <a:rPr lang="en-GB" sz="2000" dirty="0" err="1" smtClean="0">
@@ -28010,108 +28005,7 @@
                   <a:schemeClr val="bg1"/>
                 </a:solidFill>
               </a:rPr>
-              <a:t>Minaj</a:t>
-            </a:r>
-            <a:r>
-              <a:rPr lang="en-GB" sz="2000" dirty="0" smtClean="0">
-                <a:solidFill>
-                  <a:schemeClr val="bg1"/>
-                </a:solidFill>
-              </a:rPr>
-              <a:t> </a:t>
-            </a:r>
-            <a:r>
-              <a:rPr lang="en-GB" sz="2000" dirty="0" err="1" smtClean="0">
-                <a:solidFill>
-                  <a:schemeClr val="bg1"/>
-                </a:solidFill>
-              </a:rPr>
-              <a:t>ft</a:t>
-            </a:r>
-            <a:r>
-              <a:rPr lang="en-GB" sz="2000" dirty="0" smtClean="0">
-                <a:solidFill>
-                  <a:schemeClr val="bg1"/>
-                </a:solidFill>
-              </a:rPr>
-              <a:t> </a:t>
-            </a:r>
-            <a:r>
-              <a:rPr lang="en-GB" sz="2000" dirty="0" err="1" smtClean="0">
-                <a:solidFill>
-                  <a:schemeClr val="bg1"/>
-                </a:solidFill>
-              </a:rPr>
-              <a:t>Rihanna</a:t>
-            </a:r>
-            <a:r>
-              <a:rPr lang="en-GB" sz="2000" dirty="0" smtClean="0">
-                <a:solidFill>
-                  <a:schemeClr val="bg1"/>
-                </a:solidFill>
-              </a:rPr>
-              <a:t> </a:t>
-            </a:r>
-            <a:r>
-              <a:rPr lang="en-GB" sz="2000" dirty="0" smtClean="0">
-                <a:solidFill>
-                  <a:schemeClr val="bg1"/>
-                </a:solidFill>
-              </a:rPr>
-              <a:t>:</a:t>
-            </a:r>
-          </a:p>
-          <a:p>
-            <a:pPr algn="ctr">
-              <a:buClrTx/>
-              <a:buFontTx/>
-              <a:buNone/>
-              <a:defRPr/>
-            </a:pPr>
-            <a:r>
-              <a:rPr lang="en-GB" sz="2000" dirty="0">
-                <a:solidFill>
-                  <a:schemeClr val="bg1"/>
-                </a:solidFill>
-                <a:hlinkClick r:id="rId2"/>
-              </a:rPr>
-              <a:t>http://</a:t>
-            </a:r>
-            <a:r>
-              <a:rPr lang="en-GB" sz="2000" dirty="0" err="1">
-                <a:solidFill>
-                  <a:schemeClr val="bg1"/>
-                </a:solidFill>
-                <a:hlinkClick r:id="rId2"/>
-              </a:rPr>
-              <a:t>www.youtube.com</a:t>
-            </a:r>
-            <a:r>
-              <a:rPr lang="en-GB" sz="2000" dirty="0">
-                <a:solidFill>
-                  <a:schemeClr val="bg1"/>
-                </a:solidFill>
-                <a:hlinkClick r:id="rId2"/>
-              </a:rPr>
-              <a:t>/</a:t>
-            </a:r>
-            <a:r>
-              <a:rPr lang="en-GB" sz="2000" dirty="0" err="1">
-                <a:solidFill>
-                  <a:schemeClr val="bg1"/>
-                </a:solidFill>
-                <a:hlinkClick r:id="rId2"/>
-              </a:rPr>
-              <a:t>watch?v</a:t>
-            </a:r>
-            <a:r>
-              <a:rPr lang="en-GB" sz="2000" dirty="0">
-                <a:solidFill>
-                  <a:schemeClr val="bg1"/>
-                </a:solidFill>
-                <a:hlinkClick r:id="rId2"/>
-              </a:rPr>
-              <a:t>=gaVtC5A5frA</a:t>
+              <a:t>Sia</a:t>
             </a:r>
             <a:endParaRPr lang="en-GB" sz="2000" dirty="0" smtClean="0">
               <a:solidFill>
@@ -28119,96 +28013,87 @@
               </a:solidFill>
             </a:endParaRPr>
           </a:p>
-        </p:txBody>
-      </p:sp>
-      <p:pic>
-        <p:nvPicPr>
-          <p:cNvPr id="3" name="Picture 2"/>
-          <p:cNvPicPr>
-            <a:picLocks noChangeAspect="1"/>
-          </p:cNvPicPr>
-          <p:nvPr/>
-        </p:nvPicPr>
-        <p:blipFill>
-          <a:blip r:embed="rId3"/>
-          <a:stretch>
-            <a:fillRect/>
-          </a:stretch>
-        </p:blipFill>
-        <p:spPr>
-          <a:xfrm>
-            <a:off x="1619672" y="1628800"/>
-            <a:ext cx="5832648" cy="3499589"/>
-          </a:xfrm>
-          <a:prstGeom prst="rect">
-            <a:avLst/>
-          </a:prstGeom>
-        </p:spPr>
-      </p:pic>
-    </p:spTree>
-    <p:extLst>
-      <p:ext uri="{BB962C8B-B14F-4D97-AF65-F5344CB8AC3E}">
-        <p14:creationId xmlns:p14="http://schemas.microsoft.com/office/powerpoint/2010/main" val="3819640297"/>
-      </p:ext>
-    </p:extLst>
-  </p:cSld>
-  <p:clrMapOvr>
-    <a:masterClrMapping/>
-  </p:clrMapOvr>
-  <p:timing>
-    <p:tnLst>
-      <p:par>
-        <p:cTn xmlns:p14="http://schemas.microsoft.com/office/powerpoint/2010/main" id="1" dur="indefinite" restart="never" nodeType="tmRoot"/>
-      </p:par>
-    </p:tnLst>
-  </p:timing>
-</p:sld>
-</file>
-
-<file path=ppt/slides/slide2.xml><?xml version="1.0" encoding="utf-8"?>
-<p:sld xmlns:a="http://schemas.openxmlformats.org/drawingml/2006/main" xmlns:r="http://schemas.openxmlformats.org/officeDocument/2006/relationships" xmlns:p="http://schemas.openxmlformats.org/presentationml/2006/main">
-  <p:cSld>
-    <p:spTree>
-      <p:nvGrpSpPr>
-        <p:cNvPr id="1" name=""/>
-        <p:cNvGrpSpPr/>
-        <p:nvPr/>
-      </p:nvGrpSpPr>
-      <p:grpSpPr>
-        <a:xfrm>
-          <a:off x="0" y="0"/>
-          <a:ext cx="0" cy="0"/>
-          <a:chOff x="0" y="0"/>
-          <a:chExt cx="0" cy="0"/>
-        </a:xfrm>
-      </p:grpSpPr>
-      <p:pic>
-        <p:nvPicPr>
-          <p:cNvPr id="4" name="Picture 3"/>
-          <p:cNvPicPr>
-            <a:picLocks noChangeAspect="1"/>
-          </p:cNvPicPr>
-          <p:nvPr/>
-        </p:nvPicPr>
-        <p:blipFill>
-          <a:blip r:embed="rId3"/>
-          <a:stretch>
-            <a:fillRect/>
-          </a:stretch>
-        </p:blipFill>
-        <p:spPr>
-          <a:xfrm>
-            <a:off x="1475656" y="1658557"/>
-            <a:ext cx="6224403" cy="3498635"/>
-          </a:xfrm>
-          <a:prstGeom prst="rect">
-            <a:avLst/>
-          </a:prstGeom>
-        </p:spPr>
-      </p:pic>
-      <p:sp>
-        <p:nvSpPr>
-          <p:cNvPr id="5" name="Text Box 2"/>
+          <a:p>
+            <a:pPr algn="ctr">
+              <a:buClrTx/>
+              <a:buFontTx/>
+              <a:buNone/>
+              <a:defRPr/>
+            </a:pPr>
+            <a:r>
+              <a:rPr lang="en-GB" sz="2000" dirty="0" smtClean="0">
+                <a:solidFill>
+                  <a:schemeClr val="bg1"/>
+                </a:solidFill>
+                <a:hlinkClick r:id="rId4"/>
+              </a:rPr>
+              <a:t>http</a:t>
+            </a:r>
+            <a:r>
+              <a:rPr lang="en-GB" sz="2000" dirty="0">
+                <a:solidFill>
+                  <a:schemeClr val="bg1"/>
+                </a:solidFill>
+                <a:hlinkClick r:id="rId4"/>
+              </a:rPr>
+              <a:t>://</a:t>
+            </a:r>
+            <a:r>
+              <a:rPr lang="en-GB" sz="2000" dirty="0" err="1">
+                <a:solidFill>
+                  <a:schemeClr val="bg1"/>
+                </a:solidFill>
+                <a:hlinkClick r:id="rId4"/>
+              </a:rPr>
+              <a:t>www.youtube.com</a:t>
+            </a:r>
+            <a:r>
+              <a:rPr lang="en-GB" sz="2000" dirty="0">
+                <a:solidFill>
+                  <a:schemeClr val="bg1"/>
+                </a:solidFill>
+                <a:hlinkClick r:id="rId4"/>
+              </a:rPr>
+              <a:t>/</a:t>
+            </a:r>
+            <a:r>
+              <a:rPr lang="en-GB" sz="2000" dirty="0" err="1">
+                <a:solidFill>
+                  <a:schemeClr val="bg1"/>
+                </a:solidFill>
+                <a:hlinkClick r:id="rId4"/>
+              </a:rPr>
+              <a:t>watch?v</a:t>
+            </a:r>
+            <a:r>
+              <a:rPr lang="en-GB" sz="2000" dirty="0">
+                <a:solidFill>
+                  <a:schemeClr val="bg1"/>
+                </a:solidFill>
+                <a:hlinkClick r:id="rId4"/>
+              </a:rPr>
+              <a:t>=</a:t>
+            </a:r>
+            <a:r>
+              <a:rPr lang="en-GB" sz="2000" dirty="0" smtClean="0">
+                <a:solidFill>
+                  <a:schemeClr val="bg1"/>
+                </a:solidFill>
+                <a:hlinkClick r:id="rId4"/>
+              </a:rPr>
+              <a:t>SFGvmrJ5rjMt</a:t>
+            </a:r>
+            <a:endParaRPr lang="en-GB" sz="2000" dirty="0" smtClean="0">
+              <a:solidFill>
+                <a:schemeClr val="bg1"/>
+              </a:solidFill>
+            </a:endParaRPr>
+          </a:p>
+        </p:txBody>
+      </p:sp>
+      <p:sp>
+        <p:nvSpPr>
+          <p:cNvPr id="6" name="Text Box 2"/>
           <p:cNvSpPr txBox="1">
             <a:spLocks noChangeArrowheads="1"/>
           </p:cNvSpPr>
@@ -28216,8 +28101,8 @@
         </p:nvSpPr>
         <p:spPr bwMode="auto">
           <a:xfrm>
-            <a:off x="1187624" y="5229200"/>
-            <a:ext cx="6840760" cy="710067"/>
+            <a:off x="1187624" y="980728"/>
+            <a:ext cx="6840760" cy="556179"/>
           </a:xfrm>
           <a:prstGeom prst="rect">
             <a:avLst/>
@@ -28229,14 +28114,14 @@
           <a:effectLst/>
           <a:extLst>
             <a:ext uri="{909E8E84-426E-40dd-AFC4-6F175D3DCCD1}">
-              <a14:hiddenFill xmlns:a14="http://schemas.microsoft.com/office/drawing/2010/main">
+              <a14:hiddenFill xmlns:a14="http://schemas.microsoft.com/office/drawing/2010/main" xmlns="">
                 <a:solidFill>
                   <a:srgbClr val="FFFFFF"/>
                 </a:solidFill>
               </a14:hiddenFill>
             </a:ext>
             <a:ext uri="{91240B29-F687-4f45-9708-019B960494DF}">
-              <a14:hiddenLine xmlns:a14="http://schemas.microsoft.com/office/drawing/2010/main" w="9525" cap="flat">
+              <a14:hiddenLine xmlns:a14="http://schemas.microsoft.com/office/drawing/2010/main" xmlns="" w="9525" cap="flat">
                 <a:solidFill>
                   <a:srgbClr val="808080"/>
                 </a:solidFill>
@@ -28246,7 +28131,7 @@
               </a14:hiddenLine>
             </a:ext>
             <a:ext uri="{AF507438-7753-43e0-B8FC-AC1667EBCBE1}">
-              <a14:hiddenEffects xmlns:a14="http://schemas.microsoft.com/office/drawing/2010/main">
+              <a14:hiddenEffects xmlns:a14="http://schemas.microsoft.com/office/drawing/2010/main" xmlns="">
                 <a:effectLst>
                   <a:outerShdw blurRad="63500" dist="38099" dir="2700000" algn="ctr" rotWithShape="0">
                     <a:srgbClr val="000000">
@@ -28532,102 +28417,261 @@
               <a:defRPr/>
             </a:pPr>
             <a:r>
-              <a:rPr lang="en-GB" sz="2000" dirty="0" smtClean="0">
+              <a:rPr lang="en-GB" sz="3000" dirty="0" smtClean="0">
                 <a:solidFill>
                   <a:schemeClr val="bg1"/>
                 </a:solidFill>
               </a:rPr>
-              <a:t>Breathe by </a:t>
-            </a:r>
-            <a:r>
-              <a:rPr lang="en-GB" sz="2000" dirty="0" err="1" smtClean="0">
+              <a:t>Breathe Me by </a:t>
+            </a:r>
+            <a:r>
+              <a:rPr lang="en-GB" sz="3000" dirty="0" err="1" smtClean="0">
                 <a:solidFill>
                   <a:schemeClr val="bg1"/>
                 </a:solidFill>
               </a:rPr>
               <a:t>Sia</a:t>
             </a:r>
-            <a:endParaRPr lang="en-GB" sz="2000" dirty="0" smtClean="0">
+            <a:endParaRPr lang="en-GB" sz="3000" dirty="0" smtClean="0">
               <a:solidFill>
                 <a:schemeClr val="bg1"/>
               </a:solidFill>
             </a:endParaRPr>
           </a:p>
-          <a:p>
-            <a:pPr algn="ctr">
-              <a:buClrTx/>
-              <a:buFontTx/>
-              <a:buNone/>
-              <a:defRPr/>
-            </a:pPr>
-            <a:r>
-              <a:rPr lang="en-GB" sz="2000" dirty="0" smtClean="0">
-                <a:solidFill>
-                  <a:schemeClr val="bg1"/>
-                </a:solidFill>
-                <a:hlinkClick r:id="rId4"/>
-              </a:rPr>
-              <a:t>http</a:t>
-            </a:r>
-            <a:r>
-              <a:rPr lang="en-GB" sz="2000" dirty="0">
-                <a:solidFill>
-                  <a:schemeClr val="bg1"/>
-                </a:solidFill>
-                <a:hlinkClick r:id="rId4"/>
-              </a:rPr>
-              <a:t>://</a:t>
-            </a:r>
-            <a:r>
-              <a:rPr lang="en-GB" sz="2000" dirty="0" err="1">
-                <a:solidFill>
-                  <a:schemeClr val="bg1"/>
-                </a:solidFill>
-                <a:hlinkClick r:id="rId4"/>
-              </a:rPr>
-              <a:t>www.youtube.com</a:t>
-            </a:r>
-            <a:r>
-              <a:rPr lang="en-GB" sz="2000" dirty="0">
-                <a:solidFill>
-                  <a:schemeClr val="bg1"/>
-                </a:solidFill>
-                <a:hlinkClick r:id="rId4"/>
-              </a:rPr>
-              <a:t>/</a:t>
-            </a:r>
-            <a:r>
-              <a:rPr lang="en-GB" sz="2000" dirty="0" err="1">
-                <a:solidFill>
-                  <a:schemeClr val="bg1"/>
-                </a:solidFill>
-                <a:hlinkClick r:id="rId4"/>
-              </a:rPr>
-              <a:t>watch?v</a:t>
-            </a:r>
-            <a:r>
-              <a:rPr lang="en-GB" sz="2000" dirty="0">
-                <a:solidFill>
-                  <a:schemeClr val="bg1"/>
-                </a:solidFill>
-                <a:hlinkClick r:id="rId4"/>
-              </a:rPr>
-              <a:t>=</a:t>
-            </a:r>
-            <a:r>
-              <a:rPr lang="en-GB" sz="2000" dirty="0" smtClean="0">
-                <a:solidFill>
-                  <a:schemeClr val="bg1"/>
-                </a:solidFill>
-                <a:hlinkClick r:id="rId4"/>
-              </a:rPr>
-              <a:t>SFGvmrJ5rjMt</a:t>
-            </a:r>
-            <a:endParaRPr lang="en-GB" sz="2000" dirty="0" smtClean="0">
-              <a:solidFill>
-                <a:schemeClr val="bg1"/>
-              </a:solidFill>
-            </a:endParaRPr>
+        </p:txBody>
+      </p:sp>
+    </p:spTree>
+    <p:extLst>
+      <p:ext uri="{BB962C8B-B14F-4D97-AF65-F5344CB8AC3E}">
+        <p14:creationId xmlns:p14="http://schemas.microsoft.com/office/powerpoint/2010/main" xmlns="" val="721097687"/>
+      </p:ext>
+    </p:extLst>
+  </p:cSld>
+  <p:clrMapOvr>
+    <a:masterClrMapping/>
+  </p:clrMapOvr>
+  <p:transition>
+    <p:fade thruBlk="1"/>
+  </p:transition>
+  <p:timing>
+    <p:tnLst>
+      <p:par>
+        <p:cTn id="1" dur="indefinite" restart="never" nodeType="tmRoot">
+          <p:childTnLst>
+            <p:seq concurrent="1" nextAc="seek">
+              <p:cTn id="2" dur="0" nodeType="mainSeq"/>
+              <p:prevCondLst>
+                <p:cond evt="onPrev" delay="0">
+                  <p:tgtEl>
+                    <p:sldTgt/>
+                  </p:tgtEl>
+                </p:cond>
+              </p:prevCondLst>
+              <p:nextCondLst>
+                <p:cond evt="onNext" delay="0">
+                  <p:tgtEl>
+                    <p:sldTgt/>
+                  </p:tgtEl>
+                </p:cond>
+              </p:nextCondLst>
+            </p:seq>
+          </p:childTnLst>
+        </p:cTn>
+      </p:par>
+    </p:tnLst>
+  </p:timing>
+</p:sld>
+</file>
+
+<file path=ppt/slides/slide3.xml><?xml version="1.0" encoding="utf-8"?>
+<p:sld xmlns:a="http://schemas.openxmlformats.org/drawingml/2006/main" xmlns:r="http://schemas.openxmlformats.org/officeDocument/2006/relationships" xmlns:p="http://schemas.openxmlformats.org/presentationml/2006/main">
+  <p:cSld>
+    <p:bg>
+      <p:bgPr>
+        <a:blipFill dpi="0" rotWithShape="1">
+          <a:blip r:embed="rId2"/>
+          <a:srcRect/>
+          <a:stretch>
+            <a:fillRect/>
+          </a:stretch>
+        </a:blipFill>
+        <a:effectLst/>
+      </p:bgPr>
+    </p:bg>
+    <p:spTree>
+      <p:nvGrpSpPr>
+        <p:cNvPr id="1" name=""/>
+        <p:cNvGrpSpPr/>
+        <p:nvPr/>
+      </p:nvGrpSpPr>
+      <p:grpSpPr>
+        <a:xfrm>
+          <a:off x="0" y="0"/>
+          <a:ext cx="0" cy="0"/>
+          <a:chOff x="0" y="0"/>
+          <a:chExt cx="0" cy="0"/>
+        </a:xfrm>
+      </p:grpSpPr>
+      <p:sp>
+        <p:nvSpPr>
+          <p:cNvPr id="2" name="Title 1"/>
+          <p:cNvSpPr>
+            <a:spLocks noGrp="1"/>
+          </p:cNvSpPr>
+          <p:nvPr>
+            <p:ph type="title"/>
+          </p:nvPr>
+        </p:nvSpPr>
+        <p:spPr>
+          <a:xfrm>
+            <a:off x="1115616" y="908720"/>
+            <a:ext cx="6696075" cy="720080"/>
+          </a:xfrm>
+        </p:spPr>
+        <p:txBody>
+          <a:bodyPr/>
+          <a:lstStyle/>
+          <a:p>
+            <a:r>
+              <a:rPr lang="en-US" sz="3000" dirty="0" smtClean="0"/>
+              <a:t>Imagine…</a:t>
+            </a:r>
+            <a:endParaRPr lang="en-US" sz="3000" dirty="0"/>
+          </a:p>
+        </p:txBody>
+      </p:sp>
+      <p:sp>
+        <p:nvSpPr>
+          <p:cNvPr id="3" name="Content Placeholder 2"/>
+          <p:cNvSpPr>
+            <a:spLocks noGrp="1"/>
+          </p:cNvSpPr>
+          <p:nvPr>
+            <p:ph idx="1"/>
+          </p:nvPr>
+        </p:nvSpPr>
+        <p:spPr>
+          <a:xfrm>
+            <a:off x="1331913" y="4581128"/>
+            <a:ext cx="4896271" cy="1286272"/>
+          </a:xfrm>
+        </p:spPr>
+        <p:txBody>
+          <a:bodyPr/>
+          <a:lstStyle/>
+          <a:p>
+            <a:endParaRPr lang="en-US" dirty="0"/>
+          </a:p>
+          <a:p>
+            <a:endParaRPr lang="en-US" dirty="0"/>
+          </a:p>
+        </p:txBody>
+      </p:sp>
+      <p:pic>
+        <p:nvPicPr>
+          <p:cNvPr id="4" name="Picture 3" descr="imagine2.png"/>
+          <p:cNvPicPr>
+            <a:picLocks noChangeAspect="1"/>
+          </p:cNvPicPr>
+          <p:nvPr/>
+        </p:nvPicPr>
+        <p:blipFill>
+          <a:blip r:embed="rId3">
+            <a:extLst>
+              <a:ext uri="{28A0092B-C50C-407E-A947-70E740481C1C}">
+                <a14:useLocalDpi xmlns:a14="http://schemas.microsoft.com/office/drawing/2010/main" xmlns="" val="0"/>
+              </a:ext>
+            </a:extLst>
+          </a:blip>
+          <a:stretch>
+            <a:fillRect/>
+          </a:stretch>
+        </p:blipFill>
+        <p:spPr>
+          <a:xfrm rot="21108910">
+            <a:off x="614528" y="1002182"/>
+            <a:ext cx="7926316" cy="4655138"/>
+          </a:xfrm>
+          <a:prstGeom prst="rect">
+            <a:avLst/>
+          </a:prstGeom>
+        </p:spPr>
+      </p:pic>
+    </p:spTree>
+    <p:extLst>
+      <p:ext uri="{BB962C8B-B14F-4D97-AF65-F5344CB8AC3E}">
+        <p14:creationId xmlns:p14="http://schemas.microsoft.com/office/powerpoint/2010/main" xmlns="" val="1747213286"/>
+      </p:ext>
+    </p:extLst>
+  </p:cSld>
+  <p:clrMapOvr>
+    <a:masterClrMapping/>
+  </p:clrMapOvr>
+</p:sld>
+</file>
+
+<file path=ppt/slides/slide4.xml><?xml version="1.0" encoding="utf-8"?>
+<p:sld xmlns:a="http://schemas.openxmlformats.org/drawingml/2006/main" xmlns:r="http://schemas.openxmlformats.org/officeDocument/2006/relationships" xmlns:p="http://schemas.openxmlformats.org/presentationml/2006/main">
+  <p:cSld>
+    <p:bg>
+      <p:bgPr>
+        <a:blipFill dpi="0" rotWithShape="1">
+          <a:blip r:embed="rId2"/>
+          <a:srcRect/>
+          <a:stretch>
+            <a:fillRect/>
+          </a:stretch>
+        </a:blipFill>
+        <a:effectLst/>
+      </p:bgPr>
+    </p:bg>
+    <p:spTree>
+      <p:nvGrpSpPr>
+        <p:cNvPr id="1" name=""/>
+        <p:cNvGrpSpPr/>
+        <p:nvPr/>
+      </p:nvGrpSpPr>
+      <p:grpSpPr>
+        <a:xfrm>
+          <a:off x="0" y="0"/>
+          <a:ext cx="0" cy="0"/>
+          <a:chOff x="0" y="0"/>
+          <a:chExt cx="0" cy="0"/>
+        </a:xfrm>
+      </p:grpSpPr>
+      <p:sp>
+        <p:nvSpPr>
+          <p:cNvPr id="2" name="Title 1"/>
+          <p:cNvSpPr>
+            <a:spLocks noGrp="1"/>
+          </p:cNvSpPr>
+          <p:nvPr>
+            <p:ph type="title"/>
+          </p:nvPr>
+        </p:nvSpPr>
+        <p:spPr>
+          <a:xfrm>
+            <a:off x="611560" y="692696"/>
+            <a:ext cx="8038698" cy="1141413"/>
+          </a:xfrm>
+        </p:spPr>
+        <p:txBody>
+          <a:bodyPr/>
+          <a:lstStyle/>
+          <a:p>
+            <a:r>
+              <a:rPr lang="en-GB" sz="3000" dirty="0"/>
+              <a:t>Natalie’s story: No escape </a:t>
+            </a:r>
+            <a:r>
+              <a:rPr lang="en-GB" sz="3000" dirty="0" smtClean="0"/>
+              <a:t>from </a:t>
+            </a:r>
+            <a:r>
+              <a:rPr lang="en-GB" sz="3000" dirty="0"/>
+              <a:t>bullying</a:t>
+            </a:r>
+            <a:endParaRPr lang="en-US" sz="3000" dirty="0"/>
           </a:p>
         </p:txBody>
       </p:sp>
@@ -28641,8 +28685,8 @@
         </p:nvSpPr>
         <p:spPr bwMode="auto">
           <a:xfrm>
-            <a:off x="1187624" y="980728"/>
-            <a:ext cx="6840760" cy="556179"/>
+            <a:off x="1187624" y="5546989"/>
+            <a:ext cx="6840760" cy="402291"/>
           </a:xfrm>
           <a:prstGeom prst="rect">
             <a:avLst/>
@@ -28654,14 +28698,14 @@
           <a:effectLst/>
           <a:extLst>
             <a:ext uri="{909E8E84-426E-40dd-AFC4-6F175D3DCCD1}">
-              <a14:hiddenFill xmlns:a14="http://schemas.microsoft.com/office/drawing/2010/main">
+              <a14:hiddenFill xmlns:a14="http://schemas.microsoft.com/office/drawing/2010/main" xmlns="">
                 <a:solidFill>
                   <a:srgbClr val="FFFFFF"/>
                 </a:solidFill>
               </a14:hiddenFill>
             </a:ext>
             <a:ext uri="{91240B29-F687-4f45-9708-019B960494DF}">
-              <a14:hiddenLine xmlns:a14="http://schemas.microsoft.com/office/drawing/2010/main" w="9525" cap="flat">
+              <a14:hiddenLine xmlns:a14="http://schemas.microsoft.com/office/drawing/2010/main" xmlns="" w="9525" cap="flat">
                 <a:solidFill>
                   <a:srgbClr val="808080"/>
                 </a:solidFill>
@@ -28671,7 +28715,7 @@
               </a14:hiddenLine>
             </a:ext>
             <a:ext uri="{AF507438-7753-43e0-B8FC-AC1667EBCBE1}">
-              <a14:hiddenEffects xmlns:a14="http://schemas.microsoft.com/office/drawing/2010/main">
+              <a14:hiddenEffects xmlns:a14="http://schemas.microsoft.com/office/drawing/2010/main" xmlns="">
                 <a:effectLst>
                   <a:outerShdw blurRad="63500" dist="38099" dir="2700000" algn="ctr" rotWithShape="0">
                     <a:srgbClr val="000000">
@@ -28957,22 +29001,33 @@
               <a:defRPr/>
             </a:pPr>
             <a:r>
-              <a:rPr lang="en-GB" sz="3000" dirty="0" smtClean="0">
+              <a:rPr lang="en-GB" sz="2000" dirty="0">
                 <a:solidFill>
                   <a:schemeClr val="bg1"/>
                 </a:solidFill>
+                <a:hlinkClick r:id="rId3"/>
               </a:rPr>
-              <a:t>Breathe Me by </a:t>
-            </a:r>
-            <a:r>
-              <a:rPr lang="en-GB" sz="3000" dirty="0" err="1" smtClean="0">
+              <a:t>http://</a:t>
+            </a:r>
+            <a:r>
+              <a:rPr lang="en-GB" sz="2000" dirty="0" err="1">
                 <a:solidFill>
                   <a:schemeClr val="bg1"/>
                 </a:solidFill>
+                <a:hlinkClick r:id="rId3"/>
               </a:rPr>
-              <a:t>Sia</a:t>
-            </a:r>
-            <a:endParaRPr lang="en-GB" sz="3000" dirty="0" smtClean="0">
+              <a:t>goo.gl</a:t>
+            </a:r>
+            <a:r>
+              <a:rPr lang="en-GB" sz="2000" dirty="0">
+                <a:solidFill>
+                  <a:schemeClr val="bg1"/>
+                </a:solidFill>
+                <a:hlinkClick r:id="rId3"/>
+              </a:rPr>
+              <a:t>/wW9pKH</a:t>
+            </a:r>
+            <a:endParaRPr lang="en-GB" sz="2000" dirty="0" smtClean="0">
               <a:solidFill>
                 <a:schemeClr val="bg1"/>
               </a:solidFill>
@@ -28980,50 +29035,51 @@
           </a:p>
         </p:txBody>
       </p:sp>
+      <p:pic>
+        <p:nvPicPr>
+          <p:cNvPr id="3" name="Picture 2"/>
+          <p:cNvPicPr>
+            <a:picLocks noChangeAspect="1"/>
+          </p:cNvPicPr>
+          <p:nvPr/>
+        </p:nvPicPr>
+        <p:blipFill>
+          <a:blip r:embed="rId4"/>
+          <a:stretch>
+            <a:fillRect/>
+          </a:stretch>
+        </p:blipFill>
+        <p:spPr>
+          <a:xfrm>
+            <a:off x="2058144" y="1687624"/>
+            <a:ext cx="5106144" cy="3829608"/>
+          </a:xfrm>
+          <a:prstGeom prst="rect">
+            <a:avLst/>
+          </a:prstGeom>
+        </p:spPr>
+      </p:pic>
     </p:spTree>
     <p:extLst>
       <p:ext uri="{BB962C8B-B14F-4D97-AF65-F5344CB8AC3E}">
-        <p14:creationId xmlns:p14="http://schemas.microsoft.com/office/powerpoint/2010/main" val="721097687"/>
+        <p14:creationId xmlns:p14="http://schemas.microsoft.com/office/powerpoint/2010/main" xmlns="" val="3679195879"/>
       </p:ext>
     </p:extLst>
   </p:cSld>
   <p:clrMapOvr>
     <a:masterClrMapping/>
   </p:clrMapOvr>
-  <p:transition xmlns:p14="http://schemas.microsoft.com/office/powerpoint/2010/main">
-    <p:fade thruBlk="1"/>
-  </p:transition>
   <p:timing>
     <p:tnLst>
       <p:par>
-        <p:cTn xmlns:p14="http://schemas.microsoft.com/office/powerpoint/2010/main" id="1" dur="indefinite" restart="never" nodeType="tmRoot">
-          <p:childTnLst>
-            <p:seq concurrent="1" nextAc="seek">
-              <p:cTn id="2" dur="0" nodeType="mainSeq"/>
-              <p:prevCondLst>
-                <p:cond evt="onPrev" delay="0">
-                  <p:tgtEl>
-                    <p:sldTgt/>
-                  </p:tgtEl>
-                </p:cond>
-              </p:prevCondLst>
-              <p:nextCondLst>
-                <p:cond evt="onNext" delay="0">
-                  <p:tgtEl>
-                    <p:sldTgt/>
-                  </p:tgtEl>
-                </p:cond>
-              </p:nextCondLst>
-            </p:seq>
-          </p:childTnLst>
-        </p:cTn>
+        <p:cTn id="1" dur="indefinite" restart="never" nodeType="tmRoot"/>
       </p:par>
     </p:tnLst>
   </p:timing>
 </p:sld>
 </file>
 
-<file path=ppt/slides/slide3.xml><?xml version="1.0" encoding="utf-8"?>
+<file path=ppt/slides/slide5.xml><?xml version="1.0" encoding="utf-8"?>
 <p:sld xmlns:a="http://schemas.openxmlformats.org/drawingml/2006/main" xmlns:r="http://schemas.openxmlformats.org/officeDocument/2006/relationships" xmlns:p="http://schemas.openxmlformats.org/presentationml/2006/main">
   <p:cSld>
     <p:bg>
@@ -29064,8 +29120,8 @@
         </p:nvSpPr>
         <p:spPr>
           <a:xfrm>
-            <a:off x="1115616" y="908720"/>
-            <a:ext cx="6696075" cy="720080"/>
+            <a:off x="1259632" y="692696"/>
+            <a:ext cx="6696075" cy="1141413"/>
           </a:xfrm>
         </p:spPr>
         <p:txBody>
@@ -29073,43 +29129,16 @@
           <a:lstStyle/>
           <a:p>
             <a:r>
-              <a:rPr lang="en-US" sz="3000" dirty="0" smtClean="0"/>
-              <a:t>Imagine…</a:t>
-            </a:r>
-            <a:endParaRPr lang="en-US" sz="3000" dirty="0"/>
-          </a:p>
-        </p:txBody>
-      </p:sp>
-      <p:sp>
-        <p:nvSpPr>
-          <p:cNvPr id="3" name="Content Placeholder 2"/>
-          <p:cNvSpPr>
-            <a:spLocks noGrp="1"/>
-          </p:cNvSpPr>
-          <p:nvPr>
-            <p:ph idx="1"/>
-          </p:nvPr>
-        </p:nvSpPr>
-        <p:spPr>
-          <a:xfrm>
-            <a:off x="1331913" y="4581128"/>
-            <a:ext cx="4896271" cy="1286272"/>
-          </a:xfrm>
-        </p:spPr>
-        <p:txBody>
-          <a:bodyPr/>
-          <a:lstStyle/>
-          <a:p>
-            <a:endParaRPr lang="en-US" dirty="0"/>
-          </a:p>
-          <a:p>
-            <a:endParaRPr lang="en-US" dirty="0"/>
+              <a:rPr lang="en-GB" sz="3000" dirty="0" smtClean="0"/>
+              <a:t>Let’s be honest…</a:t>
+            </a:r>
+            <a:endParaRPr lang="en-GB" sz="3000" dirty="0"/>
           </a:p>
         </p:txBody>
       </p:sp>
       <p:pic>
         <p:nvPicPr>
-          <p:cNvPr id="4" name="Picture 3" descr="imagine2.png"/>
+          <p:cNvPr id="10" name="Picture 9" descr="pinocchio.png"/>
           <p:cNvPicPr>
             <a:picLocks noChangeAspect="1"/>
           </p:cNvPicPr>
@@ -29119,7 +29148,7 @@
           <a:blip r:embed="rId3">
             <a:extLst>
               <a:ext uri="{28A0092B-C50C-407E-A947-70E740481C1C}">
-                <a14:useLocalDpi xmlns:a14="http://schemas.microsoft.com/office/drawing/2010/main" val="0"/>
+                <a14:useLocalDpi xmlns:a14="http://schemas.microsoft.com/office/drawing/2010/main" xmlns="" val="0"/>
               </a:ext>
             </a:extLst>
           </a:blip>
@@ -29128,9 +29157,9 @@
           </a:stretch>
         </p:blipFill>
         <p:spPr>
-          <a:xfrm rot="21108910">
-            <a:off x="614528" y="1002182"/>
-            <a:ext cx="7926316" cy="4655138"/>
+          <a:xfrm>
+            <a:off x="1570980" y="1628800"/>
+            <a:ext cx="6169372" cy="4460930"/>
           </a:xfrm>
           <a:prstGeom prst="rect">
             <a:avLst/>
@@ -29140,7 +29169,7 @@
     </p:spTree>
     <p:extLst>
       <p:ext uri="{BB962C8B-B14F-4D97-AF65-F5344CB8AC3E}">
-        <p14:creationId xmlns:p14="http://schemas.microsoft.com/office/powerpoint/2010/main" val="1747213286"/>
+        <p14:creationId xmlns:p14="http://schemas.microsoft.com/office/powerpoint/2010/main" xmlns="" val="3640415234"/>
       </p:ext>
     </p:extLst>
   </p:cSld>
@@ -29150,7 +29179,94 @@
 </p:sld>
 </file>
 
-<file path=ppt/slides/slide4.xml><?xml version="1.0" encoding="utf-8"?>
+<file path=ppt/slides/slide6.xml><?xml version="1.0" encoding="utf-8"?>
+<p:sld xmlns:a="http://schemas.openxmlformats.org/drawingml/2006/main" xmlns:r="http://schemas.openxmlformats.org/officeDocument/2006/relationships" xmlns:p="http://schemas.openxmlformats.org/presentationml/2006/main">
+  <p:cSld>
+    <p:spTree>
+      <p:nvGrpSpPr>
+        <p:cNvPr id="1" name=""/>
+        <p:cNvGrpSpPr/>
+        <p:nvPr/>
+      </p:nvGrpSpPr>
+      <p:grpSpPr>
+        <a:xfrm>
+          <a:off x="0" y="0"/>
+          <a:ext cx="0" cy="0"/>
+          <a:chOff x="0" y="0"/>
+          <a:chExt cx="0" cy="0"/>
+        </a:xfrm>
+      </p:grpSpPr>
+      <p:sp>
+        <p:nvSpPr>
+          <p:cNvPr id="2" name="Title 1"/>
+          <p:cNvSpPr>
+            <a:spLocks noGrp="1"/>
+          </p:cNvSpPr>
+          <p:nvPr>
+            <p:ph type="title"/>
+          </p:nvPr>
+        </p:nvSpPr>
+        <p:spPr>
+          <a:xfrm>
+            <a:off x="1259632" y="703411"/>
+            <a:ext cx="6696075" cy="1141413"/>
+          </a:xfrm>
+        </p:spPr>
+        <p:txBody>
+          <a:bodyPr/>
+          <a:lstStyle/>
+          <a:p>
+            <a:r>
+              <a:rPr lang="en-GB" sz="3000" dirty="0"/>
+              <a:t>Banding together </a:t>
+            </a:r>
+          </a:p>
+        </p:txBody>
+      </p:sp>
+      <p:pic>
+        <p:nvPicPr>
+          <p:cNvPr id="13" name="Picture 12" descr="banding-together4.png"/>
+          <p:cNvPicPr>
+            <a:picLocks noChangeAspect="1"/>
+          </p:cNvPicPr>
+          <p:nvPr/>
+        </p:nvPicPr>
+        <p:blipFill>
+          <a:blip r:embed="rId2">
+            <a:extLst>
+              <a:ext uri="{28A0092B-C50C-407E-A947-70E740481C1C}">
+                <a14:useLocalDpi xmlns:a14="http://schemas.microsoft.com/office/drawing/2010/main" xmlns="" val="0"/>
+              </a:ext>
+            </a:extLst>
+          </a:blip>
+          <a:stretch>
+            <a:fillRect/>
+          </a:stretch>
+        </p:blipFill>
+        <p:spPr>
+          <a:xfrm>
+            <a:off x="169416" y="2708920"/>
+            <a:ext cx="8723064" cy="3489226"/>
+          </a:xfrm>
+          <a:prstGeom prst="rect">
+            <a:avLst/>
+          </a:prstGeom>
+        </p:spPr>
+      </p:pic>
+    </p:spTree>
+    <p:extLst>
+      <p:ext uri="{BB962C8B-B14F-4D97-AF65-F5344CB8AC3E}">
+        <p14:creationId xmlns:p14="http://schemas.microsoft.com/office/powerpoint/2010/main" xmlns="" val="17987638"/>
+      </p:ext>
+    </p:extLst>
+  </p:cSld>
+  <p:clrMapOvr>
+    <a:masterClrMapping/>
+  </p:clrMapOvr>
+</p:sld>
+</file>
+
+<file path=ppt/slides/slide7.xml><?xml version="1.0" encoding="utf-8"?>
 <p:sld xmlns:a="http://schemas.openxmlformats.org/drawingml/2006/main" xmlns:r="http://schemas.openxmlformats.org/officeDocument/2006/relationships" xmlns:p="http://schemas.openxmlformats.org/presentationml/2006/main">
   <p:cSld>
     <p:bg>
@@ -29191,8 +29307,8 @@
         </p:nvSpPr>
         <p:spPr>
           <a:xfrm>
-            <a:off x="611560" y="692696"/>
-            <a:ext cx="8038698" cy="1141413"/>
+            <a:off x="1187624" y="692696"/>
+            <a:ext cx="6696075" cy="1141413"/>
           </a:xfrm>
         </p:spPr>
         <p:txBody>
@@ -29200,24 +29316,16 @@
           <a:lstStyle/>
           <a:p>
             <a:r>
-              <a:rPr lang="en-GB" sz="3000" dirty="0"/>
-              <a:t>Natalie’s story: No escape </a:t>
-            </a:r>
-            <a:r>
               <a:rPr lang="en-GB" sz="3000" dirty="0" smtClean="0"/>
-              <a:t>from </a:t>
-            </a:r>
-            <a:r>
-              <a:rPr lang="en-GB" sz="3000" dirty="0"/>
-              <a:t>bullying</a:t>
-            </a:r>
-            <a:endParaRPr lang="en-US" sz="3000" dirty="0"/>
-          </a:p>
-        </p:txBody>
-      </p:sp>
-      <p:sp>
-        <p:nvSpPr>
-          <p:cNvPr id="6" name="Text Box 2"/>
+              <a:t>More than just a word</a:t>
+            </a:r>
+            <a:endParaRPr lang="en-GB" sz="3000" dirty="0"/>
+          </a:p>
+        </p:txBody>
+      </p:sp>
+      <p:sp>
+        <p:nvSpPr>
+          <p:cNvPr id="7" name="Text Box 2"/>
           <p:cNvSpPr txBox="1">
             <a:spLocks noChangeArrowheads="1"/>
           </p:cNvSpPr>
@@ -29225,8 +29333,8 @@
         </p:nvSpPr>
         <p:spPr bwMode="auto">
           <a:xfrm>
-            <a:off x="1187624" y="5546989"/>
-            <a:ext cx="6840760" cy="402291"/>
+            <a:off x="1187624" y="5311221"/>
+            <a:ext cx="6840760" cy="710067"/>
           </a:xfrm>
           <a:prstGeom prst="rect">
             <a:avLst/>
@@ -29238,14 +29346,14 @@
           <a:effectLst/>
           <a:extLst>
             <a:ext uri="{909E8E84-426E-40dd-AFC4-6F175D3DCCD1}">
-              <a14:hiddenFill xmlns:a14="http://schemas.microsoft.com/office/drawing/2010/main">
+              <a14:hiddenFill xmlns:a14="http://schemas.microsoft.com/office/drawing/2010/main" xmlns="">
                 <a:solidFill>
                   <a:srgbClr val="FFFFFF"/>
                 </a:solidFill>
               </a14:hiddenFill>
             </a:ext>
             <a:ext uri="{91240B29-F687-4f45-9708-019B960494DF}">
-              <a14:hiddenLine xmlns:a14="http://schemas.microsoft.com/office/drawing/2010/main" w="9525" cap="flat">
+              <a14:hiddenLine xmlns:a14="http://schemas.microsoft.com/office/drawing/2010/main" xmlns="" w="9525" cap="flat">
                 <a:solidFill>
                   <a:srgbClr val="808080"/>
                 </a:solidFill>
@@ -29255,7 +29363,7 @@
               </a14:hiddenLine>
             </a:ext>
             <a:ext uri="{AF507438-7753-43e0-B8FC-AC1667EBCBE1}">
-              <a14:hiddenEffects xmlns:a14="http://schemas.microsoft.com/office/drawing/2010/main">
+              <a14:hiddenEffects xmlns:a14="http://schemas.microsoft.com/office/drawing/2010/main" xmlns="">
                 <a:effectLst>
                   <a:outerShdw blurRad="63500" dist="38099" dir="2700000" algn="ctr" rotWithShape="0">
                     <a:srgbClr val="000000">
@@ -29541,654 +29649,6 @@
               <a:defRPr/>
             </a:pPr>
             <a:r>
-              <a:rPr lang="en-GB" sz="2000" dirty="0">
-                <a:solidFill>
-                  <a:schemeClr val="bg1"/>
-                </a:solidFill>
-                <a:hlinkClick r:id="rId3"/>
-              </a:rPr>
-              <a:t>http://</a:t>
-            </a:r>
-            <a:r>
-              <a:rPr lang="en-GB" sz="2000" dirty="0" err="1">
-                <a:solidFill>
-                  <a:schemeClr val="bg1"/>
-                </a:solidFill>
-                <a:hlinkClick r:id="rId3"/>
-              </a:rPr>
-              <a:t>goo.gl</a:t>
-            </a:r>
-            <a:r>
-              <a:rPr lang="en-GB" sz="2000" dirty="0">
-                <a:solidFill>
-                  <a:schemeClr val="bg1"/>
-                </a:solidFill>
-                <a:hlinkClick r:id="rId3"/>
-              </a:rPr>
-              <a:t>/wW9pKH</a:t>
-            </a:r>
-            <a:endParaRPr lang="en-GB" sz="2000" dirty="0" smtClean="0">
-              <a:solidFill>
-                <a:schemeClr val="bg1"/>
-              </a:solidFill>
-            </a:endParaRPr>
-          </a:p>
-        </p:txBody>
-      </p:sp>
-      <p:pic>
-        <p:nvPicPr>
-          <p:cNvPr id="3" name="Picture 2"/>
-          <p:cNvPicPr>
-            <a:picLocks noChangeAspect="1"/>
-          </p:cNvPicPr>
-          <p:nvPr/>
-        </p:nvPicPr>
-        <p:blipFill>
-          <a:blip r:embed="rId4"/>
-          <a:stretch>
-            <a:fillRect/>
-          </a:stretch>
-        </p:blipFill>
-        <p:spPr>
-          <a:xfrm>
-            <a:off x="2058144" y="1687624"/>
-            <a:ext cx="5106144" cy="3829608"/>
-          </a:xfrm>
-          <a:prstGeom prst="rect">
-            <a:avLst/>
-          </a:prstGeom>
-        </p:spPr>
-      </p:pic>
-    </p:spTree>
-    <p:extLst>
-      <p:ext uri="{BB962C8B-B14F-4D97-AF65-F5344CB8AC3E}">
-        <p14:creationId xmlns:p14="http://schemas.microsoft.com/office/powerpoint/2010/main" val="3679195879"/>
-      </p:ext>
-    </p:extLst>
-  </p:cSld>
-  <p:clrMapOvr>
-    <a:masterClrMapping/>
-  </p:clrMapOvr>
-  <p:timing>
-    <p:tnLst>
-      <p:par>
-        <p:cTn xmlns:p14="http://schemas.microsoft.com/office/powerpoint/2010/main" id="1" dur="indefinite" restart="never" nodeType="tmRoot"/>
-      </p:par>
-    </p:tnLst>
-  </p:timing>
-</p:sld>
-</file>
-
-<file path=ppt/slides/slide5.xml><?xml version="1.0" encoding="utf-8"?>
-<p:sld xmlns:a="http://schemas.openxmlformats.org/drawingml/2006/main" xmlns:r="http://schemas.openxmlformats.org/officeDocument/2006/relationships" xmlns:p="http://schemas.openxmlformats.org/presentationml/2006/main">
-  <p:cSld>
-    <p:bg>
-      <p:bgPr>
-        <a:blipFill dpi="0" rotWithShape="1">
-          <a:blip r:embed="rId2"/>
-          <a:srcRect/>
-          <a:stretch>
-            <a:fillRect/>
-          </a:stretch>
-        </a:blipFill>
-        <a:effectLst/>
-      </p:bgPr>
-    </p:bg>
-    <p:spTree>
-      <p:nvGrpSpPr>
-        <p:cNvPr id="1" name=""/>
-        <p:cNvGrpSpPr/>
-        <p:nvPr/>
-      </p:nvGrpSpPr>
-      <p:grpSpPr>
-        <a:xfrm>
-          <a:off x="0" y="0"/>
-          <a:ext cx="0" cy="0"/>
-          <a:chOff x="0" y="0"/>
-          <a:chExt cx="0" cy="0"/>
-        </a:xfrm>
-      </p:grpSpPr>
-      <p:sp>
-        <p:nvSpPr>
-          <p:cNvPr id="2" name="Title 1"/>
-          <p:cNvSpPr>
-            <a:spLocks noGrp="1"/>
-          </p:cNvSpPr>
-          <p:nvPr>
-            <p:ph type="title"/>
-          </p:nvPr>
-        </p:nvSpPr>
-        <p:spPr>
-          <a:xfrm>
-            <a:off x="1259632" y="692696"/>
-            <a:ext cx="6696075" cy="1141413"/>
-          </a:xfrm>
-        </p:spPr>
-        <p:txBody>
-          <a:bodyPr/>
-          <a:lstStyle/>
-          <a:p>
-            <a:r>
-              <a:rPr lang="en-GB" sz="3000" dirty="0" smtClean="0"/>
-              <a:t>Let’s be honest…</a:t>
-            </a:r>
-            <a:endParaRPr lang="en-GB" sz="3000" dirty="0"/>
-          </a:p>
-        </p:txBody>
-      </p:sp>
-      <p:pic>
-        <p:nvPicPr>
-          <p:cNvPr id="10" name="Picture 9" descr="pinocchio.png"/>
-          <p:cNvPicPr>
-            <a:picLocks noChangeAspect="1"/>
-          </p:cNvPicPr>
-          <p:nvPr/>
-        </p:nvPicPr>
-        <p:blipFill>
-          <a:blip r:embed="rId3">
-            <a:extLst>
-              <a:ext uri="{28A0092B-C50C-407E-A947-70E740481C1C}">
-                <a14:useLocalDpi xmlns:a14="http://schemas.microsoft.com/office/drawing/2010/main" val="0"/>
-              </a:ext>
-            </a:extLst>
-          </a:blip>
-          <a:stretch>
-            <a:fillRect/>
-          </a:stretch>
-        </p:blipFill>
-        <p:spPr>
-          <a:xfrm>
-            <a:off x="1570980" y="1628800"/>
-            <a:ext cx="6169372" cy="4460930"/>
-          </a:xfrm>
-          <a:prstGeom prst="rect">
-            <a:avLst/>
-          </a:prstGeom>
-        </p:spPr>
-      </p:pic>
-    </p:spTree>
-    <p:extLst>
-      <p:ext uri="{BB962C8B-B14F-4D97-AF65-F5344CB8AC3E}">
-        <p14:creationId xmlns:p14="http://schemas.microsoft.com/office/powerpoint/2010/main" val="3640415234"/>
-      </p:ext>
-    </p:extLst>
-  </p:cSld>
-  <p:clrMapOvr>
-    <a:masterClrMapping/>
-  </p:clrMapOvr>
-</p:sld>
-</file>
-
-<file path=ppt/slides/slide6.xml><?xml version="1.0" encoding="utf-8"?>
-<p:sld xmlns:a="http://schemas.openxmlformats.org/drawingml/2006/main" xmlns:r="http://schemas.openxmlformats.org/officeDocument/2006/relationships" xmlns:p="http://schemas.openxmlformats.org/presentationml/2006/main">
-  <p:cSld>
-    <p:spTree>
-      <p:nvGrpSpPr>
-        <p:cNvPr id="1" name=""/>
-        <p:cNvGrpSpPr/>
-        <p:nvPr/>
-      </p:nvGrpSpPr>
-      <p:grpSpPr>
-        <a:xfrm>
-          <a:off x="0" y="0"/>
-          <a:ext cx="0" cy="0"/>
-          <a:chOff x="0" y="0"/>
-          <a:chExt cx="0" cy="0"/>
-        </a:xfrm>
-      </p:grpSpPr>
-      <p:sp>
-        <p:nvSpPr>
-          <p:cNvPr id="2" name="Title 1"/>
-          <p:cNvSpPr>
-            <a:spLocks noGrp="1"/>
-          </p:cNvSpPr>
-          <p:nvPr>
-            <p:ph type="title"/>
-          </p:nvPr>
-        </p:nvSpPr>
-        <p:spPr>
-          <a:xfrm>
-            <a:off x="1259632" y="703411"/>
-            <a:ext cx="6696075" cy="1141413"/>
-          </a:xfrm>
-        </p:spPr>
-        <p:txBody>
-          <a:bodyPr/>
-          <a:lstStyle/>
-          <a:p>
-            <a:r>
-              <a:rPr lang="en-GB" sz="3000" dirty="0"/>
-              <a:t>Banding together </a:t>
-            </a:r>
-          </a:p>
-        </p:txBody>
-      </p:sp>
-      <p:pic>
-        <p:nvPicPr>
-          <p:cNvPr id="13" name="Picture 12" descr="banding-together4.png"/>
-          <p:cNvPicPr>
-            <a:picLocks noChangeAspect="1"/>
-          </p:cNvPicPr>
-          <p:nvPr/>
-        </p:nvPicPr>
-        <p:blipFill>
-          <a:blip r:embed="rId2">
-            <a:extLst>
-              <a:ext uri="{28A0092B-C50C-407E-A947-70E740481C1C}">
-                <a14:useLocalDpi xmlns:a14="http://schemas.microsoft.com/office/drawing/2010/main" val="0"/>
-              </a:ext>
-            </a:extLst>
-          </a:blip>
-          <a:stretch>
-            <a:fillRect/>
-          </a:stretch>
-        </p:blipFill>
-        <p:spPr>
-          <a:xfrm>
-            <a:off x="169416" y="2708920"/>
-            <a:ext cx="8723064" cy="3489226"/>
-          </a:xfrm>
-          <a:prstGeom prst="rect">
-            <a:avLst/>
-          </a:prstGeom>
-        </p:spPr>
-      </p:pic>
-    </p:spTree>
-    <p:extLst>
-      <p:ext uri="{BB962C8B-B14F-4D97-AF65-F5344CB8AC3E}">
-        <p14:creationId xmlns:p14="http://schemas.microsoft.com/office/powerpoint/2010/main" val="17987638"/>
-      </p:ext>
-    </p:extLst>
-  </p:cSld>
-  <p:clrMapOvr>
-    <a:masterClrMapping/>
-  </p:clrMapOvr>
-</p:sld>
-</file>
-
-<file path=ppt/slides/slide7.xml><?xml version="1.0" encoding="utf-8"?>
-<p:sld xmlns:a="http://schemas.openxmlformats.org/drawingml/2006/main" xmlns:r="http://schemas.openxmlformats.org/officeDocument/2006/relationships" xmlns:p="http://schemas.openxmlformats.org/presentationml/2006/main">
-  <p:cSld>
-    <p:bg>
-      <p:bgPr>
-        <a:blipFill dpi="0" rotWithShape="1">
-          <a:blip r:embed="rId2"/>
-          <a:srcRect/>
-          <a:stretch>
-            <a:fillRect/>
-          </a:stretch>
-        </a:blipFill>
-        <a:effectLst/>
-      </p:bgPr>
-    </p:bg>
-    <p:spTree>
-      <p:nvGrpSpPr>
-        <p:cNvPr id="1" name=""/>
-        <p:cNvGrpSpPr/>
-        <p:nvPr/>
-      </p:nvGrpSpPr>
-      <p:grpSpPr>
-        <a:xfrm>
-          <a:off x="0" y="0"/>
-          <a:ext cx="0" cy="0"/>
-          <a:chOff x="0" y="0"/>
-          <a:chExt cx="0" cy="0"/>
-        </a:xfrm>
-      </p:grpSpPr>
-      <p:sp>
-        <p:nvSpPr>
-          <p:cNvPr id="2" name="Title 1"/>
-          <p:cNvSpPr>
-            <a:spLocks noGrp="1"/>
-          </p:cNvSpPr>
-          <p:nvPr>
-            <p:ph type="title"/>
-          </p:nvPr>
-        </p:nvSpPr>
-        <p:spPr>
-          <a:xfrm>
-            <a:off x="1187624" y="692696"/>
-            <a:ext cx="6696075" cy="1141413"/>
-          </a:xfrm>
-        </p:spPr>
-        <p:txBody>
-          <a:bodyPr/>
-          <a:lstStyle/>
-          <a:p>
-            <a:r>
-              <a:rPr lang="en-GB" sz="3000" dirty="0" smtClean="0"/>
-              <a:t>More than just a word</a:t>
-            </a:r>
-            <a:endParaRPr lang="en-GB" sz="3000" dirty="0"/>
-          </a:p>
-        </p:txBody>
-      </p:sp>
-      <p:sp>
-        <p:nvSpPr>
-          <p:cNvPr id="7" name="Text Box 2"/>
-          <p:cNvSpPr txBox="1">
-            <a:spLocks noChangeArrowheads="1"/>
-          </p:cNvSpPr>
-          <p:nvPr/>
-        </p:nvSpPr>
-        <p:spPr bwMode="auto">
-          <a:xfrm>
-            <a:off x="1187624" y="5311221"/>
-            <a:ext cx="6840760" cy="710067"/>
-          </a:xfrm>
-          <a:prstGeom prst="rect">
-            <a:avLst/>
-          </a:prstGeom>
-          <a:noFill/>
-          <a:ln>
-            <a:noFill/>
-          </a:ln>
-          <a:effectLst/>
-          <a:extLst>
-            <a:ext uri="{909E8E84-426E-40dd-AFC4-6F175D3DCCD1}">
-              <a14:hiddenFill xmlns:a14="http://schemas.microsoft.com/office/drawing/2010/main">
-                <a:solidFill>
-                  <a:srgbClr val="FFFFFF"/>
-                </a:solidFill>
-              </a14:hiddenFill>
-            </a:ext>
-            <a:ext uri="{91240B29-F687-4f45-9708-019B960494DF}">
-              <a14:hiddenLine xmlns:a14="http://schemas.microsoft.com/office/drawing/2010/main" w="9525" cap="flat">
-                <a:solidFill>
-                  <a:srgbClr val="808080"/>
-                </a:solidFill>
-                <a:round/>
-                <a:headEnd/>
-                <a:tailEnd/>
-              </a14:hiddenLine>
-            </a:ext>
-            <a:ext uri="{AF507438-7753-43e0-B8FC-AC1667EBCBE1}">
-              <a14:hiddenEffects xmlns:a14="http://schemas.microsoft.com/office/drawing/2010/main">
-                <a:effectLst>
-                  <a:outerShdw blurRad="63500" dist="38099" dir="2700000" algn="ctr" rotWithShape="0">
-                    <a:srgbClr val="000000">
-                      <a:alpha val="74998"/>
-                    </a:srgbClr>
-                  </a:outerShdw>
-                </a:effectLst>
-              </a14:hiddenEffects>
-            </a:ext>
-          </a:extLst>
-        </p:spPr>
-        <p:txBody>
-          <a:bodyPr wrap="square" lIns="90000" tIns="46800" rIns="90000" bIns="46800">
-            <a:spAutoFit/>
-          </a:bodyPr>
-          <a:lstStyle>
-            <a:lvl1pPr>
-              <a:tabLst>
-                <a:tab pos="0" algn="l"/>
-                <a:tab pos="914400" algn="l"/>
-                <a:tab pos="1828800" algn="l"/>
-                <a:tab pos="2743200" algn="l"/>
-                <a:tab pos="3657600" algn="l"/>
-                <a:tab pos="4572000" algn="l"/>
-                <a:tab pos="5486400" algn="l"/>
-                <a:tab pos="6400800" algn="l"/>
-                <a:tab pos="7315200" algn="l"/>
-                <a:tab pos="8229600" algn="l"/>
-                <a:tab pos="9144000" algn="l"/>
-                <a:tab pos="10058400" algn="l"/>
-              </a:tabLst>
-              <a:defRPr>
-                <a:solidFill>
-                  <a:srgbClr val="000000"/>
-                </a:solidFill>
-                <a:latin typeface="Arial" charset="0"/>
-                <a:ea typeface="ＭＳ Ｐゴシック" charset="0"/>
-                <a:cs typeface="ＭＳ Ｐゴシック" charset="0"/>
-              </a:defRPr>
-            </a:lvl1pPr>
-            <a:lvl2pPr>
-              <a:tabLst>
-                <a:tab pos="0" algn="l"/>
-                <a:tab pos="914400" algn="l"/>
-                <a:tab pos="1828800" algn="l"/>
-                <a:tab pos="2743200" algn="l"/>
-                <a:tab pos="3657600" algn="l"/>
-                <a:tab pos="4572000" algn="l"/>
-                <a:tab pos="5486400" algn="l"/>
-                <a:tab pos="6400800" algn="l"/>
-                <a:tab pos="7315200" algn="l"/>
-                <a:tab pos="8229600" algn="l"/>
-                <a:tab pos="9144000" algn="l"/>
-                <a:tab pos="10058400" algn="l"/>
-              </a:tabLst>
-              <a:defRPr>
-                <a:solidFill>
-                  <a:srgbClr val="000000"/>
-                </a:solidFill>
-                <a:latin typeface="Arial" charset="0"/>
-                <a:ea typeface="ＭＳ Ｐゴシック" charset="0"/>
-                <a:cs typeface="ＭＳ Ｐゴシック" charset="0"/>
-              </a:defRPr>
-            </a:lvl2pPr>
-            <a:lvl3pPr>
-              <a:tabLst>
-                <a:tab pos="0" algn="l"/>
-                <a:tab pos="914400" algn="l"/>
-                <a:tab pos="1828800" algn="l"/>
-                <a:tab pos="2743200" algn="l"/>
-                <a:tab pos="3657600" algn="l"/>
-                <a:tab pos="4572000" algn="l"/>
-                <a:tab pos="5486400" algn="l"/>
-                <a:tab pos="6400800" algn="l"/>
-                <a:tab pos="7315200" algn="l"/>
-                <a:tab pos="8229600" algn="l"/>
-                <a:tab pos="9144000" algn="l"/>
-                <a:tab pos="10058400" algn="l"/>
-              </a:tabLst>
-              <a:defRPr>
-                <a:solidFill>
-                  <a:srgbClr val="000000"/>
-                </a:solidFill>
-                <a:latin typeface="Arial" charset="0"/>
-                <a:ea typeface="ＭＳ Ｐゴシック" charset="0"/>
-                <a:cs typeface="ＭＳ Ｐゴシック" charset="0"/>
-              </a:defRPr>
-            </a:lvl3pPr>
-            <a:lvl4pPr>
-              <a:tabLst>
-                <a:tab pos="0" algn="l"/>
-                <a:tab pos="914400" algn="l"/>
-                <a:tab pos="1828800" algn="l"/>
-                <a:tab pos="2743200" algn="l"/>
-                <a:tab pos="3657600" algn="l"/>
-                <a:tab pos="4572000" algn="l"/>
-                <a:tab pos="5486400" algn="l"/>
-                <a:tab pos="6400800" algn="l"/>
-                <a:tab pos="7315200" algn="l"/>
-                <a:tab pos="8229600" algn="l"/>
-                <a:tab pos="9144000" algn="l"/>
-                <a:tab pos="10058400" algn="l"/>
-              </a:tabLst>
-              <a:defRPr>
-                <a:solidFill>
-                  <a:srgbClr val="000000"/>
-                </a:solidFill>
-                <a:latin typeface="Arial" charset="0"/>
-                <a:ea typeface="ＭＳ Ｐゴシック" charset="0"/>
-                <a:cs typeface="ＭＳ Ｐゴシック" charset="0"/>
-              </a:defRPr>
-            </a:lvl4pPr>
-            <a:lvl5pPr>
-              <a:tabLst>
-                <a:tab pos="0" algn="l"/>
-                <a:tab pos="914400" algn="l"/>
-                <a:tab pos="1828800" algn="l"/>
-                <a:tab pos="2743200" algn="l"/>
-                <a:tab pos="3657600" algn="l"/>
-                <a:tab pos="4572000" algn="l"/>
-                <a:tab pos="5486400" algn="l"/>
-                <a:tab pos="6400800" algn="l"/>
-                <a:tab pos="7315200" algn="l"/>
-                <a:tab pos="8229600" algn="l"/>
-                <a:tab pos="9144000" algn="l"/>
-                <a:tab pos="10058400" algn="l"/>
-              </a:tabLst>
-              <a:defRPr>
-                <a:solidFill>
-                  <a:srgbClr val="000000"/>
-                </a:solidFill>
-                <a:latin typeface="Arial" charset="0"/>
-                <a:ea typeface="ＭＳ Ｐゴシック" charset="0"/>
-                <a:cs typeface="ＭＳ Ｐゴシック" charset="0"/>
-              </a:defRPr>
-            </a:lvl5pPr>
-            <a:lvl6pPr marL="2514600" indent="-228600" defTabSz="449263" fontAlgn="base">
-              <a:spcBef>
-                <a:spcPct val="0"/>
-              </a:spcBef>
-              <a:spcAft>
-                <a:spcPct val="0"/>
-              </a:spcAft>
-              <a:buClr>
-                <a:srgbClr val="000000"/>
-              </a:buClr>
-              <a:buSzPct val="100000"/>
-              <a:buFont typeface="Times New Roman" charset="0"/>
-              <a:tabLst>
-                <a:tab pos="0" algn="l"/>
-                <a:tab pos="914400" algn="l"/>
-                <a:tab pos="1828800" algn="l"/>
-                <a:tab pos="2743200" algn="l"/>
-                <a:tab pos="3657600" algn="l"/>
-                <a:tab pos="4572000" algn="l"/>
-                <a:tab pos="5486400" algn="l"/>
-                <a:tab pos="6400800" algn="l"/>
-                <a:tab pos="7315200" algn="l"/>
-                <a:tab pos="8229600" algn="l"/>
-                <a:tab pos="9144000" algn="l"/>
-                <a:tab pos="10058400" algn="l"/>
-              </a:tabLst>
-              <a:defRPr>
-                <a:solidFill>
-                  <a:srgbClr val="000000"/>
-                </a:solidFill>
-                <a:latin typeface="Arial" charset="0"/>
-                <a:ea typeface="ＭＳ Ｐゴシック" charset="0"/>
-                <a:cs typeface="ＭＳ Ｐゴシック" charset="0"/>
-              </a:defRPr>
-            </a:lvl6pPr>
-            <a:lvl7pPr marL="2971800" indent="-228600" defTabSz="449263" fontAlgn="base">
-              <a:spcBef>
-                <a:spcPct val="0"/>
-              </a:spcBef>
-              <a:spcAft>
-                <a:spcPct val="0"/>
-              </a:spcAft>
-              <a:buClr>
-                <a:srgbClr val="000000"/>
-              </a:buClr>
-              <a:buSzPct val="100000"/>
-              <a:buFont typeface="Times New Roman" charset="0"/>
-              <a:tabLst>
-                <a:tab pos="0" algn="l"/>
-                <a:tab pos="914400" algn="l"/>
-                <a:tab pos="1828800" algn="l"/>
-                <a:tab pos="2743200" algn="l"/>
-                <a:tab pos="3657600" algn="l"/>
-                <a:tab pos="4572000" algn="l"/>
-                <a:tab pos="5486400" algn="l"/>
-                <a:tab pos="6400800" algn="l"/>
-                <a:tab pos="7315200" algn="l"/>
-                <a:tab pos="8229600" algn="l"/>
-                <a:tab pos="9144000" algn="l"/>
-                <a:tab pos="10058400" algn="l"/>
-              </a:tabLst>
-              <a:defRPr>
-                <a:solidFill>
-                  <a:srgbClr val="000000"/>
-                </a:solidFill>
-                <a:latin typeface="Arial" charset="0"/>
-                <a:ea typeface="ＭＳ Ｐゴシック" charset="0"/>
-                <a:cs typeface="ＭＳ Ｐゴシック" charset="0"/>
-              </a:defRPr>
-            </a:lvl7pPr>
-            <a:lvl8pPr marL="3429000" indent="-228600" defTabSz="449263" fontAlgn="base">
-              <a:spcBef>
-                <a:spcPct val="0"/>
-              </a:spcBef>
-              <a:spcAft>
-                <a:spcPct val="0"/>
-              </a:spcAft>
-              <a:buClr>
-                <a:srgbClr val="000000"/>
-              </a:buClr>
-              <a:buSzPct val="100000"/>
-              <a:buFont typeface="Times New Roman" charset="0"/>
-              <a:tabLst>
-                <a:tab pos="0" algn="l"/>
-                <a:tab pos="914400" algn="l"/>
-                <a:tab pos="1828800" algn="l"/>
-                <a:tab pos="2743200" algn="l"/>
-                <a:tab pos="3657600" algn="l"/>
-                <a:tab pos="4572000" algn="l"/>
-                <a:tab pos="5486400" algn="l"/>
-                <a:tab pos="6400800" algn="l"/>
-                <a:tab pos="7315200" algn="l"/>
-                <a:tab pos="8229600" algn="l"/>
-                <a:tab pos="9144000" algn="l"/>
-                <a:tab pos="10058400" algn="l"/>
-              </a:tabLst>
-              <a:defRPr>
-                <a:solidFill>
-                  <a:srgbClr val="000000"/>
-                </a:solidFill>
-                <a:latin typeface="Arial" charset="0"/>
-                <a:ea typeface="ＭＳ Ｐゴシック" charset="0"/>
-                <a:cs typeface="ＭＳ Ｐゴシック" charset="0"/>
-              </a:defRPr>
-            </a:lvl8pPr>
-            <a:lvl9pPr marL="3886200" indent="-228600" defTabSz="449263" fontAlgn="base">
-              <a:spcBef>
-                <a:spcPct val="0"/>
-              </a:spcBef>
-              <a:spcAft>
-                <a:spcPct val="0"/>
-              </a:spcAft>
-              <a:buClr>
-                <a:srgbClr val="000000"/>
-              </a:buClr>
-              <a:buSzPct val="100000"/>
-              <a:buFont typeface="Times New Roman" charset="0"/>
-              <a:tabLst>
-                <a:tab pos="0" algn="l"/>
-                <a:tab pos="914400" algn="l"/>
-                <a:tab pos="1828800" algn="l"/>
-                <a:tab pos="2743200" algn="l"/>
-                <a:tab pos="3657600" algn="l"/>
-                <a:tab pos="4572000" algn="l"/>
-                <a:tab pos="5486400" algn="l"/>
-                <a:tab pos="6400800" algn="l"/>
-                <a:tab pos="7315200" algn="l"/>
-                <a:tab pos="8229600" algn="l"/>
-                <a:tab pos="9144000" algn="l"/>
-                <a:tab pos="10058400" algn="l"/>
-              </a:tabLst>
-              <a:defRPr>
-                <a:solidFill>
-                  <a:srgbClr val="000000"/>
-                </a:solidFill>
-                <a:latin typeface="Arial" charset="0"/>
-                <a:ea typeface="ＭＳ Ｐゴシック" charset="0"/>
-                <a:cs typeface="ＭＳ Ｐゴシック" charset="0"/>
-              </a:defRPr>
-            </a:lvl9pPr>
-          </a:lstStyle>
-          <a:p>
-            <a:pPr algn="ctr">
-              <a:buClrTx/>
-              <a:buFontTx/>
-              <a:buNone/>
-              <a:defRPr/>
-            </a:pPr>
-            <a:r>
               <a:rPr lang="en-GB" sz="2000" dirty="0" smtClean="0">
                 <a:solidFill>
                   <a:schemeClr val="bg1"/>
@@ -30293,7 +29753,7 @@
     </p:spTree>
     <p:extLst>
       <p:ext uri="{BB962C8B-B14F-4D97-AF65-F5344CB8AC3E}">
-        <p14:creationId xmlns:p14="http://schemas.microsoft.com/office/powerpoint/2010/main" val="2488781892"/>
+        <p14:creationId xmlns:p14="http://schemas.microsoft.com/office/powerpoint/2010/main" xmlns="" val="2488781892"/>
       </p:ext>
     </p:extLst>
   </p:cSld>
@@ -30303,7 +29763,7 @@
   <p:timing>
     <p:tnLst>
       <p:par>
-        <p:cTn xmlns:p14="http://schemas.microsoft.com/office/powerpoint/2010/main" id="1" dur="indefinite" restart="never" nodeType="tmRoot"/>
+        <p:cTn id="1" dur="indefinite" restart="never" nodeType="tmRoot"/>
       </p:par>
     </p:tnLst>
   </p:timing>
@@ -30379,7 +29839,7 @@
           <a:blip r:embed="rId3">
             <a:extLst>
               <a:ext uri="{28A0092B-C50C-407E-A947-70E740481C1C}">
-                <a14:useLocalDpi xmlns:a14="http://schemas.microsoft.com/office/drawing/2010/main" val="0"/>
+                <a14:useLocalDpi xmlns:a14="http://schemas.microsoft.com/office/drawing/2010/main" xmlns="" val="0"/>
               </a:ext>
             </a:extLst>
           </a:blip>
@@ -30400,7 +29860,7 @@
     </p:spTree>
     <p:extLst>
       <p:ext uri="{BB962C8B-B14F-4D97-AF65-F5344CB8AC3E}">
-        <p14:creationId xmlns:p14="http://schemas.microsoft.com/office/powerpoint/2010/main" val="3172488133"/>
+        <p14:creationId xmlns:p14="http://schemas.microsoft.com/office/powerpoint/2010/main" xmlns="" val="3172488133"/>
       </p:ext>
     </p:extLst>
   </p:cSld>
@@ -30511,7 +29971,7 @@
           <a:blip r:embed="rId3">
             <a:extLst>
               <a:ext uri="{28A0092B-C50C-407E-A947-70E740481C1C}">
-                <a14:useLocalDpi xmlns:a14="http://schemas.microsoft.com/office/drawing/2010/main" val="0"/>
+                <a14:useLocalDpi xmlns:a14="http://schemas.microsoft.com/office/drawing/2010/main" xmlns="" val="0"/>
               </a:ext>
             </a:extLst>
           </a:blip>
@@ -30532,14 +29992,14 @@
           </a:ln>
           <a:extLst>
             <a:ext uri="{909E8E84-426E-40dd-AFC4-6F175D3DCCD1}">
-              <a14:hiddenFill xmlns:a14="http://schemas.microsoft.com/office/drawing/2010/main">
+              <a14:hiddenFill xmlns:a14="http://schemas.microsoft.com/office/drawing/2010/main" xmlns="">
                 <a:solidFill>
                   <a:schemeClr val="accent1"/>
                 </a:solidFill>
               </a14:hiddenFill>
             </a:ext>
             <a:ext uri="{91240B29-F687-4f45-9708-019B960494DF}">
-              <a14:hiddenLine xmlns:a14="http://schemas.microsoft.com/office/drawing/2010/main" w="9525">
+              <a14:hiddenLine xmlns:a14="http://schemas.microsoft.com/office/drawing/2010/main" xmlns="" w="9525">
                 <a:solidFill>
                   <a:schemeClr val="tx1"/>
                 </a:solidFill>
@@ -30554,7 +30014,7 @@
     </p:spTree>
     <p:extLst>
       <p:ext uri="{BB962C8B-B14F-4D97-AF65-F5344CB8AC3E}">
-        <p14:creationId xmlns:p14="http://schemas.microsoft.com/office/powerpoint/2010/main" val="754302339"/>
+        <p14:creationId xmlns:p14="http://schemas.microsoft.com/office/powerpoint/2010/main" xmlns="" val="754302339"/>
       </p:ext>
     </p:extLst>
   </p:cSld>
@@ -30810,7 +30270,7 @@
         <a:effectLst/>
         <a:extLst>
           <a:ext uri="{AF507438-7753-43e0-B8FC-AC1667EBCBE1}">
-            <a14:hiddenEffects xmlns:a14="http://schemas.microsoft.com/office/drawing/2010/main">
+            <a14:hiddenEffects xmlns:a14="http://schemas.microsoft.com/office/drawing/2010/main" xmlns="">
               <a:effectLst>
                 <a:outerShdw blurRad="63500" dist="38099" dir="2700000" algn="ctr" rotWithShape="0">
                   <a:schemeClr val="bg2">
@@ -30889,7 +30349,7 @@
         <a:effectLst/>
         <a:extLst>
           <a:ext uri="{AF507438-7753-43e0-B8FC-AC1667EBCBE1}">
-            <a14:hiddenEffects xmlns:a14="http://schemas.microsoft.com/office/drawing/2010/main">
+            <a14:hiddenEffects xmlns:a14="http://schemas.microsoft.com/office/drawing/2010/main" xmlns="">
               <a:effectLst>
                 <a:outerShdw blurRad="63500" dist="38099" dir="2700000" algn="ctr" rotWithShape="0">
                   <a:schemeClr val="bg2">
@@ -31798,7 +31258,7 @@
         <a:effectLst/>
         <a:extLst>
           <a:ext uri="{AF507438-7753-43e0-B8FC-AC1667EBCBE1}">
-            <a14:hiddenEffects xmlns:a14="http://schemas.microsoft.com/office/drawing/2010/main">
+            <a14:hiddenEffects xmlns:a14="http://schemas.microsoft.com/office/drawing/2010/main" xmlns="">
               <a:effectLst>
                 <a:outerShdw blurRad="63500" dist="38099" dir="2700000" algn="ctr" rotWithShape="0">
                   <a:schemeClr val="bg2">
@@ -31877,7 +31337,7 @@
         <a:effectLst/>
         <a:extLst>
           <a:ext uri="{AF507438-7753-43e0-B8FC-AC1667EBCBE1}">
-            <a14:hiddenEffects xmlns:a14="http://schemas.microsoft.com/office/drawing/2010/main">
+            <a14:hiddenEffects xmlns:a14="http://schemas.microsoft.com/office/drawing/2010/main" xmlns="">
               <a:effectLst>
                 <a:outerShdw blurRad="63500" dist="38099" dir="2700000" algn="ctr" rotWithShape="0">
                   <a:schemeClr val="bg2">
@@ -32466,7 +31926,7 @@
         <a:effectLst/>
         <a:extLst>
           <a:ext uri="{AF507438-7753-43e0-B8FC-AC1667EBCBE1}">
-            <a14:hiddenEffects xmlns:a14="http://schemas.microsoft.com/office/drawing/2010/main">
+            <a14:hiddenEffects xmlns:a14="http://schemas.microsoft.com/office/drawing/2010/main" xmlns="">
               <a:effectLst>
                 <a:outerShdw blurRad="63500" dist="38099" dir="2700000" algn="ctr" rotWithShape="0">
                   <a:schemeClr val="bg2">
@@ -32545,7 +32005,7 @@
         <a:effectLst/>
         <a:extLst>
           <a:ext uri="{AF507438-7753-43e0-B8FC-AC1667EBCBE1}">
-            <a14:hiddenEffects xmlns:a14="http://schemas.microsoft.com/office/drawing/2010/main">
+            <a14:hiddenEffects xmlns:a14="http://schemas.microsoft.com/office/drawing/2010/main" xmlns="">
               <a:effectLst>
                 <a:outerShdw blurRad="63500" dist="38099" dir="2700000" algn="ctr" rotWithShape="0">
                   <a:schemeClr val="bg2">
@@ -33134,7 +32594,7 @@
         <a:effectLst/>
         <a:extLst>
           <a:ext uri="{AF507438-7753-43e0-B8FC-AC1667EBCBE1}">
-            <a14:hiddenEffects xmlns:a14="http://schemas.microsoft.com/office/drawing/2010/main">
+            <a14:hiddenEffects xmlns:a14="http://schemas.microsoft.com/office/drawing/2010/main" xmlns="">
               <a:effectLst>
                 <a:outerShdw blurRad="63500" dist="38099" dir="2700000" algn="ctr" rotWithShape="0">
                   <a:schemeClr val="bg2">
@@ -33213,7 +32673,7 @@
         <a:effectLst/>
         <a:extLst>
           <a:ext uri="{AF507438-7753-43e0-B8FC-AC1667EBCBE1}">
-            <a14:hiddenEffects xmlns:a14="http://schemas.microsoft.com/office/drawing/2010/main">
+            <a14:hiddenEffects xmlns:a14="http://schemas.microsoft.com/office/drawing/2010/main" xmlns="">
               <a:effectLst>
                 <a:outerShdw blurRad="63500" dist="38099" dir="2700000" algn="ctr" rotWithShape="0">
                   <a:schemeClr val="bg2">
@@ -33802,7 +33262,7 @@
         <a:effectLst/>
         <a:extLst>
           <a:ext uri="{AF507438-7753-43e0-B8FC-AC1667EBCBE1}">
-            <a14:hiddenEffects xmlns:a14="http://schemas.microsoft.com/office/drawing/2010/main">
+            <a14:hiddenEffects xmlns:a14="http://schemas.microsoft.com/office/drawing/2010/main" xmlns="">
               <a:effectLst>
                 <a:outerShdw blurRad="63500" dist="38099" dir="2700000" algn="ctr" rotWithShape="0">
                   <a:schemeClr val="bg2">
@@ -33881,7 +33341,7 @@
         <a:effectLst/>
         <a:extLst>
           <a:ext uri="{AF507438-7753-43e0-B8FC-AC1667EBCBE1}">
-            <a14:hiddenEffects xmlns:a14="http://schemas.microsoft.com/office/drawing/2010/main">
+            <a14:hiddenEffects xmlns:a14="http://schemas.microsoft.com/office/drawing/2010/main" xmlns="">
               <a:effectLst>
                 <a:outerShdw blurRad="63500" dist="38099" dir="2700000" algn="ctr" rotWithShape="0">
                   <a:schemeClr val="bg2">
@@ -34470,7 +33930,7 @@
         <a:effectLst/>
         <a:extLst>
           <a:ext uri="{AF507438-7753-43e0-B8FC-AC1667EBCBE1}">
-            <a14:hiddenEffects xmlns:a14="http://schemas.microsoft.com/office/drawing/2010/main">
+            <a14:hiddenEffects xmlns:a14="http://schemas.microsoft.com/office/drawing/2010/main" xmlns="">
               <a:effectLst>
                 <a:outerShdw blurRad="63500" dist="38099" dir="2700000" algn="ctr" rotWithShape="0">
                   <a:schemeClr val="bg2">
@@ -34549,7 +34009,7 @@
         <a:effectLst/>
         <a:extLst>
           <a:ext uri="{AF507438-7753-43e0-B8FC-AC1667EBCBE1}">
-            <a14:hiddenEffects xmlns:a14="http://schemas.microsoft.com/office/drawing/2010/main">
+            <a14:hiddenEffects xmlns:a14="http://schemas.microsoft.com/office/drawing/2010/main" xmlns="">
               <a:effectLst>
                 <a:outerShdw blurRad="63500" dist="38099" dir="2700000" algn="ctr" rotWithShape="0">
                   <a:schemeClr val="bg2">
@@ -35138,7 +34598,7 @@
         <a:effectLst/>
         <a:extLst>
           <a:ext uri="{AF507438-7753-43e0-B8FC-AC1667EBCBE1}">
-            <a14:hiddenEffects xmlns:a14="http://schemas.microsoft.com/office/drawing/2010/main">
+            <a14:hiddenEffects xmlns:a14="http://schemas.microsoft.com/office/drawing/2010/main" xmlns="">
               <a:effectLst>
                 <a:outerShdw blurRad="63500" dist="38099" dir="2700000" algn="ctr" rotWithShape="0">
                   <a:schemeClr val="bg2">
@@ -35217,7 +34677,7 @@
         <a:effectLst/>
         <a:extLst>
           <a:ext uri="{AF507438-7753-43e0-B8FC-AC1667EBCBE1}">
-            <a14:hiddenEffects xmlns:a14="http://schemas.microsoft.com/office/drawing/2010/main">
+            <a14:hiddenEffects xmlns:a14="http://schemas.microsoft.com/office/drawing/2010/main" xmlns="">
               <a:effectLst>
                 <a:outerShdw blurRad="63500" dist="38099" dir="2700000" algn="ctr" rotWithShape="0">
                   <a:schemeClr val="bg2">
@@ -35806,7 +35266,7 @@
         <a:effectLst/>
         <a:extLst>
           <a:ext uri="{AF507438-7753-43e0-B8FC-AC1667EBCBE1}">
-            <a14:hiddenEffects xmlns:a14="http://schemas.microsoft.com/office/drawing/2010/main">
+            <a14:hiddenEffects xmlns:a14="http://schemas.microsoft.com/office/drawing/2010/main" xmlns="">
               <a:effectLst>
                 <a:outerShdw blurRad="63500" dist="38099" dir="2700000" algn="ctr" rotWithShape="0">
                   <a:schemeClr val="bg2">
@@ -35885,7 +35345,7 @@
         <a:effectLst/>
         <a:extLst>
           <a:ext uri="{AF507438-7753-43e0-B8FC-AC1667EBCBE1}">
-            <a14:hiddenEffects xmlns:a14="http://schemas.microsoft.com/office/drawing/2010/main">
+            <a14:hiddenEffects xmlns:a14="http://schemas.microsoft.com/office/drawing/2010/main" xmlns="">
               <a:effectLst>
                 <a:outerShdw blurRad="63500" dist="38099" dir="2700000" algn="ctr" rotWithShape="0">
                   <a:schemeClr val="bg2">
@@ -36474,7 +35934,7 @@
         <a:effectLst/>
         <a:extLst>
           <a:ext uri="{AF507438-7753-43e0-B8FC-AC1667EBCBE1}">
-            <a14:hiddenEffects xmlns:a14="http://schemas.microsoft.com/office/drawing/2010/main">
+            <a14:hiddenEffects xmlns:a14="http://schemas.microsoft.com/office/drawing/2010/main" xmlns="">
               <a:effectLst>
                 <a:outerShdw blurRad="63500" dist="38099" dir="2700000" algn="ctr" rotWithShape="0">
                   <a:schemeClr val="bg2">
@@ -36553,7 +36013,7 @@
         <a:effectLst/>
         <a:extLst>
           <a:ext uri="{AF507438-7753-43e0-B8FC-AC1667EBCBE1}">
-            <a14:hiddenEffects xmlns:a14="http://schemas.microsoft.com/office/drawing/2010/main">
+            <a14:hiddenEffects xmlns:a14="http://schemas.microsoft.com/office/drawing/2010/main" xmlns="">
               <a:effectLst>
                 <a:outerShdw blurRad="63500" dist="38099" dir="2700000" algn="ctr" rotWithShape="0">
                   <a:schemeClr val="bg2">

</xml_diff>